<commit_message>
adicionado informacoes aos resultados das tabelas barstate e powerflowstate
</commit_message>
<xml_diff>
--- a/public/ppt/RA149175_FSO_Rel_slides_rev1.pptx
+++ b/public/ppt/RA149175_FSO_Rel_slides_rev1.pptx
@@ -5,10 +5,10 @@
     <p:sldMasterId id="2147483660" r:id="rId1"/>
   </p:sldMasterIdLst>
   <p:notesMasterIdLst>
-    <p:notesMasterId r:id="rId11"/>
+    <p:notesMasterId r:id="rId21"/>
   </p:notesMasterIdLst>
   <p:handoutMasterIdLst>
-    <p:handoutMasterId r:id="rId12"/>
+    <p:handoutMasterId r:id="rId22"/>
   </p:handoutMasterIdLst>
   <p:sldIdLst>
     <p:sldId id="345" r:id="rId2"/>
@@ -18,8 +18,18 @@
     <p:sldId id="349" r:id="rId6"/>
     <p:sldId id="348" r:id="rId7"/>
     <p:sldId id="350" r:id="rId8"/>
-    <p:sldId id="351" r:id="rId9"/>
-    <p:sldId id="344" r:id="rId10"/>
+    <p:sldId id="353" r:id="rId9"/>
+    <p:sldId id="354" r:id="rId10"/>
+    <p:sldId id="355" r:id="rId11"/>
+    <p:sldId id="356" r:id="rId12"/>
+    <p:sldId id="357" r:id="rId13"/>
+    <p:sldId id="351" r:id="rId14"/>
+    <p:sldId id="360" r:id="rId15"/>
+    <p:sldId id="358" r:id="rId16"/>
+    <p:sldId id="359" r:id="rId17"/>
+    <p:sldId id="361" r:id="rId18"/>
+    <p:sldId id="362" r:id="rId19"/>
+    <p:sldId id="344" r:id="rId20"/>
   </p:sldIdLst>
   <p:sldSz cx="12192000" cy="6858000"/>
   <p:notesSz cx="6858000" cy="9144000"/>
@@ -1749,6 +1759,2094 @@
 </p:sld>
 </file>
 
+<file path=ppt/slides/slide10.xml><?xml version="1.0" encoding="utf-8"?>
+<p:sld xmlns:a="http://schemas.openxmlformats.org/drawingml/2006/main" xmlns:r="http://schemas.openxmlformats.org/officeDocument/2006/relationships" xmlns:p="http://schemas.openxmlformats.org/presentationml/2006/main">
+  <p:cSld>
+    <p:spTree>
+      <p:nvGrpSpPr>
+        <p:cNvPr id="1" name=""/>
+        <p:cNvGrpSpPr/>
+        <p:nvPr/>
+      </p:nvGrpSpPr>
+      <p:grpSpPr>
+        <a:xfrm>
+          <a:off x="0" y="0"/>
+          <a:ext cx="0" cy="0"/>
+          <a:chOff x="0" y="0"/>
+          <a:chExt cx="0" cy="0"/>
+        </a:xfrm>
+      </p:grpSpPr>
+      <p:sp>
+        <p:nvSpPr>
+          <p:cNvPr id="2" name="Título 1">
+            <a:extLst>
+              <a:ext uri="{FF2B5EF4-FFF2-40B4-BE49-F238E27FC236}">
+                <a16:creationId xmlns:a16="http://schemas.microsoft.com/office/drawing/2014/main" id="{F2CAC9F6-6456-4C88-B679-8859499DC83C}"/>
+              </a:ext>
+            </a:extLst>
+          </p:cNvPr>
+          <p:cNvSpPr>
+            <a:spLocks noGrp="1"/>
+          </p:cNvSpPr>
+          <p:nvPr>
+            <p:ph type="title"/>
+          </p:nvPr>
+        </p:nvSpPr>
+        <p:spPr/>
+        <p:txBody>
+          <a:bodyPr/>
+          <a:lstStyle/>
+          <a:p>
+            <a:r>
+              <a:rPr lang="pt-BR" dirty="0"/>
+              <a:t>Entrada de Dados - </a:t>
+            </a:r>
+            <a:r>
+              <a:rPr lang="pt-BR" sz="4000" dirty="0"/>
+              <a:t>https://pf-draw.netlify.app/</a:t>
+            </a:r>
+            <a:endParaRPr lang="pt-BR" dirty="0"/>
+          </a:p>
+        </p:txBody>
+      </p:sp>
+      <p:sp>
+        <p:nvSpPr>
+          <p:cNvPr id="4" name="Espaço Reservado para Data 3">
+            <a:extLst>
+              <a:ext uri="{FF2B5EF4-FFF2-40B4-BE49-F238E27FC236}">
+                <a16:creationId xmlns:a16="http://schemas.microsoft.com/office/drawing/2014/main" id="{FE283D46-9CA0-4CFE-A924-EA57DF7E54D1}"/>
+              </a:ext>
+            </a:extLst>
+          </p:cNvPr>
+          <p:cNvSpPr>
+            <a:spLocks noGrp="1"/>
+          </p:cNvSpPr>
+          <p:nvPr>
+            <p:ph type="dt" sz="half" idx="10"/>
+          </p:nvPr>
+        </p:nvSpPr>
+        <p:spPr/>
+        <p:txBody>
+          <a:bodyPr/>
+          <a:lstStyle/>
+          <a:p>
+            <a:r>
+              <a:rPr lang="pt-BR"/>
+              <a:t>Dezembro 2020</a:t>
+            </a:r>
+            <a:endParaRPr lang="pt-BR" dirty="0"/>
+          </a:p>
+        </p:txBody>
+      </p:sp>
+      <p:sp>
+        <p:nvSpPr>
+          <p:cNvPr id="5" name="Espaço Reservado para Rodapé 4">
+            <a:extLst>
+              <a:ext uri="{FF2B5EF4-FFF2-40B4-BE49-F238E27FC236}">
+                <a16:creationId xmlns:a16="http://schemas.microsoft.com/office/drawing/2014/main" id="{68E5F5AE-398A-4CB1-8C05-AD60C7F6DB9A}"/>
+              </a:ext>
+            </a:extLst>
+          </p:cNvPr>
+          <p:cNvSpPr>
+            <a:spLocks noGrp="1"/>
+          </p:cNvSpPr>
+          <p:nvPr>
+            <p:ph type="ftr" sz="quarter" idx="11"/>
+          </p:nvPr>
+        </p:nvSpPr>
+        <p:spPr/>
+        <p:txBody>
+          <a:bodyPr/>
+          <a:lstStyle/>
+          <a:p>
+            <a:r>
+              <a:rPr lang="pt-BR"/>
+              <a:t>IT743A – Cálculo de Fluxo de Carga</a:t>
+            </a:r>
+            <a:endParaRPr lang="pt-BR" dirty="0"/>
+          </a:p>
+        </p:txBody>
+      </p:sp>
+      <p:sp>
+        <p:nvSpPr>
+          <p:cNvPr id="6" name="Espaço Reservado para Número de Slide 5">
+            <a:extLst>
+              <a:ext uri="{FF2B5EF4-FFF2-40B4-BE49-F238E27FC236}">
+                <a16:creationId xmlns:a16="http://schemas.microsoft.com/office/drawing/2014/main" id="{57FDDF2D-5DA4-4272-9BC5-AE99C89F456D}"/>
+              </a:ext>
+            </a:extLst>
+          </p:cNvPr>
+          <p:cNvSpPr>
+            <a:spLocks noGrp="1"/>
+          </p:cNvSpPr>
+          <p:nvPr>
+            <p:ph type="sldNum" sz="quarter" idx="12"/>
+          </p:nvPr>
+        </p:nvSpPr>
+        <p:spPr/>
+        <p:txBody>
+          <a:bodyPr/>
+          <a:lstStyle/>
+          <a:p>
+            <a:fld id="{8579997A-84E9-4B38-967C-2D4A110C3049}" type="slidenum">
+              <a:rPr lang="pt-BR" smtClean="0"/>
+              <a:t>10</a:t>
+            </a:fld>
+            <a:endParaRPr lang="pt-BR"/>
+          </a:p>
+        </p:txBody>
+      </p:sp>
+      <p:pic>
+        <p:nvPicPr>
+          <p:cNvPr id="10" name="Imagem 9">
+            <a:extLst>
+              <a:ext uri="{FF2B5EF4-FFF2-40B4-BE49-F238E27FC236}">
+                <a16:creationId xmlns:a16="http://schemas.microsoft.com/office/drawing/2014/main" id="{62E0903C-28F5-41DC-8962-06E1D6C7AD4D}"/>
+              </a:ext>
+            </a:extLst>
+          </p:cNvPr>
+          <p:cNvPicPr>
+            <a:picLocks noChangeAspect="1"/>
+          </p:cNvPicPr>
+          <p:nvPr/>
+        </p:nvPicPr>
+        <p:blipFill>
+          <a:blip r:embed="rId2"/>
+          <a:stretch>
+            <a:fillRect/>
+          </a:stretch>
+        </p:blipFill>
+        <p:spPr>
+          <a:xfrm>
+            <a:off x="2967037" y="1690688"/>
+            <a:ext cx="6257925" cy="4381500"/>
+          </a:xfrm>
+          <a:prstGeom prst="rect">
+            <a:avLst/>
+          </a:prstGeom>
+        </p:spPr>
+      </p:pic>
+    </p:spTree>
+    <p:extLst>
+      <p:ext uri="{BB962C8B-B14F-4D97-AF65-F5344CB8AC3E}">
+        <p14:creationId xmlns:p14="http://schemas.microsoft.com/office/powerpoint/2010/main" val="202654281"/>
+      </p:ext>
+    </p:extLst>
+  </p:cSld>
+  <p:clrMapOvr>
+    <a:masterClrMapping/>
+  </p:clrMapOvr>
+</p:sld>
+</file>
+
+<file path=ppt/slides/slide11.xml><?xml version="1.0" encoding="utf-8"?>
+<p:sld xmlns:a="http://schemas.openxmlformats.org/drawingml/2006/main" xmlns:r="http://schemas.openxmlformats.org/officeDocument/2006/relationships" xmlns:p="http://schemas.openxmlformats.org/presentationml/2006/main">
+  <p:cSld>
+    <p:spTree>
+      <p:nvGrpSpPr>
+        <p:cNvPr id="1" name=""/>
+        <p:cNvGrpSpPr/>
+        <p:nvPr/>
+      </p:nvGrpSpPr>
+      <p:grpSpPr>
+        <a:xfrm>
+          <a:off x="0" y="0"/>
+          <a:ext cx="0" cy="0"/>
+          <a:chOff x="0" y="0"/>
+          <a:chExt cx="0" cy="0"/>
+        </a:xfrm>
+      </p:grpSpPr>
+      <p:sp>
+        <p:nvSpPr>
+          <p:cNvPr id="2" name="Título 1">
+            <a:extLst>
+              <a:ext uri="{FF2B5EF4-FFF2-40B4-BE49-F238E27FC236}">
+                <a16:creationId xmlns:a16="http://schemas.microsoft.com/office/drawing/2014/main" id="{F2CAC9F6-6456-4C88-B679-8859499DC83C}"/>
+              </a:ext>
+            </a:extLst>
+          </p:cNvPr>
+          <p:cNvSpPr>
+            <a:spLocks noGrp="1"/>
+          </p:cNvSpPr>
+          <p:nvPr>
+            <p:ph type="title"/>
+          </p:nvPr>
+        </p:nvSpPr>
+        <p:spPr/>
+        <p:txBody>
+          <a:bodyPr/>
+          <a:lstStyle/>
+          <a:p>
+            <a:r>
+              <a:rPr lang="pt-BR" dirty="0"/>
+              <a:t>Entrada de Dados - </a:t>
+            </a:r>
+            <a:r>
+              <a:rPr lang="pt-BR" sz="4000" dirty="0"/>
+              <a:t>https://pf-draw.netlify.app/</a:t>
+            </a:r>
+            <a:endParaRPr lang="pt-BR" dirty="0"/>
+          </a:p>
+        </p:txBody>
+      </p:sp>
+      <p:sp>
+        <p:nvSpPr>
+          <p:cNvPr id="4" name="Espaço Reservado para Data 3">
+            <a:extLst>
+              <a:ext uri="{FF2B5EF4-FFF2-40B4-BE49-F238E27FC236}">
+                <a16:creationId xmlns:a16="http://schemas.microsoft.com/office/drawing/2014/main" id="{FE283D46-9CA0-4CFE-A924-EA57DF7E54D1}"/>
+              </a:ext>
+            </a:extLst>
+          </p:cNvPr>
+          <p:cNvSpPr>
+            <a:spLocks noGrp="1"/>
+          </p:cNvSpPr>
+          <p:nvPr>
+            <p:ph type="dt" sz="half" idx="10"/>
+          </p:nvPr>
+        </p:nvSpPr>
+        <p:spPr/>
+        <p:txBody>
+          <a:bodyPr/>
+          <a:lstStyle/>
+          <a:p>
+            <a:r>
+              <a:rPr lang="pt-BR"/>
+              <a:t>Dezembro 2020</a:t>
+            </a:r>
+            <a:endParaRPr lang="pt-BR" dirty="0"/>
+          </a:p>
+        </p:txBody>
+      </p:sp>
+      <p:sp>
+        <p:nvSpPr>
+          <p:cNvPr id="5" name="Espaço Reservado para Rodapé 4">
+            <a:extLst>
+              <a:ext uri="{FF2B5EF4-FFF2-40B4-BE49-F238E27FC236}">
+                <a16:creationId xmlns:a16="http://schemas.microsoft.com/office/drawing/2014/main" id="{68E5F5AE-398A-4CB1-8C05-AD60C7F6DB9A}"/>
+              </a:ext>
+            </a:extLst>
+          </p:cNvPr>
+          <p:cNvSpPr>
+            <a:spLocks noGrp="1"/>
+          </p:cNvSpPr>
+          <p:nvPr>
+            <p:ph type="ftr" sz="quarter" idx="11"/>
+          </p:nvPr>
+        </p:nvSpPr>
+        <p:spPr/>
+        <p:txBody>
+          <a:bodyPr/>
+          <a:lstStyle/>
+          <a:p>
+            <a:r>
+              <a:rPr lang="pt-BR"/>
+              <a:t>IT743A – Cálculo de Fluxo de Carga</a:t>
+            </a:r>
+            <a:endParaRPr lang="pt-BR" dirty="0"/>
+          </a:p>
+        </p:txBody>
+      </p:sp>
+      <p:sp>
+        <p:nvSpPr>
+          <p:cNvPr id="6" name="Espaço Reservado para Número de Slide 5">
+            <a:extLst>
+              <a:ext uri="{FF2B5EF4-FFF2-40B4-BE49-F238E27FC236}">
+                <a16:creationId xmlns:a16="http://schemas.microsoft.com/office/drawing/2014/main" id="{57FDDF2D-5DA4-4272-9BC5-AE99C89F456D}"/>
+              </a:ext>
+            </a:extLst>
+          </p:cNvPr>
+          <p:cNvSpPr>
+            <a:spLocks noGrp="1"/>
+          </p:cNvSpPr>
+          <p:nvPr>
+            <p:ph type="sldNum" sz="quarter" idx="12"/>
+          </p:nvPr>
+        </p:nvSpPr>
+        <p:spPr/>
+        <p:txBody>
+          <a:bodyPr/>
+          <a:lstStyle/>
+          <a:p>
+            <a:fld id="{8579997A-84E9-4B38-967C-2D4A110C3049}" type="slidenum">
+              <a:rPr lang="pt-BR" smtClean="0"/>
+              <a:t>11</a:t>
+            </a:fld>
+            <a:endParaRPr lang="pt-BR"/>
+          </a:p>
+        </p:txBody>
+      </p:sp>
+      <p:pic>
+        <p:nvPicPr>
+          <p:cNvPr id="8" name="Imagem 7">
+            <a:extLst>
+              <a:ext uri="{FF2B5EF4-FFF2-40B4-BE49-F238E27FC236}">
+                <a16:creationId xmlns:a16="http://schemas.microsoft.com/office/drawing/2014/main" id="{D363E008-8DFB-4667-AE6C-96E9B14BF709}"/>
+              </a:ext>
+            </a:extLst>
+          </p:cNvPr>
+          <p:cNvPicPr>
+            <a:picLocks noChangeAspect="1"/>
+          </p:cNvPicPr>
+          <p:nvPr/>
+        </p:nvPicPr>
+        <p:blipFill>
+          <a:blip r:embed="rId2"/>
+          <a:stretch>
+            <a:fillRect/>
+          </a:stretch>
+        </p:blipFill>
+        <p:spPr>
+          <a:xfrm>
+            <a:off x="3262150" y="1460330"/>
+            <a:ext cx="5667699" cy="4800462"/>
+          </a:xfrm>
+          <a:prstGeom prst="rect">
+            <a:avLst/>
+          </a:prstGeom>
+        </p:spPr>
+      </p:pic>
+    </p:spTree>
+    <p:extLst>
+      <p:ext uri="{BB962C8B-B14F-4D97-AF65-F5344CB8AC3E}">
+        <p14:creationId xmlns:p14="http://schemas.microsoft.com/office/powerpoint/2010/main" val="59518515"/>
+      </p:ext>
+    </p:extLst>
+  </p:cSld>
+  <p:clrMapOvr>
+    <a:masterClrMapping/>
+  </p:clrMapOvr>
+</p:sld>
+</file>
+
+<file path=ppt/slides/slide12.xml><?xml version="1.0" encoding="utf-8"?>
+<p:sld xmlns:a="http://schemas.openxmlformats.org/drawingml/2006/main" xmlns:r="http://schemas.openxmlformats.org/officeDocument/2006/relationships" xmlns:p="http://schemas.openxmlformats.org/presentationml/2006/main">
+  <p:cSld>
+    <p:spTree>
+      <p:nvGrpSpPr>
+        <p:cNvPr id="1" name=""/>
+        <p:cNvGrpSpPr/>
+        <p:nvPr/>
+      </p:nvGrpSpPr>
+      <p:grpSpPr>
+        <a:xfrm>
+          <a:off x="0" y="0"/>
+          <a:ext cx="0" cy="0"/>
+          <a:chOff x="0" y="0"/>
+          <a:chExt cx="0" cy="0"/>
+        </a:xfrm>
+      </p:grpSpPr>
+      <p:sp>
+        <p:nvSpPr>
+          <p:cNvPr id="2" name="Título 1">
+            <a:extLst>
+              <a:ext uri="{FF2B5EF4-FFF2-40B4-BE49-F238E27FC236}">
+                <a16:creationId xmlns:a16="http://schemas.microsoft.com/office/drawing/2014/main" id="{F2CAC9F6-6456-4C88-B679-8859499DC83C}"/>
+              </a:ext>
+            </a:extLst>
+          </p:cNvPr>
+          <p:cNvSpPr>
+            <a:spLocks noGrp="1"/>
+          </p:cNvSpPr>
+          <p:nvPr>
+            <p:ph type="title"/>
+          </p:nvPr>
+        </p:nvSpPr>
+        <p:spPr/>
+        <p:txBody>
+          <a:bodyPr/>
+          <a:lstStyle/>
+          <a:p>
+            <a:r>
+              <a:rPr lang="pt-BR" dirty="0"/>
+              <a:t>Entrada de Dados - </a:t>
+            </a:r>
+            <a:r>
+              <a:rPr lang="pt-BR" sz="4000" dirty="0"/>
+              <a:t>https://pf-draw.netlify.app/</a:t>
+            </a:r>
+            <a:endParaRPr lang="pt-BR" dirty="0"/>
+          </a:p>
+        </p:txBody>
+      </p:sp>
+      <p:sp>
+        <p:nvSpPr>
+          <p:cNvPr id="4" name="Espaço Reservado para Data 3">
+            <a:extLst>
+              <a:ext uri="{FF2B5EF4-FFF2-40B4-BE49-F238E27FC236}">
+                <a16:creationId xmlns:a16="http://schemas.microsoft.com/office/drawing/2014/main" id="{FE283D46-9CA0-4CFE-A924-EA57DF7E54D1}"/>
+              </a:ext>
+            </a:extLst>
+          </p:cNvPr>
+          <p:cNvSpPr>
+            <a:spLocks noGrp="1"/>
+          </p:cNvSpPr>
+          <p:nvPr>
+            <p:ph type="dt" sz="half" idx="10"/>
+          </p:nvPr>
+        </p:nvSpPr>
+        <p:spPr/>
+        <p:txBody>
+          <a:bodyPr/>
+          <a:lstStyle/>
+          <a:p>
+            <a:r>
+              <a:rPr lang="pt-BR"/>
+              <a:t>Dezembro 2020</a:t>
+            </a:r>
+            <a:endParaRPr lang="pt-BR" dirty="0"/>
+          </a:p>
+        </p:txBody>
+      </p:sp>
+      <p:sp>
+        <p:nvSpPr>
+          <p:cNvPr id="5" name="Espaço Reservado para Rodapé 4">
+            <a:extLst>
+              <a:ext uri="{FF2B5EF4-FFF2-40B4-BE49-F238E27FC236}">
+                <a16:creationId xmlns:a16="http://schemas.microsoft.com/office/drawing/2014/main" id="{68E5F5AE-398A-4CB1-8C05-AD60C7F6DB9A}"/>
+              </a:ext>
+            </a:extLst>
+          </p:cNvPr>
+          <p:cNvSpPr>
+            <a:spLocks noGrp="1"/>
+          </p:cNvSpPr>
+          <p:nvPr>
+            <p:ph type="ftr" sz="quarter" idx="11"/>
+          </p:nvPr>
+        </p:nvSpPr>
+        <p:spPr/>
+        <p:txBody>
+          <a:bodyPr/>
+          <a:lstStyle/>
+          <a:p>
+            <a:r>
+              <a:rPr lang="pt-BR"/>
+              <a:t>IT743A – Cálculo de Fluxo de Carga</a:t>
+            </a:r>
+            <a:endParaRPr lang="pt-BR" dirty="0"/>
+          </a:p>
+        </p:txBody>
+      </p:sp>
+      <p:sp>
+        <p:nvSpPr>
+          <p:cNvPr id="6" name="Espaço Reservado para Número de Slide 5">
+            <a:extLst>
+              <a:ext uri="{FF2B5EF4-FFF2-40B4-BE49-F238E27FC236}">
+                <a16:creationId xmlns:a16="http://schemas.microsoft.com/office/drawing/2014/main" id="{57FDDF2D-5DA4-4272-9BC5-AE99C89F456D}"/>
+              </a:ext>
+            </a:extLst>
+          </p:cNvPr>
+          <p:cNvSpPr>
+            <a:spLocks noGrp="1"/>
+          </p:cNvSpPr>
+          <p:nvPr>
+            <p:ph type="sldNum" sz="quarter" idx="12"/>
+          </p:nvPr>
+        </p:nvSpPr>
+        <p:spPr/>
+        <p:txBody>
+          <a:bodyPr/>
+          <a:lstStyle/>
+          <a:p>
+            <a:fld id="{8579997A-84E9-4B38-967C-2D4A110C3049}" type="slidenum">
+              <a:rPr lang="pt-BR" smtClean="0"/>
+              <a:t>12</a:t>
+            </a:fld>
+            <a:endParaRPr lang="pt-BR"/>
+          </a:p>
+        </p:txBody>
+      </p:sp>
+      <p:pic>
+        <p:nvPicPr>
+          <p:cNvPr id="7" name="Imagem 6">
+            <a:extLst>
+              <a:ext uri="{FF2B5EF4-FFF2-40B4-BE49-F238E27FC236}">
+                <a16:creationId xmlns:a16="http://schemas.microsoft.com/office/drawing/2014/main" id="{3449CFE7-31CC-4842-8CB5-139D94FF3E4F}"/>
+              </a:ext>
+            </a:extLst>
+          </p:cNvPr>
+          <p:cNvPicPr>
+            <a:picLocks noChangeAspect="1"/>
+          </p:cNvPicPr>
+          <p:nvPr/>
+        </p:nvPicPr>
+        <p:blipFill>
+          <a:blip r:embed="rId2"/>
+          <a:stretch>
+            <a:fillRect/>
+          </a:stretch>
+        </p:blipFill>
+        <p:spPr>
+          <a:xfrm>
+            <a:off x="1728556" y="2729425"/>
+            <a:ext cx="8734888" cy="1107049"/>
+          </a:xfrm>
+          <a:prstGeom prst="rect">
+            <a:avLst/>
+          </a:prstGeom>
+        </p:spPr>
+      </p:pic>
+    </p:spTree>
+    <p:extLst>
+      <p:ext uri="{BB962C8B-B14F-4D97-AF65-F5344CB8AC3E}">
+        <p14:creationId xmlns:p14="http://schemas.microsoft.com/office/powerpoint/2010/main" val="3207991278"/>
+      </p:ext>
+    </p:extLst>
+  </p:cSld>
+  <p:clrMapOvr>
+    <a:masterClrMapping/>
+  </p:clrMapOvr>
+</p:sld>
+</file>
+
+<file path=ppt/slides/slide13.xml><?xml version="1.0" encoding="utf-8"?>
+<p:sld xmlns:a="http://schemas.openxmlformats.org/drawingml/2006/main" xmlns:r="http://schemas.openxmlformats.org/officeDocument/2006/relationships" xmlns:p="http://schemas.openxmlformats.org/presentationml/2006/main">
+  <p:cSld>
+    <p:spTree>
+      <p:nvGrpSpPr>
+        <p:cNvPr id="1" name=""/>
+        <p:cNvGrpSpPr/>
+        <p:nvPr/>
+      </p:nvGrpSpPr>
+      <p:grpSpPr>
+        <a:xfrm>
+          <a:off x="0" y="0"/>
+          <a:ext cx="0" cy="0"/>
+          <a:chOff x="0" y="0"/>
+          <a:chExt cx="0" cy="0"/>
+        </a:xfrm>
+      </p:grpSpPr>
+      <p:sp>
+        <p:nvSpPr>
+          <p:cNvPr id="2" name="Título 1">
+            <a:extLst>
+              <a:ext uri="{FF2B5EF4-FFF2-40B4-BE49-F238E27FC236}">
+                <a16:creationId xmlns:a16="http://schemas.microsoft.com/office/drawing/2014/main" id="{F2CAC9F6-6456-4C88-B679-8859499DC83C}"/>
+              </a:ext>
+            </a:extLst>
+          </p:cNvPr>
+          <p:cNvSpPr>
+            <a:spLocks noGrp="1"/>
+          </p:cNvSpPr>
+          <p:nvPr>
+            <p:ph type="title"/>
+          </p:nvPr>
+        </p:nvSpPr>
+        <p:spPr/>
+        <p:txBody>
+          <a:bodyPr/>
+          <a:lstStyle/>
+          <a:p>
+            <a:r>
+              <a:rPr lang="pt-BR" dirty="0"/>
+              <a:t>Resultados - </a:t>
+            </a:r>
+            <a:r>
+              <a:rPr lang="pt-BR" sz="4400" dirty="0"/>
+              <a:t>https://pf-draw.netlify.app/</a:t>
+            </a:r>
+            <a:endParaRPr lang="pt-BR" dirty="0"/>
+          </a:p>
+        </p:txBody>
+      </p:sp>
+      <p:sp>
+        <p:nvSpPr>
+          <p:cNvPr id="4" name="Espaço Reservado para Data 3">
+            <a:extLst>
+              <a:ext uri="{FF2B5EF4-FFF2-40B4-BE49-F238E27FC236}">
+                <a16:creationId xmlns:a16="http://schemas.microsoft.com/office/drawing/2014/main" id="{FE283D46-9CA0-4CFE-A924-EA57DF7E54D1}"/>
+              </a:ext>
+            </a:extLst>
+          </p:cNvPr>
+          <p:cNvSpPr>
+            <a:spLocks noGrp="1"/>
+          </p:cNvSpPr>
+          <p:nvPr>
+            <p:ph type="dt" sz="half" idx="10"/>
+          </p:nvPr>
+        </p:nvSpPr>
+        <p:spPr/>
+        <p:txBody>
+          <a:bodyPr/>
+          <a:lstStyle/>
+          <a:p>
+            <a:r>
+              <a:rPr lang="pt-BR"/>
+              <a:t>Dezembro 2020</a:t>
+            </a:r>
+            <a:endParaRPr lang="pt-BR" dirty="0"/>
+          </a:p>
+        </p:txBody>
+      </p:sp>
+      <p:sp>
+        <p:nvSpPr>
+          <p:cNvPr id="5" name="Espaço Reservado para Rodapé 4">
+            <a:extLst>
+              <a:ext uri="{FF2B5EF4-FFF2-40B4-BE49-F238E27FC236}">
+                <a16:creationId xmlns:a16="http://schemas.microsoft.com/office/drawing/2014/main" id="{68E5F5AE-398A-4CB1-8C05-AD60C7F6DB9A}"/>
+              </a:ext>
+            </a:extLst>
+          </p:cNvPr>
+          <p:cNvSpPr>
+            <a:spLocks noGrp="1"/>
+          </p:cNvSpPr>
+          <p:nvPr>
+            <p:ph type="ftr" sz="quarter" idx="11"/>
+          </p:nvPr>
+        </p:nvSpPr>
+        <p:spPr/>
+        <p:txBody>
+          <a:bodyPr/>
+          <a:lstStyle/>
+          <a:p>
+            <a:r>
+              <a:rPr lang="pt-BR"/>
+              <a:t>IT743A – Cálculo de Fluxo de Carga</a:t>
+            </a:r>
+            <a:endParaRPr lang="pt-BR" dirty="0"/>
+          </a:p>
+        </p:txBody>
+      </p:sp>
+      <p:sp>
+        <p:nvSpPr>
+          <p:cNvPr id="6" name="Espaço Reservado para Número de Slide 5">
+            <a:extLst>
+              <a:ext uri="{FF2B5EF4-FFF2-40B4-BE49-F238E27FC236}">
+                <a16:creationId xmlns:a16="http://schemas.microsoft.com/office/drawing/2014/main" id="{57FDDF2D-5DA4-4272-9BC5-AE99C89F456D}"/>
+              </a:ext>
+            </a:extLst>
+          </p:cNvPr>
+          <p:cNvSpPr>
+            <a:spLocks noGrp="1"/>
+          </p:cNvSpPr>
+          <p:nvPr>
+            <p:ph type="sldNum" sz="quarter" idx="12"/>
+          </p:nvPr>
+        </p:nvSpPr>
+        <p:spPr/>
+        <p:txBody>
+          <a:bodyPr/>
+          <a:lstStyle/>
+          <a:p>
+            <a:fld id="{8579997A-84E9-4B38-967C-2D4A110C3049}" type="slidenum">
+              <a:rPr lang="pt-BR" smtClean="0"/>
+              <a:t>13</a:t>
+            </a:fld>
+            <a:endParaRPr lang="pt-BR"/>
+          </a:p>
+        </p:txBody>
+      </p:sp>
+      <p:pic>
+        <p:nvPicPr>
+          <p:cNvPr id="16" name="Imagem 15">
+            <a:extLst>
+              <a:ext uri="{FF2B5EF4-FFF2-40B4-BE49-F238E27FC236}">
+                <a16:creationId xmlns:a16="http://schemas.microsoft.com/office/drawing/2014/main" id="{72B0254B-BD2D-4E66-A4AC-66CCFBBADEF8}"/>
+              </a:ext>
+            </a:extLst>
+          </p:cNvPr>
+          <p:cNvPicPr>
+            <a:picLocks noChangeAspect="1"/>
+          </p:cNvPicPr>
+          <p:nvPr/>
+        </p:nvPicPr>
+        <p:blipFill>
+          <a:blip r:embed="rId2"/>
+          <a:stretch>
+            <a:fillRect/>
+          </a:stretch>
+        </p:blipFill>
+        <p:spPr>
+          <a:xfrm>
+            <a:off x="926607" y="1239010"/>
+            <a:ext cx="10338786" cy="5117340"/>
+          </a:xfrm>
+          <a:prstGeom prst="rect">
+            <a:avLst/>
+          </a:prstGeom>
+        </p:spPr>
+      </p:pic>
+    </p:spTree>
+    <p:extLst>
+      <p:ext uri="{BB962C8B-B14F-4D97-AF65-F5344CB8AC3E}">
+        <p14:creationId xmlns:p14="http://schemas.microsoft.com/office/powerpoint/2010/main" val="1407305316"/>
+      </p:ext>
+    </p:extLst>
+  </p:cSld>
+  <p:clrMapOvr>
+    <a:masterClrMapping/>
+  </p:clrMapOvr>
+</p:sld>
+</file>
+
+<file path=ppt/slides/slide14.xml><?xml version="1.0" encoding="utf-8"?>
+<p:sld xmlns:a="http://schemas.openxmlformats.org/drawingml/2006/main" xmlns:r="http://schemas.openxmlformats.org/officeDocument/2006/relationships" xmlns:p="http://schemas.openxmlformats.org/presentationml/2006/main">
+  <p:cSld>
+    <p:spTree>
+      <p:nvGrpSpPr>
+        <p:cNvPr id="1" name=""/>
+        <p:cNvGrpSpPr/>
+        <p:nvPr/>
+      </p:nvGrpSpPr>
+      <p:grpSpPr>
+        <a:xfrm>
+          <a:off x="0" y="0"/>
+          <a:ext cx="0" cy="0"/>
+          <a:chOff x="0" y="0"/>
+          <a:chExt cx="0" cy="0"/>
+        </a:xfrm>
+      </p:grpSpPr>
+      <p:sp>
+        <p:nvSpPr>
+          <p:cNvPr id="2" name="Título 1">
+            <a:extLst>
+              <a:ext uri="{FF2B5EF4-FFF2-40B4-BE49-F238E27FC236}">
+                <a16:creationId xmlns:a16="http://schemas.microsoft.com/office/drawing/2014/main" id="{F2CAC9F6-6456-4C88-B679-8859499DC83C}"/>
+              </a:ext>
+            </a:extLst>
+          </p:cNvPr>
+          <p:cNvSpPr>
+            <a:spLocks noGrp="1"/>
+          </p:cNvSpPr>
+          <p:nvPr>
+            <p:ph type="title"/>
+          </p:nvPr>
+        </p:nvSpPr>
+        <p:spPr/>
+        <p:txBody>
+          <a:bodyPr/>
+          <a:lstStyle/>
+          <a:p>
+            <a:r>
+              <a:rPr lang="pt-BR" dirty="0"/>
+              <a:t>Resultados - </a:t>
+            </a:r>
+            <a:r>
+              <a:rPr lang="pt-BR" sz="4400" dirty="0"/>
+              <a:t>https://pf-draw.netlify.app/</a:t>
+            </a:r>
+            <a:endParaRPr lang="pt-BR" dirty="0"/>
+          </a:p>
+        </p:txBody>
+      </p:sp>
+      <p:sp>
+        <p:nvSpPr>
+          <p:cNvPr id="4" name="Espaço Reservado para Data 3">
+            <a:extLst>
+              <a:ext uri="{FF2B5EF4-FFF2-40B4-BE49-F238E27FC236}">
+                <a16:creationId xmlns:a16="http://schemas.microsoft.com/office/drawing/2014/main" id="{FE283D46-9CA0-4CFE-A924-EA57DF7E54D1}"/>
+              </a:ext>
+            </a:extLst>
+          </p:cNvPr>
+          <p:cNvSpPr>
+            <a:spLocks noGrp="1"/>
+          </p:cNvSpPr>
+          <p:nvPr>
+            <p:ph type="dt" sz="half" idx="10"/>
+          </p:nvPr>
+        </p:nvSpPr>
+        <p:spPr/>
+        <p:txBody>
+          <a:bodyPr/>
+          <a:lstStyle/>
+          <a:p>
+            <a:r>
+              <a:rPr lang="pt-BR"/>
+              <a:t>Dezembro 2020</a:t>
+            </a:r>
+            <a:endParaRPr lang="pt-BR" dirty="0"/>
+          </a:p>
+        </p:txBody>
+      </p:sp>
+      <p:sp>
+        <p:nvSpPr>
+          <p:cNvPr id="5" name="Espaço Reservado para Rodapé 4">
+            <a:extLst>
+              <a:ext uri="{FF2B5EF4-FFF2-40B4-BE49-F238E27FC236}">
+                <a16:creationId xmlns:a16="http://schemas.microsoft.com/office/drawing/2014/main" id="{68E5F5AE-398A-4CB1-8C05-AD60C7F6DB9A}"/>
+              </a:ext>
+            </a:extLst>
+          </p:cNvPr>
+          <p:cNvSpPr>
+            <a:spLocks noGrp="1"/>
+          </p:cNvSpPr>
+          <p:nvPr>
+            <p:ph type="ftr" sz="quarter" idx="11"/>
+          </p:nvPr>
+        </p:nvSpPr>
+        <p:spPr/>
+        <p:txBody>
+          <a:bodyPr/>
+          <a:lstStyle/>
+          <a:p>
+            <a:r>
+              <a:rPr lang="pt-BR"/>
+              <a:t>IT743A – Cálculo de Fluxo de Carga</a:t>
+            </a:r>
+            <a:endParaRPr lang="pt-BR" dirty="0"/>
+          </a:p>
+        </p:txBody>
+      </p:sp>
+      <p:sp>
+        <p:nvSpPr>
+          <p:cNvPr id="6" name="Espaço Reservado para Número de Slide 5">
+            <a:extLst>
+              <a:ext uri="{FF2B5EF4-FFF2-40B4-BE49-F238E27FC236}">
+                <a16:creationId xmlns:a16="http://schemas.microsoft.com/office/drawing/2014/main" id="{57FDDF2D-5DA4-4272-9BC5-AE99C89F456D}"/>
+              </a:ext>
+            </a:extLst>
+          </p:cNvPr>
+          <p:cNvSpPr>
+            <a:spLocks noGrp="1"/>
+          </p:cNvSpPr>
+          <p:nvPr>
+            <p:ph type="sldNum" sz="quarter" idx="12"/>
+          </p:nvPr>
+        </p:nvSpPr>
+        <p:spPr/>
+        <p:txBody>
+          <a:bodyPr/>
+          <a:lstStyle/>
+          <a:p>
+            <a:fld id="{8579997A-84E9-4B38-967C-2D4A110C3049}" type="slidenum">
+              <a:rPr lang="pt-BR" smtClean="0"/>
+              <a:t>14</a:t>
+            </a:fld>
+            <a:endParaRPr lang="pt-BR"/>
+          </a:p>
+        </p:txBody>
+      </p:sp>
+      <p:pic>
+        <p:nvPicPr>
+          <p:cNvPr id="12" name="Imagem 11">
+            <a:extLst>
+              <a:ext uri="{FF2B5EF4-FFF2-40B4-BE49-F238E27FC236}">
+                <a16:creationId xmlns:a16="http://schemas.microsoft.com/office/drawing/2014/main" id="{A6AC5B63-79F8-4A5D-ADE0-87134B9A9145}"/>
+              </a:ext>
+            </a:extLst>
+          </p:cNvPr>
+          <p:cNvPicPr>
+            <a:picLocks noChangeAspect="1"/>
+          </p:cNvPicPr>
+          <p:nvPr/>
+        </p:nvPicPr>
+        <p:blipFill>
+          <a:blip r:embed="rId2"/>
+          <a:stretch>
+            <a:fillRect/>
+          </a:stretch>
+        </p:blipFill>
+        <p:spPr>
+          <a:xfrm>
+            <a:off x="1015383" y="1290129"/>
+            <a:ext cx="10161233" cy="4985799"/>
+          </a:xfrm>
+          <a:prstGeom prst="rect">
+            <a:avLst/>
+          </a:prstGeom>
+        </p:spPr>
+      </p:pic>
+      <p:sp>
+        <p:nvSpPr>
+          <p:cNvPr id="10" name="Elipse 9">
+            <a:extLst>
+              <a:ext uri="{FF2B5EF4-FFF2-40B4-BE49-F238E27FC236}">
+                <a16:creationId xmlns:a16="http://schemas.microsoft.com/office/drawing/2014/main" id="{6EDAA28B-B9A7-4FD8-94C9-3F39F3D505EB}"/>
+              </a:ext>
+            </a:extLst>
+          </p:cNvPr>
+          <p:cNvSpPr/>
+          <p:nvPr/>
+        </p:nvSpPr>
+        <p:spPr>
+          <a:xfrm>
+            <a:off x="3098307" y="2484641"/>
+            <a:ext cx="4421080" cy="3231472"/>
+          </a:xfrm>
+          <a:prstGeom prst="ellipse">
+            <a:avLst/>
+          </a:prstGeom>
+          <a:noFill/>
+          <a:ln w="38100">
+            <a:solidFill>
+              <a:schemeClr val="tx1">
+                <a:lumMod val="95000"/>
+                <a:lumOff val="5000"/>
+              </a:schemeClr>
+            </a:solidFill>
+          </a:ln>
+        </p:spPr>
+        <p:style>
+          <a:lnRef idx="2">
+            <a:schemeClr val="accent1">
+              <a:shade val="50000"/>
+            </a:schemeClr>
+          </a:lnRef>
+          <a:fillRef idx="1">
+            <a:schemeClr val="accent1"/>
+          </a:fillRef>
+          <a:effectRef idx="0">
+            <a:schemeClr val="accent1"/>
+          </a:effectRef>
+          <a:fontRef idx="minor">
+            <a:schemeClr val="lt1"/>
+          </a:fontRef>
+        </p:style>
+        <p:txBody>
+          <a:bodyPr rtlCol="0" anchor="ctr"/>
+          <a:lstStyle/>
+          <a:p>
+            <a:pPr algn="ctr"/>
+            <a:endParaRPr lang="pt-BR"/>
+          </a:p>
+        </p:txBody>
+      </p:sp>
+      <p:sp>
+        <p:nvSpPr>
+          <p:cNvPr id="13" name="Elipse 12">
+            <a:extLst>
+              <a:ext uri="{FF2B5EF4-FFF2-40B4-BE49-F238E27FC236}">
+                <a16:creationId xmlns:a16="http://schemas.microsoft.com/office/drawing/2014/main" id="{C8979281-B60D-47B0-B803-1106B83409B9}"/>
+              </a:ext>
+            </a:extLst>
+          </p:cNvPr>
+          <p:cNvSpPr/>
+          <p:nvPr/>
+        </p:nvSpPr>
+        <p:spPr>
+          <a:xfrm>
+            <a:off x="7696569" y="5086891"/>
+            <a:ext cx="3657229" cy="1189037"/>
+          </a:xfrm>
+          <a:prstGeom prst="ellipse">
+            <a:avLst/>
+          </a:prstGeom>
+          <a:noFill/>
+          <a:ln w="38100">
+            <a:solidFill>
+              <a:schemeClr val="tx1">
+                <a:lumMod val="95000"/>
+                <a:lumOff val="5000"/>
+              </a:schemeClr>
+            </a:solidFill>
+          </a:ln>
+        </p:spPr>
+        <p:style>
+          <a:lnRef idx="2">
+            <a:schemeClr val="accent1">
+              <a:shade val="50000"/>
+            </a:schemeClr>
+          </a:lnRef>
+          <a:fillRef idx="1">
+            <a:schemeClr val="accent1"/>
+          </a:fillRef>
+          <a:effectRef idx="0">
+            <a:schemeClr val="accent1"/>
+          </a:effectRef>
+          <a:fontRef idx="minor">
+            <a:schemeClr val="lt1"/>
+          </a:fontRef>
+        </p:style>
+        <p:txBody>
+          <a:bodyPr rtlCol="0" anchor="ctr"/>
+          <a:lstStyle/>
+          <a:p>
+            <a:pPr algn="ctr"/>
+            <a:endParaRPr lang="pt-BR"/>
+          </a:p>
+        </p:txBody>
+      </p:sp>
+      <p:sp>
+        <p:nvSpPr>
+          <p:cNvPr id="15" name="Elipse 14">
+            <a:extLst>
+              <a:ext uri="{FF2B5EF4-FFF2-40B4-BE49-F238E27FC236}">
+                <a16:creationId xmlns:a16="http://schemas.microsoft.com/office/drawing/2014/main" id="{A901681A-32E5-4A2D-9CB9-4F5C934831DB}"/>
+              </a:ext>
+            </a:extLst>
+          </p:cNvPr>
+          <p:cNvSpPr/>
+          <p:nvPr/>
+        </p:nvSpPr>
+        <p:spPr>
+          <a:xfrm>
+            <a:off x="4038600" y="1455938"/>
+            <a:ext cx="3827016" cy="315172"/>
+          </a:xfrm>
+          <a:prstGeom prst="ellipse">
+            <a:avLst/>
+          </a:prstGeom>
+          <a:noFill/>
+          <a:ln w="38100">
+            <a:solidFill>
+              <a:schemeClr val="tx1">
+                <a:lumMod val="95000"/>
+                <a:lumOff val="5000"/>
+              </a:schemeClr>
+            </a:solidFill>
+          </a:ln>
+        </p:spPr>
+        <p:style>
+          <a:lnRef idx="2">
+            <a:schemeClr val="accent1">
+              <a:shade val="50000"/>
+            </a:schemeClr>
+          </a:lnRef>
+          <a:fillRef idx="1">
+            <a:schemeClr val="accent1"/>
+          </a:fillRef>
+          <a:effectRef idx="0">
+            <a:schemeClr val="accent1"/>
+          </a:effectRef>
+          <a:fontRef idx="minor">
+            <a:schemeClr val="lt1"/>
+          </a:fontRef>
+        </p:style>
+        <p:txBody>
+          <a:bodyPr rtlCol="0" anchor="ctr"/>
+          <a:lstStyle/>
+          <a:p>
+            <a:pPr algn="ctr"/>
+            <a:endParaRPr lang="pt-BR"/>
+          </a:p>
+        </p:txBody>
+      </p:sp>
+    </p:spTree>
+    <p:extLst>
+      <p:ext uri="{BB962C8B-B14F-4D97-AF65-F5344CB8AC3E}">
+        <p14:creationId xmlns:p14="http://schemas.microsoft.com/office/powerpoint/2010/main" val="2539671484"/>
+      </p:ext>
+    </p:extLst>
+  </p:cSld>
+  <p:clrMapOvr>
+    <a:masterClrMapping/>
+  </p:clrMapOvr>
+</p:sld>
+</file>
+
+<file path=ppt/slides/slide15.xml><?xml version="1.0" encoding="utf-8"?>
+<p:sld xmlns:a="http://schemas.openxmlformats.org/drawingml/2006/main" xmlns:r="http://schemas.openxmlformats.org/officeDocument/2006/relationships" xmlns:p="http://schemas.openxmlformats.org/presentationml/2006/main">
+  <p:cSld>
+    <p:spTree>
+      <p:nvGrpSpPr>
+        <p:cNvPr id="1" name=""/>
+        <p:cNvGrpSpPr/>
+        <p:nvPr/>
+      </p:nvGrpSpPr>
+      <p:grpSpPr>
+        <a:xfrm>
+          <a:off x="0" y="0"/>
+          <a:ext cx="0" cy="0"/>
+          <a:chOff x="0" y="0"/>
+          <a:chExt cx="0" cy="0"/>
+        </a:xfrm>
+      </p:grpSpPr>
+      <p:sp>
+        <p:nvSpPr>
+          <p:cNvPr id="2" name="Título 1">
+            <a:extLst>
+              <a:ext uri="{FF2B5EF4-FFF2-40B4-BE49-F238E27FC236}">
+                <a16:creationId xmlns:a16="http://schemas.microsoft.com/office/drawing/2014/main" id="{F2CAC9F6-6456-4C88-B679-8859499DC83C}"/>
+              </a:ext>
+            </a:extLst>
+          </p:cNvPr>
+          <p:cNvSpPr>
+            <a:spLocks noGrp="1"/>
+          </p:cNvSpPr>
+          <p:nvPr>
+            <p:ph type="title"/>
+          </p:nvPr>
+        </p:nvSpPr>
+        <p:spPr/>
+        <p:txBody>
+          <a:bodyPr/>
+          <a:lstStyle/>
+          <a:p>
+            <a:r>
+              <a:rPr lang="pt-BR" dirty="0"/>
+              <a:t>Resultados - </a:t>
+            </a:r>
+            <a:r>
+              <a:rPr lang="pt-BR" sz="4400" dirty="0"/>
+              <a:t>https://pf-draw.netlify.app/</a:t>
+            </a:r>
+            <a:endParaRPr lang="pt-BR" dirty="0"/>
+          </a:p>
+        </p:txBody>
+      </p:sp>
+      <p:sp>
+        <p:nvSpPr>
+          <p:cNvPr id="4" name="Espaço Reservado para Data 3">
+            <a:extLst>
+              <a:ext uri="{FF2B5EF4-FFF2-40B4-BE49-F238E27FC236}">
+                <a16:creationId xmlns:a16="http://schemas.microsoft.com/office/drawing/2014/main" id="{FE283D46-9CA0-4CFE-A924-EA57DF7E54D1}"/>
+              </a:ext>
+            </a:extLst>
+          </p:cNvPr>
+          <p:cNvSpPr>
+            <a:spLocks noGrp="1"/>
+          </p:cNvSpPr>
+          <p:nvPr>
+            <p:ph type="dt" sz="half" idx="10"/>
+          </p:nvPr>
+        </p:nvSpPr>
+        <p:spPr/>
+        <p:txBody>
+          <a:bodyPr/>
+          <a:lstStyle/>
+          <a:p>
+            <a:r>
+              <a:rPr lang="pt-BR"/>
+              <a:t>Dezembro 2020</a:t>
+            </a:r>
+            <a:endParaRPr lang="pt-BR" dirty="0"/>
+          </a:p>
+        </p:txBody>
+      </p:sp>
+      <p:sp>
+        <p:nvSpPr>
+          <p:cNvPr id="5" name="Espaço Reservado para Rodapé 4">
+            <a:extLst>
+              <a:ext uri="{FF2B5EF4-FFF2-40B4-BE49-F238E27FC236}">
+                <a16:creationId xmlns:a16="http://schemas.microsoft.com/office/drawing/2014/main" id="{68E5F5AE-398A-4CB1-8C05-AD60C7F6DB9A}"/>
+              </a:ext>
+            </a:extLst>
+          </p:cNvPr>
+          <p:cNvSpPr>
+            <a:spLocks noGrp="1"/>
+          </p:cNvSpPr>
+          <p:nvPr>
+            <p:ph type="ftr" sz="quarter" idx="11"/>
+          </p:nvPr>
+        </p:nvSpPr>
+        <p:spPr/>
+        <p:txBody>
+          <a:bodyPr/>
+          <a:lstStyle/>
+          <a:p>
+            <a:r>
+              <a:rPr lang="pt-BR"/>
+              <a:t>IT743A – Cálculo de Fluxo de Carga</a:t>
+            </a:r>
+            <a:endParaRPr lang="pt-BR" dirty="0"/>
+          </a:p>
+        </p:txBody>
+      </p:sp>
+      <p:sp>
+        <p:nvSpPr>
+          <p:cNvPr id="6" name="Espaço Reservado para Número de Slide 5">
+            <a:extLst>
+              <a:ext uri="{FF2B5EF4-FFF2-40B4-BE49-F238E27FC236}">
+                <a16:creationId xmlns:a16="http://schemas.microsoft.com/office/drawing/2014/main" id="{57FDDF2D-5DA4-4272-9BC5-AE99C89F456D}"/>
+              </a:ext>
+            </a:extLst>
+          </p:cNvPr>
+          <p:cNvSpPr>
+            <a:spLocks noGrp="1"/>
+          </p:cNvSpPr>
+          <p:nvPr>
+            <p:ph type="sldNum" sz="quarter" idx="12"/>
+          </p:nvPr>
+        </p:nvSpPr>
+        <p:spPr/>
+        <p:txBody>
+          <a:bodyPr/>
+          <a:lstStyle/>
+          <a:p>
+            <a:fld id="{8579997A-84E9-4B38-967C-2D4A110C3049}" type="slidenum">
+              <a:rPr lang="pt-BR" smtClean="0"/>
+              <a:t>15</a:t>
+            </a:fld>
+            <a:endParaRPr lang="pt-BR"/>
+          </a:p>
+        </p:txBody>
+      </p:sp>
+      <p:pic>
+        <p:nvPicPr>
+          <p:cNvPr id="7" name="Imagem 6">
+            <a:extLst>
+              <a:ext uri="{FF2B5EF4-FFF2-40B4-BE49-F238E27FC236}">
+                <a16:creationId xmlns:a16="http://schemas.microsoft.com/office/drawing/2014/main" id="{65E01702-0255-469A-9039-5C506ADC5316}"/>
+              </a:ext>
+            </a:extLst>
+          </p:cNvPr>
+          <p:cNvPicPr>
+            <a:picLocks noChangeAspect="1"/>
+          </p:cNvPicPr>
+          <p:nvPr/>
+        </p:nvPicPr>
+        <p:blipFill>
+          <a:blip r:embed="rId2"/>
+          <a:stretch>
+            <a:fillRect/>
+          </a:stretch>
+        </p:blipFill>
+        <p:spPr>
+          <a:xfrm>
+            <a:off x="838200" y="1690688"/>
+            <a:ext cx="3591757" cy="4235837"/>
+          </a:xfrm>
+          <a:prstGeom prst="rect">
+            <a:avLst/>
+          </a:prstGeom>
+        </p:spPr>
+      </p:pic>
+      <p:pic>
+        <p:nvPicPr>
+          <p:cNvPr id="9" name="Imagem 8">
+            <a:extLst>
+              <a:ext uri="{FF2B5EF4-FFF2-40B4-BE49-F238E27FC236}">
+                <a16:creationId xmlns:a16="http://schemas.microsoft.com/office/drawing/2014/main" id="{CA7B31AF-CB6C-4412-BDDF-018075B3B8B1}"/>
+              </a:ext>
+            </a:extLst>
+          </p:cNvPr>
+          <p:cNvPicPr>
+            <a:picLocks noChangeAspect="1"/>
+          </p:cNvPicPr>
+          <p:nvPr/>
+        </p:nvPicPr>
+        <p:blipFill>
+          <a:blip r:embed="rId3"/>
+          <a:stretch>
+            <a:fillRect/>
+          </a:stretch>
+        </p:blipFill>
+        <p:spPr>
+          <a:xfrm>
+            <a:off x="5060597" y="1836554"/>
+            <a:ext cx="6018575" cy="4089971"/>
+          </a:xfrm>
+          <a:prstGeom prst="rect">
+            <a:avLst/>
+          </a:prstGeom>
+        </p:spPr>
+      </p:pic>
+    </p:spTree>
+    <p:extLst>
+      <p:ext uri="{BB962C8B-B14F-4D97-AF65-F5344CB8AC3E}">
+        <p14:creationId xmlns:p14="http://schemas.microsoft.com/office/powerpoint/2010/main" val="2920447263"/>
+      </p:ext>
+    </p:extLst>
+  </p:cSld>
+  <p:clrMapOvr>
+    <a:masterClrMapping/>
+  </p:clrMapOvr>
+</p:sld>
+</file>
+
+<file path=ppt/slides/slide16.xml><?xml version="1.0" encoding="utf-8"?>
+<p:sld xmlns:a="http://schemas.openxmlformats.org/drawingml/2006/main" xmlns:r="http://schemas.openxmlformats.org/officeDocument/2006/relationships" xmlns:p="http://schemas.openxmlformats.org/presentationml/2006/main">
+  <p:cSld>
+    <p:spTree>
+      <p:nvGrpSpPr>
+        <p:cNvPr id="1" name=""/>
+        <p:cNvGrpSpPr/>
+        <p:nvPr/>
+      </p:nvGrpSpPr>
+      <p:grpSpPr>
+        <a:xfrm>
+          <a:off x="0" y="0"/>
+          <a:ext cx="0" cy="0"/>
+          <a:chOff x="0" y="0"/>
+          <a:chExt cx="0" cy="0"/>
+        </a:xfrm>
+      </p:grpSpPr>
+      <p:sp>
+        <p:nvSpPr>
+          <p:cNvPr id="2" name="Título 1">
+            <a:extLst>
+              <a:ext uri="{FF2B5EF4-FFF2-40B4-BE49-F238E27FC236}">
+                <a16:creationId xmlns:a16="http://schemas.microsoft.com/office/drawing/2014/main" id="{F2CAC9F6-6456-4C88-B679-8859499DC83C}"/>
+              </a:ext>
+            </a:extLst>
+          </p:cNvPr>
+          <p:cNvSpPr>
+            <a:spLocks noGrp="1"/>
+          </p:cNvSpPr>
+          <p:nvPr>
+            <p:ph type="title"/>
+          </p:nvPr>
+        </p:nvSpPr>
+        <p:spPr/>
+        <p:txBody>
+          <a:bodyPr/>
+          <a:lstStyle/>
+          <a:p>
+            <a:r>
+              <a:rPr lang="pt-BR" dirty="0"/>
+              <a:t>Resultados - </a:t>
+            </a:r>
+            <a:r>
+              <a:rPr lang="pt-BR" sz="4400" dirty="0"/>
+              <a:t>https://pf-draw.netlify.app/</a:t>
+            </a:r>
+            <a:endParaRPr lang="pt-BR" dirty="0"/>
+          </a:p>
+        </p:txBody>
+      </p:sp>
+      <p:sp>
+        <p:nvSpPr>
+          <p:cNvPr id="4" name="Espaço Reservado para Data 3">
+            <a:extLst>
+              <a:ext uri="{FF2B5EF4-FFF2-40B4-BE49-F238E27FC236}">
+                <a16:creationId xmlns:a16="http://schemas.microsoft.com/office/drawing/2014/main" id="{FE283D46-9CA0-4CFE-A924-EA57DF7E54D1}"/>
+              </a:ext>
+            </a:extLst>
+          </p:cNvPr>
+          <p:cNvSpPr>
+            <a:spLocks noGrp="1"/>
+          </p:cNvSpPr>
+          <p:nvPr>
+            <p:ph type="dt" sz="half" idx="10"/>
+          </p:nvPr>
+        </p:nvSpPr>
+        <p:spPr/>
+        <p:txBody>
+          <a:bodyPr/>
+          <a:lstStyle/>
+          <a:p>
+            <a:r>
+              <a:rPr lang="pt-BR"/>
+              <a:t>Dezembro 2020</a:t>
+            </a:r>
+            <a:endParaRPr lang="pt-BR" dirty="0"/>
+          </a:p>
+        </p:txBody>
+      </p:sp>
+      <p:sp>
+        <p:nvSpPr>
+          <p:cNvPr id="5" name="Espaço Reservado para Rodapé 4">
+            <a:extLst>
+              <a:ext uri="{FF2B5EF4-FFF2-40B4-BE49-F238E27FC236}">
+                <a16:creationId xmlns:a16="http://schemas.microsoft.com/office/drawing/2014/main" id="{68E5F5AE-398A-4CB1-8C05-AD60C7F6DB9A}"/>
+              </a:ext>
+            </a:extLst>
+          </p:cNvPr>
+          <p:cNvSpPr>
+            <a:spLocks noGrp="1"/>
+          </p:cNvSpPr>
+          <p:nvPr>
+            <p:ph type="ftr" sz="quarter" idx="11"/>
+          </p:nvPr>
+        </p:nvSpPr>
+        <p:spPr/>
+        <p:txBody>
+          <a:bodyPr/>
+          <a:lstStyle/>
+          <a:p>
+            <a:r>
+              <a:rPr lang="pt-BR"/>
+              <a:t>IT743A – Cálculo de Fluxo de Carga</a:t>
+            </a:r>
+            <a:endParaRPr lang="pt-BR" dirty="0"/>
+          </a:p>
+        </p:txBody>
+      </p:sp>
+      <p:sp>
+        <p:nvSpPr>
+          <p:cNvPr id="6" name="Espaço Reservado para Número de Slide 5">
+            <a:extLst>
+              <a:ext uri="{FF2B5EF4-FFF2-40B4-BE49-F238E27FC236}">
+                <a16:creationId xmlns:a16="http://schemas.microsoft.com/office/drawing/2014/main" id="{57FDDF2D-5DA4-4272-9BC5-AE99C89F456D}"/>
+              </a:ext>
+            </a:extLst>
+          </p:cNvPr>
+          <p:cNvSpPr>
+            <a:spLocks noGrp="1"/>
+          </p:cNvSpPr>
+          <p:nvPr>
+            <p:ph type="sldNum" sz="quarter" idx="12"/>
+          </p:nvPr>
+        </p:nvSpPr>
+        <p:spPr/>
+        <p:txBody>
+          <a:bodyPr/>
+          <a:lstStyle/>
+          <a:p>
+            <a:fld id="{8579997A-84E9-4B38-967C-2D4A110C3049}" type="slidenum">
+              <a:rPr lang="pt-BR" smtClean="0"/>
+              <a:t>16</a:t>
+            </a:fld>
+            <a:endParaRPr lang="pt-BR"/>
+          </a:p>
+        </p:txBody>
+      </p:sp>
+      <p:pic>
+        <p:nvPicPr>
+          <p:cNvPr id="8" name="Imagem 7">
+            <a:extLst>
+              <a:ext uri="{FF2B5EF4-FFF2-40B4-BE49-F238E27FC236}">
+                <a16:creationId xmlns:a16="http://schemas.microsoft.com/office/drawing/2014/main" id="{CE234FE7-F448-425E-90EE-17D5B357A955}"/>
+              </a:ext>
+            </a:extLst>
+          </p:cNvPr>
+          <p:cNvPicPr>
+            <a:picLocks noChangeAspect="1"/>
+          </p:cNvPicPr>
+          <p:nvPr/>
+        </p:nvPicPr>
+        <p:blipFill>
+          <a:blip r:embed="rId2"/>
+          <a:stretch>
+            <a:fillRect/>
+          </a:stretch>
+        </p:blipFill>
+        <p:spPr>
+          <a:xfrm>
+            <a:off x="2923712" y="1456770"/>
+            <a:ext cx="6344575" cy="2356116"/>
+          </a:xfrm>
+          <a:prstGeom prst="rect">
+            <a:avLst/>
+          </a:prstGeom>
+        </p:spPr>
+      </p:pic>
+      <p:pic>
+        <p:nvPicPr>
+          <p:cNvPr id="11" name="Imagem 10">
+            <a:extLst>
+              <a:ext uri="{FF2B5EF4-FFF2-40B4-BE49-F238E27FC236}">
+                <a16:creationId xmlns:a16="http://schemas.microsoft.com/office/drawing/2014/main" id="{C0B3A731-D06F-490E-A462-EB76E563C99F}"/>
+              </a:ext>
+            </a:extLst>
+          </p:cNvPr>
+          <p:cNvPicPr>
+            <a:picLocks noChangeAspect="1"/>
+          </p:cNvPicPr>
+          <p:nvPr/>
+        </p:nvPicPr>
+        <p:blipFill>
+          <a:blip r:embed="rId3"/>
+          <a:stretch>
+            <a:fillRect/>
+          </a:stretch>
+        </p:blipFill>
+        <p:spPr>
+          <a:xfrm>
+            <a:off x="2757486" y="4003675"/>
+            <a:ext cx="6677025" cy="2352675"/>
+          </a:xfrm>
+          <a:prstGeom prst="rect">
+            <a:avLst/>
+          </a:prstGeom>
+        </p:spPr>
+      </p:pic>
+      <p:cxnSp>
+        <p:nvCxnSpPr>
+          <p:cNvPr id="19" name="Conector: Curvo 18">
+            <a:extLst>
+              <a:ext uri="{FF2B5EF4-FFF2-40B4-BE49-F238E27FC236}">
+                <a16:creationId xmlns:a16="http://schemas.microsoft.com/office/drawing/2014/main" id="{3F55A7C8-1F93-4170-BC55-BB943F046D9E}"/>
+              </a:ext>
+            </a:extLst>
+          </p:cNvPr>
+          <p:cNvCxnSpPr>
+            <a:cxnSpLocks/>
+            <a:stCxn id="8" idx="3"/>
+            <a:endCxn id="11" idx="3"/>
+          </p:cNvCxnSpPr>
+          <p:nvPr/>
+        </p:nvCxnSpPr>
+        <p:spPr>
+          <a:xfrm>
+            <a:off x="9268287" y="2634828"/>
+            <a:ext cx="166224" cy="2545185"/>
+          </a:xfrm>
+          <a:prstGeom prst="curvedConnector3">
+            <a:avLst>
+              <a:gd name="adj1" fmla="val 1011939"/>
+            </a:avLst>
+          </a:prstGeom>
+          <a:ln>
+            <a:tailEnd type="triangle"/>
+          </a:ln>
+        </p:spPr>
+        <p:style>
+          <a:lnRef idx="3">
+            <a:schemeClr val="accent1"/>
+          </a:lnRef>
+          <a:fillRef idx="0">
+            <a:schemeClr val="accent1"/>
+          </a:fillRef>
+          <a:effectRef idx="2">
+            <a:schemeClr val="accent1"/>
+          </a:effectRef>
+          <a:fontRef idx="minor">
+            <a:schemeClr val="tx1"/>
+          </a:fontRef>
+        </p:style>
+      </p:cxnSp>
+    </p:spTree>
+    <p:extLst>
+      <p:ext uri="{BB962C8B-B14F-4D97-AF65-F5344CB8AC3E}">
+        <p14:creationId xmlns:p14="http://schemas.microsoft.com/office/powerpoint/2010/main" val="1623081595"/>
+      </p:ext>
+    </p:extLst>
+  </p:cSld>
+  <p:clrMapOvr>
+    <a:masterClrMapping/>
+  </p:clrMapOvr>
+</p:sld>
+</file>
+
+<file path=ppt/slides/slide17.xml><?xml version="1.0" encoding="utf-8"?>
+<p:sld xmlns:a="http://schemas.openxmlformats.org/drawingml/2006/main" xmlns:r="http://schemas.openxmlformats.org/officeDocument/2006/relationships" xmlns:p="http://schemas.openxmlformats.org/presentationml/2006/main">
+  <p:cSld>
+    <p:spTree>
+      <p:nvGrpSpPr>
+        <p:cNvPr id="1" name=""/>
+        <p:cNvGrpSpPr/>
+        <p:nvPr/>
+      </p:nvGrpSpPr>
+      <p:grpSpPr>
+        <a:xfrm>
+          <a:off x="0" y="0"/>
+          <a:ext cx="0" cy="0"/>
+          <a:chOff x="0" y="0"/>
+          <a:chExt cx="0" cy="0"/>
+        </a:xfrm>
+      </p:grpSpPr>
+      <p:sp>
+        <p:nvSpPr>
+          <p:cNvPr id="2" name="Título 1">
+            <a:extLst>
+              <a:ext uri="{FF2B5EF4-FFF2-40B4-BE49-F238E27FC236}">
+                <a16:creationId xmlns:a16="http://schemas.microsoft.com/office/drawing/2014/main" id="{F2CAC9F6-6456-4C88-B679-8859499DC83C}"/>
+              </a:ext>
+            </a:extLst>
+          </p:cNvPr>
+          <p:cNvSpPr>
+            <a:spLocks noGrp="1"/>
+          </p:cNvSpPr>
+          <p:nvPr>
+            <p:ph type="title"/>
+          </p:nvPr>
+        </p:nvSpPr>
+        <p:spPr/>
+        <p:txBody>
+          <a:bodyPr/>
+          <a:lstStyle/>
+          <a:p>
+            <a:r>
+              <a:rPr lang="pt-BR" dirty="0"/>
+              <a:t>Resultados - </a:t>
+            </a:r>
+            <a:r>
+              <a:rPr lang="pt-BR" sz="4400" dirty="0"/>
+              <a:t>https://pf-draw.netlify.app/</a:t>
+            </a:r>
+            <a:endParaRPr lang="pt-BR" dirty="0"/>
+          </a:p>
+        </p:txBody>
+      </p:sp>
+      <p:sp>
+        <p:nvSpPr>
+          <p:cNvPr id="4" name="Espaço Reservado para Data 3">
+            <a:extLst>
+              <a:ext uri="{FF2B5EF4-FFF2-40B4-BE49-F238E27FC236}">
+                <a16:creationId xmlns:a16="http://schemas.microsoft.com/office/drawing/2014/main" id="{FE283D46-9CA0-4CFE-A924-EA57DF7E54D1}"/>
+              </a:ext>
+            </a:extLst>
+          </p:cNvPr>
+          <p:cNvSpPr>
+            <a:spLocks noGrp="1"/>
+          </p:cNvSpPr>
+          <p:nvPr>
+            <p:ph type="dt" sz="half" idx="10"/>
+          </p:nvPr>
+        </p:nvSpPr>
+        <p:spPr/>
+        <p:txBody>
+          <a:bodyPr/>
+          <a:lstStyle/>
+          <a:p>
+            <a:r>
+              <a:rPr lang="pt-BR"/>
+              <a:t>Dezembro 2020</a:t>
+            </a:r>
+            <a:endParaRPr lang="pt-BR" dirty="0"/>
+          </a:p>
+        </p:txBody>
+      </p:sp>
+      <p:sp>
+        <p:nvSpPr>
+          <p:cNvPr id="5" name="Espaço Reservado para Rodapé 4">
+            <a:extLst>
+              <a:ext uri="{FF2B5EF4-FFF2-40B4-BE49-F238E27FC236}">
+                <a16:creationId xmlns:a16="http://schemas.microsoft.com/office/drawing/2014/main" id="{68E5F5AE-398A-4CB1-8C05-AD60C7F6DB9A}"/>
+              </a:ext>
+            </a:extLst>
+          </p:cNvPr>
+          <p:cNvSpPr>
+            <a:spLocks noGrp="1"/>
+          </p:cNvSpPr>
+          <p:nvPr>
+            <p:ph type="ftr" sz="quarter" idx="11"/>
+          </p:nvPr>
+        </p:nvSpPr>
+        <p:spPr/>
+        <p:txBody>
+          <a:bodyPr/>
+          <a:lstStyle/>
+          <a:p>
+            <a:r>
+              <a:rPr lang="pt-BR"/>
+              <a:t>IT743A – Cálculo de Fluxo de Carga</a:t>
+            </a:r>
+            <a:endParaRPr lang="pt-BR" dirty="0"/>
+          </a:p>
+        </p:txBody>
+      </p:sp>
+      <p:sp>
+        <p:nvSpPr>
+          <p:cNvPr id="6" name="Espaço Reservado para Número de Slide 5">
+            <a:extLst>
+              <a:ext uri="{FF2B5EF4-FFF2-40B4-BE49-F238E27FC236}">
+                <a16:creationId xmlns:a16="http://schemas.microsoft.com/office/drawing/2014/main" id="{57FDDF2D-5DA4-4272-9BC5-AE99C89F456D}"/>
+              </a:ext>
+            </a:extLst>
+          </p:cNvPr>
+          <p:cNvSpPr>
+            <a:spLocks noGrp="1"/>
+          </p:cNvSpPr>
+          <p:nvPr>
+            <p:ph type="sldNum" sz="quarter" idx="12"/>
+          </p:nvPr>
+        </p:nvSpPr>
+        <p:spPr/>
+        <p:txBody>
+          <a:bodyPr/>
+          <a:lstStyle/>
+          <a:p>
+            <a:fld id="{8579997A-84E9-4B38-967C-2D4A110C3049}" type="slidenum">
+              <a:rPr lang="pt-BR" smtClean="0"/>
+              <a:t>17</a:t>
+            </a:fld>
+            <a:endParaRPr lang="pt-BR"/>
+          </a:p>
+        </p:txBody>
+      </p:sp>
+      <p:pic>
+        <p:nvPicPr>
+          <p:cNvPr id="7" name="Imagem 6">
+            <a:extLst>
+              <a:ext uri="{FF2B5EF4-FFF2-40B4-BE49-F238E27FC236}">
+                <a16:creationId xmlns:a16="http://schemas.microsoft.com/office/drawing/2014/main" id="{B3924481-1448-48D4-B095-242895B8495E}"/>
+              </a:ext>
+            </a:extLst>
+          </p:cNvPr>
+          <p:cNvPicPr>
+            <a:picLocks noChangeAspect="1"/>
+          </p:cNvPicPr>
+          <p:nvPr/>
+        </p:nvPicPr>
+        <p:blipFill>
+          <a:blip r:embed="rId2"/>
+          <a:stretch>
+            <a:fillRect/>
+          </a:stretch>
+        </p:blipFill>
+        <p:spPr>
+          <a:xfrm>
+            <a:off x="951760" y="1315953"/>
+            <a:ext cx="10288480" cy="5040397"/>
+          </a:xfrm>
+          <a:prstGeom prst="rect">
+            <a:avLst/>
+          </a:prstGeom>
+        </p:spPr>
+      </p:pic>
+      <p:sp>
+        <p:nvSpPr>
+          <p:cNvPr id="9" name="CaixaDeTexto 8">
+            <a:extLst>
+              <a:ext uri="{FF2B5EF4-FFF2-40B4-BE49-F238E27FC236}">
+                <a16:creationId xmlns:a16="http://schemas.microsoft.com/office/drawing/2014/main" id="{48D4274D-35B8-44EF-95E0-3E3C30D3D9F7}"/>
+              </a:ext>
+            </a:extLst>
+          </p:cNvPr>
+          <p:cNvSpPr txBox="1"/>
+          <p:nvPr/>
+        </p:nvSpPr>
+        <p:spPr>
+          <a:xfrm>
+            <a:off x="1083076" y="1899821"/>
+            <a:ext cx="3107184" cy="1200329"/>
+          </a:xfrm>
+          <a:prstGeom prst="rect">
+            <a:avLst/>
+          </a:prstGeom>
+          <a:noFill/>
+        </p:spPr>
+        <p:txBody>
+          <a:bodyPr wrap="square" rtlCol="0">
+            <a:spAutoFit/>
+          </a:bodyPr>
+          <a:lstStyle/>
+          <a:p>
+            <a:r>
+              <a:rPr lang="pt-BR" dirty="0"/>
+              <a:t>Solução Newton-</a:t>
+            </a:r>
+            <a:r>
+              <a:rPr lang="pt-BR" dirty="0" err="1"/>
+              <a:t>Raphson</a:t>
+            </a:r>
+            <a:r>
+              <a:rPr lang="pt-BR" dirty="0"/>
+              <a:t>: convergência 0.001 </a:t>
+            </a:r>
+          </a:p>
+          <a:p>
+            <a:r>
+              <a:rPr lang="pt-BR" dirty="0"/>
+              <a:t>8 iterações </a:t>
+            </a:r>
+          </a:p>
+          <a:p>
+            <a:r>
+              <a:rPr lang="pt-BR" dirty="0"/>
+              <a:t>96s</a:t>
+            </a:r>
+          </a:p>
+        </p:txBody>
+      </p:sp>
+    </p:spTree>
+    <p:extLst>
+      <p:ext uri="{BB962C8B-B14F-4D97-AF65-F5344CB8AC3E}">
+        <p14:creationId xmlns:p14="http://schemas.microsoft.com/office/powerpoint/2010/main" val="3335406736"/>
+      </p:ext>
+    </p:extLst>
+  </p:cSld>
+  <p:clrMapOvr>
+    <a:masterClrMapping/>
+  </p:clrMapOvr>
+</p:sld>
+</file>
+
+<file path=ppt/slides/slide18.xml><?xml version="1.0" encoding="utf-8"?>
+<p:sld xmlns:a="http://schemas.openxmlformats.org/drawingml/2006/main" xmlns:r="http://schemas.openxmlformats.org/officeDocument/2006/relationships" xmlns:p="http://schemas.openxmlformats.org/presentationml/2006/main">
+  <p:cSld>
+    <p:spTree>
+      <p:nvGrpSpPr>
+        <p:cNvPr id="1" name=""/>
+        <p:cNvGrpSpPr/>
+        <p:nvPr/>
+      </p:nvGrpSpPr>
+      <p:grpSpPr>
+        <a:xfrm>
+          <a:off x="0" y="0"/>
+          <a:ext cx="0" cy="0"/>
+          <a:chOff x="0" y="0"/>
+          <a:chExt cx="0" cy="0"/>
+        </a:xfrm>
+      </p:grpSpPr>
+      <p:sp>
+        <p:nvSpPr>
+          <p:cNvPr id="2" name="Título 1">
+            <a:extLst>
+              <a:ext uri="{FF2B5EF4-FFF2-40B4-BE49-F238E27FC236}">
+                <a16:creationId xmlns:a16="http://schemas.microsoft.com/office/drawing/2014/main" id="{F2CAC9F6-6456-4C88-B679-8859499DC83C}"/>
+              </a:ext>
+            </a:extLst>
+          </p:cNvPr>
+          <p:cNvSpPr>
+            <a:spLocks noGrp="1"/>
+          </p:cNvSpPr>
+          <p:nvPr>
+            <p:ph type="title"/>
+          </p:nvPr>
+        </p:nvSpPr>
+        <p:spPr/>
+        <p:txBody>
+          <a:bodyPr/>
+          <a:lstStyle/>
+          <a:p>
+            <a:r>
+              <a:rPr lang="pt-BR" dirty="0"/>
+              <a:t>Resultados - </a:t>
+            </a:r>
+            <a:r>
+              <a:rPr lang="pt-BR" sz="4400" dirty="0"/>
+              <a:t>https://pf-draw.netlify.app/</a:t>
+            </a:r>
+            <a:endParaRPr lang="pt-BR" dirty="0"/>
+          </a:p>
+        </p:txBody>
+      </p:sp>
+      <p:sp>
+        <p:nvSpPr>
+          <p:cNvPr id="4" name="Espaço Reservado para Data 3">
+            <a:extLst>
+              <a:ext uri="{FF2B5EF4-FFF2-40B4-BE49-F238E27FC236}">
+                <a16:creationId xmlns:a16="http://schemas.microsoft.com/office/drawing/2014/main" id="{FE283D46-9CA0-4CFE-A924-EA57DF7E54D1}"/>
+              </a:ext>
+            </a:extLst>
+          </p:cNvPr>
+          <p:cNvSpPr>
+            <a:spLocks noGrp="1"/>
+          </p:cNvSpPr>
+          <p:nvPr>
+            <p:ph type="dt" sz="half" idx="10"/>
+          </p:nvPr>
+        </p:nvSpPr>
+        <p:spPr/>
+        <p:txBody>
+          <a:bodyPr/>
+          <a:lstStyle/>
+          <a:p>
+            <a:r>
+              <a:rPr lang="pt-BR"/>
+              <a:t>Dezembro 2020</a:t>
+            </a:r>
+            <a:endParaRPr lang="pt-BR" dirty="0"/>
+          </a:p>
+        </p:txBody>
+      </p:sp>
+      <p:sp>
+        <p:nvSpPr>
+          <p:cNvPr id="5" name="Espaço Reservado para Rodapé 4">
+            <a:extLst>
+              <a:ext uri="{FF2B5EF4-FFF2-40B4-BE49-F238E27FC236}">
+                <a16:creationId xmlns:a16="http://schemas.microsoft.com/office/drawing/2014/main" id="{68E5F5AE-398A-4CB1-8C05-AD60C7F6DB9A}"/>
+              </a:ext>
+            </a:extLst>
+          </p:cNvPr>
+          <p:cNvSpPr>
+            <a:spLocks noGrp="1"/>
+          </p:cNvSpPr>
+          <p:nvPr>
+            <p:ph type="ftr" sz="quarter" idx="11"/>
+          </p:nvPr>
+        </p:nvSpPr>
+        <p:spPr/>
+        <p:txBody>
+          <a:bodyPr/>
+          <a:lstStyle/>
+          <a:p>
+            <a:r>
+              <a:rPr lang="pt-BR"/>
+              <a:t>IT743A – Cálculo de Fluxo de Carga</a:t>
+            </a:r>
+            <a:endParaRPr lang="pt-BR" dirty="0"/>
+          </a:p>
+        </p:txBody>
+      </p:sp>
+      <p:sp>
+        <p:nvSpPr>
+          <p:cNvPr id="6" name="Espaço Reservado para Número de Slide 5">
+            <a:extLst>
+              <a:ext uri="{FF2B5EF4-FFF2-40B4-BE49-F238E27FC236}">
+                <a16:creationId xmlns:a16="http://schemas.microsoft.com/office/drawing/2014/main" id="{57FDDF2D-5DA4-4272-9BC5-AE99C89F456D}"/>
+              </a:ext>
+            </a:extLst>
+          </p:cNvPr>
+          <p:cNvSpPr>
+            <a:spLocks noGrp="1"/>
+          </p:cNvSpPr>
+          <p:nvPr>
+            <p:ph type="sldNum" sz="quarter" idx="12"/>
+          </p:nvPr>
+        </p:nvSpPr>
+        <p:spPr/>
+        <p:txBody>
+          <a:bodyPr/>
+          <a:lstStyle/>
+          <a:p>
+            <a:fld id="{8579997A-84E9-4B38-967C-2D4A110C3049}" type="slidenum">
+              <a:rPr lang="pt-BR" smtClean="0"/>
+              <a:t>18</a:t>
+            </a:fld>
+            <a:endParaRPr lang="pt-BR"/>
+          </a:p>
+        </p:txBody>
+      </p:sp>
+    </p:spTree>
+    <p:extLst>
+      <p:ext uri="{BB962C8B-B14F-4D97-AF65-F5344CB8AC3E}">
+        <p14:creationId xmlns:p14="http://schemas.microsoft.com/office/powerpoint/2010/main" val="2416041880"/>
+      </p:ext>
+    </p:extLst>
+  </p:cSld>
+  <p:clrMapOvr>
+    <a:masterClrMapping/>
+  </p:clrMapOvr>
+</p:sld>
+</file>
+
+<file path=ppt/slides/slide19.xml><?xml version="1.0" encoding="utf-8"?>
+<p:sld xmlns:a="http://schemas.openxmlformats.org/drawingml/2006/main" xmlns:r="http://schemas.openxmlformats.org/officeDocument/2006/relationships" xmlns:p="http://schemas.openxmlformats.org/presentationml/2006/main">
+  <p:cSld>
+    <p:spTree>
+      <p:nvGrpSpPr>
+        <p:cNvPr id="1" name=""/>
+        <p:cNvGrpSpPr/>
+        <p:nvPr/>
+      </p:nvGrpSpPr>
+      <p:grpSpPr>
+        <a:xfrm>
+          <a:off x="0" y="0"/>
+          <a:ext cx="0" cy="0"/>
+          <a:chOff x="0" y="0"/>
+          <a:chExt cx="0" cy="0"/>
+        </a:xfrm>
+      </p:grpSpPr>
+      <p:sp>
+        <p:nvSpPr>
+          <p:cNvPr id="2" name="Título 1">
+            <a:extLst>
+              <a:ext uri="{FF2B5EF4-FFF2-40B4-BE49-F238E27FC236}">
+                <a16:creationId xmlns:a16="http://schemas.microsoft.com/office/drawing/2014/main" id="{CFA6E98A-AF6F-42BC-B7DB-FD47DF996443}"/>
+              </a:ext>
+            </a:extLst>
+          </p:cNvPr>
+          <p:cNvSpPr>
+            <a:spLocks noGrp="1"/>
+          </p:cNvSpPr>
+          <p:nvPr>
+            <p:ph type="ctrTitle"/>
+          </p:nvPr>
+        </p:nvSpPr>
+        <p:spPr/>
+        <p:txBody>
+          <a:bodyPr/>
+          <a:lstStyle/>
+          <a:p>
+            <a:r>
+              <a:rPr lang="pt-BR" dirty="0"/>
+              <a:t>Obrigado</a:t>
+            </a:r>
+          </a:p>
+        </p:txBody>
+      </p:sp>
+      <p:sp>
+        <p:nvSpPr>
+          <p:cNvPr id="3" name="Subtítulo 2">
+            <a:extLst>
+              <a:ext uri="{FF2B5EF4-FFF2-40B4-BE49-F238E27FC236}">
+                <a16:creationId xmlns:a16="http://schemas.microsoft.com/office/drawing/2014/main" id="{3F713850-308C-4930-9724-203064F7C0F3}"/>
+              </a:ext>
+            </a:extLst>
+          </p:cNvPr>
+          <p:cNvSpPr>
+            <a:spLocks noGrp="1"/>
+          </p:cNvSpPr>
+          <p:nvPr>
+            <p:ph type="subTitle" idx="1"/>
+          </p:nvPr>
+        </p:nvSpPr>
+        <p:spPr/>
+        <p:txBody>
+          <a:bodyPr/>
+          <a:lstStyle/>
+          <a:p>
+            <a:r>
+              <a:rPr lang="pt-BR" dirty="0"/>
+              <a:t>Filipe Salles de Oliveira, RA149175</a:t>
+            </a:r>
+          </a:p>
+        </p:txBody>
+      </p:sp>
+      <p:sp>
+        <p:nvSpPr>
+          <p:cNvPr id="4" name="Espaço Reservado para Data 3">
+            <a:extLst>
+              <a:ext uri="{FF2B5EF4-FFF2-40B4-BE49-F238E27FC236}">
+                <a16:creationId xmlns:a16="http://schemas.microsoft.com/office/drawing/2014/main" id="{50E58847-6EFB-4351-AC1E-B07E1C420F6C}"/>
+              </a:ext>
+            </a:extLst>
+          </p:cNvPr>
+          <p:cNvSpPr>
+            <a:spLocks noGrp="1"/>
+          </p:cNvSpPr>
+          <p:nvPr>
+            <p:ph type="dt" sz="half" idx="10"/>
+          </p:nvPr>
+        </p:nvSpPr>
+        <p:spPr/>
+        <p:txBody>
+          <a:bodyPr/>
+          <a:lstStyle/>
+          <a:p>
+            <a:r>
+              <a:rPr lang="pt-BR"/>
+              <a:t>Agosto 2020</a:t>
+            </a:r>
+            <a:endParaRPr lang="pt-BR" dirty="0"/>
+          </a:p>
+        </p:txBody>
+      </p:sp>
+      <p:sp>
+        <p:nvSpPr>
+          <p:cNvPr id="5" name="Espaço Reservado para Rodapé 4">
+            <a:extLst>
+              <a:ext uri="{FF2B5EF4-FFF2-40B4-BE49-F238E27FC236}">
+                <a16:creationId xmlns:a16="http://schemas.microsoft.com/office/drawing/2014/main" id="{B7C099FE-113D-41D8-B79E-7034BA4D1DC3}"/>
+              </a:ext>
+            </a:extLst>
+          </p:cNvPr>
+          <p:cNvSpPr>
+            <a:spLocks noGrp="1"/>
+          </p:cNvSpPr>
+          <p:nvPr>
+            <p:ph type="ftr" sz="quarter" idx="11"/>
+          </p:nvPr>
+        </p:nvSpPr>
+        <p:spPr/>
+        <p:txBody>
+          <a:bodyPr/>
+          <a:lstStyle/>
+          <a:p>
+            <a:r>
+              <a:rPr lang="pt-BR"/>
+              <a:t>IT306V - Tópicos de Curto-circuito e Princípios de Proteção</a:t>
+            </a:r>
+            <a:endParaRPr lang="pt-BR" dirty="0"/>
+          </a:p>
+        </p:txBody>
+      </p:sp>
+      <p:sp>
+        <p:nvSpPr>
+          <p:cNvPr id="6" name="Espaço Reservado para Número de Slide 5">
+            <a:extLst>
+              <a:ext uri="{FF2B5EF4-FFF2-40B4-BE49-F238E27FC236}">
+                <a16:creationId xmlns:a16="http://schemas.microsoft.com/office/drawing/2014/main" id="{D0C1D071-DC3E-4FD7-9FC6-B475EC70188D}"/>
+              </a:ext>
+            </a:extLst>
+          </p:cNvPr>
+          <p:cNvSpPr>
+            <a:spLocks noGrp="1"/>
+          </p:cNvSpPr>
+          <p:nvPr>
+            <p:ph type="sldNum" sz="quarter" idx="12"/>
+          </p:nvPr>
+        </p:nvSpPr>
+        <p:spPr/>
+        <p:txBody>
+          <a:bodyPr/>
+          <a:lstStyle/>
+          <a:p>
+            <a:fld id="{8579997A-84E9-4B38-967C-2D4A110C3049}" type="slidenum">
+              <a:rPr lang="pt-BR" smtClean="0"/>
+              <a:t>19</a:t>
+            </a:fld>
+            <a:endParaRPr lang="pt-BR"/>
+          </a:p>
+        </p:txBody>
+      </p:sp>
+    </p:spTree>
+    <p:extLst>
+      <p:ext uri="{BB962C8B-B14F-4D97-AF65-F5344CB8AC3E}">
+        <p14:creationId xmlns:p14="http://schemas.microsoft.com/office/powerpoint/2010/main" val="1732845947"/>
+      </p:ext>
+    </p:extLst>
+  </p:cSld>
+  <p:clrMapOvr>
+    <a:masterClrMapping/>
+  </p:clrMapOvr>
+</p:sld>
+</file>
+
 <file path=ppt/slides/slide2.xml><?xml version="1.0" encoding="utf-8"?>
 <p:sld xmlns:a="http://schemas.openxmlformats.org/drawingml/2006/main" xmlns:r="http://schemas.openxmlformats.org/officeDocument/2006/relationships" xmlns:p="http://schemas.openxmlformats.org/presentationml/2006/main">
   <p:cSld>
@@ -3140,37 +5238,12 @@
           <a:p>
             <a:r>
               <a:rPr lang="pt-BR" dirty="0"/>
-              <a:t>Funcionamento - </a:t>
-            </a:r>
-            <a:r>
-              <a:rPr lang="pt-BR" sz="4400" dirty="0"/>
+              <a:t>Entrada de Dados - </a:t>
+            </a:r>
+            <a:r>
+              <a:rPr lang="pt-BR" sz="4000" dirty="0"/>
               <a:t>https://pf-draw.netlify.app/</a:t>
             </a:r>
-            <a:endParaRPr lang="pt-BR" dirty="0"/>
-          </a:p>
-        </p:txBody>
-      </p:sp>
-      <p:sp>
-        <p:nvSpPr>
-          <p:cNvPr id="3" name="Espaço Reservado para Conteúdo 2">
-            <a:extLst>
-              <a:ext uri="{FF2B5EF4-FFF2-40B4-BE49-F238E27FC236}">
-                <a16:creationId xmlns:a16="http://schemas.microsoft.com/office/drawing/2014/main" id="{71E91782-D379-499A-83A4-9B378FE9C267}"/>
-              </a:ext>
-            </a:extLst>
-          </p:cNvPr>
-          <p:cNvSpPr>
-            <a:spLocks noGrp="1"/>
-          </p:cNvSpPr>
-          <p:nvPr>
-            <p:ph idx="1"/>
-          </p:nvPr>
-        </p:nvSpPr>
-        <p:spPr/>
-        <p:txBody>
-          <a:bodyPr/>
-          <a:lstStyle/>
-          <a:p>
             <a:endParaRPr lang="pt-BR" dirty="0"/>
           </a:p>
         </p:txBody>
@@ -3262,10 +5335,40 @@
           </a:p>
         </p:txBody>
       </p:sp>
+      <p:pic>
+        <p:nvPicPr>
+          <p:cNvPr id="7" name="Imagem 6">
+            <a:extLst>
+              <a:ext uri="{FF2B5EF4-FFF2-40B4-BE49-F238E27FC236}">
+                <a16:creationId xmlns:a16="http://schemas.microsoft.com/office/drawing/2014/main" id="{BE92575B-6DFF-4762-9F2B-840B1DC0D4E2}"/>
+              </a:ext>
+            </a:extLst>
+          </p:cNvPr>
+          <p:cNvPicPr>
+            <a:picLocks noChangeAspect="1"/>
+          </p:cNvPicPr>
+          <p:nvPr/>
+        </p:nvPicPr>
+        <p:blipFill>
+          <a:blip r:embed="rId2"/>
+          <a:stretch>
+            <a:fillRect/>
+          </a:stretch>
+        </p:blipFill>
+        <p:spPr>
+          <a:xfrm>
+            <a:off x="3674485" y="1690688"/>
+            <a:ext cx="4843030" cy="4447528"/>
+          </a:xfrm>
+          <a:prstGeom prst="rect">
+            <a:avLst/>
+          </a:prstGeom>
+        </p:spPr>
+      </p:pic>
     </p:spTree>
     <p:extLst>
       <p:ext uri="{BB962C8B-B14F-4D97-AF65-F5344CB8AC3E}">
-        <p14:creationId xmlns:p14="http://schemas.microsoft.com/office/powerpoint/2010/main" val="1407305316"/>
+        <p14:creationId xmlns:p14="http://schemas.microsoft.com/office/powerpoint/2010/main" val="3412803639"/>
       </p:ext>
     </p:extLst>
   </p:cSld>
@@ -3297,15 +5400,15 @@
           <p:cNvPr id="2" name="Título 1">
             <a:extLst>
               <a:ext uri="{FF2B5EF4-FFF2-40B4-BE49-F238E27FC236}">
-                <a16:creationId xmlns:a16="http://schemas.microsoft.com/office/drawing/2014/main" id="{CFA6E98A-AF6F-42BC-B7DB-FD47DF996443}"/>
-              </a:ext>
-            </a:extLst>
-          </p:cNvPr>
-          <p:cNvSpPr>
-            <a:spLocks noGrp="1"/>
-          </p:cNvSpPr>
-          <p:nvPr>
-            <p:ph type="ctrTitle"/>
+                <a16:creationId xmlns:a16="http://schemas.microsoft.com/office/drawing/2014/main" id="{F2CAC9F6-6456-4C88-B679-8859499DC83C}"/>
+              </a:ext>
+            </a:extLst>
+          </p:cNvPr>
+          <p:cNvSpPr>
+            <a:spLocks noGrp="1"/>
+          </p:cNvSpPr>
+          <p:nvPr>
+            <p:ph type="title"/>
           </p:nvPr>
         </p:nvSpPr>
         <p:spPr/>
@@ -3315,36 +5418,13 @@
           <a:p>
             <a:r>
               <a:rPr lang="pt-BR" dirty="0"/>
-              <a:t>Obrigado</a:t>
-            </a:r>
-          </a:p>
-        </p:txBody>
-      </p:sp>
-      <p:sp>
-        <p:nvSpPr>
-          <p:cNvPr id="3" name="Subtítulo 2">
-            <a:extLst>
-              <a:ext uri="{FF2B5EF4-FFF2-40B4-BE49-F238E27FC236}">
-                <a16:creationId xmlns:a16="http://schemas.microsoft.com/office/drawing/2014/main" id="{3F713850-308C-4930-9724-203064F7C0F3}"/>
-              </a:ext>
-            </a:extLst>
-          </p:cNvPr>
-          <p:cNvSpPr>
-            <a:spLocks noGrp="1"/>
-          </p:cNvSpPr>
-          <p:nvPr>
-            <p:ph type="subTitle" idx="1"/>
-          </p:nvPr>
-        </p:nvSpPr>
-        <p:spPr/>
-        <p:txBody>
-          <a:bodyPr/>
-          <a:lstStyle/>
-          <a:p>
-            <a:r>
-              <a:rPr lang="pt-BR" dirty="0"/>
-              <a:t>Filipe Salles de Oliveira, RA149175</a:t>
-            </a:r>
+              <a:t>Entrada de Dados - </a:t>
+            </a:r>
+            <a:r>
+              <a:rPr lang="pt-BR" sz="4000" dirty="0"/>
+              <a:t>https://pf-draw.netlify.app/</a:t>
+            </a:r>
+            <a:endParaRPr lang="pt-BR" dirty="0"/>
           </a:p>
         </p:txBody>
       </p:sp>
@@ -3353,7 +5433,7 @@
           <p:cNvPr id="4" name="Espaço Reservado para Data 3">
             <a:extLst>
               <a:ext uri="{FF2B5EF4-FFF2-40B4-BE49-F238E27FC236}">
-                <a16:creationId xmlns:a16="http://schemas.microsoft.com/office/drawing/2014/main" id="{50E58847-6EFB-4351-AC1E-B07E1C420F6C}"/>
+                <a16:creationId xmlns:a16="http://schemas.microsoft.com/office/drawing/2014/main" id="{FE283D46-9CA0-4CFE-A924-EA57DF7E54D1}"/>
               </a:ext>
             </a:extLst>
           </p:cNvPr>
@@ -3371,7 +5451,7 @@
           <a:p>
             <a:r>
               <a:rPr lang="pt-BR"/>
-              <a:t>Agosto 2020</a:t>
+              <a:t>Dezembro 2020</a:t>
             </a:r>
             <a:endParaRPr lang="pt-BR" dirty="0"/>
           </a:p>
@@ -3382,7 +5462,7 @@
           <p:cNvPr id="5" name="Espaço Reservado para Rodapé 4">
             <a:extLst>
               <a:ext uri="{FF2B5EF4-FFF2-40B4-BE49-F238E27FC236}">
-                <a16:creationId xmlns:a16="http://schemas.microsoft.com/office/drawing/2014/main" id="{B7C099FE-113D-41D8-B79E-7034BA4D1DC3}"/>
+                <a16:creationId xmlns:a16="http://schemas.microsoft.com/office/drawing/2014/main" id="{68E5F5AE-398A-4CB1-8C05-AD60C7F6DB9A}"/>
               </a:ext>
             </a:extLst>
           </p:cNvPr>
@@ -3400,7 +5480,7 @@
           <a:p>
             <a:r>
               <a:rPr lang="pt-BR"/>
-              <a:t>IT306V - Tópicos de Curto-circuito e Princípios de Proteção</a:t>
+              <a:t>IT743A – Cálculo de Fluxo de Carga</a:t>
             </a:r>
             <a:endParaRPr lang="pt-BR" dirty="0"/>
           </a:p>
@@ -3411,7 +5491,7 @@
           <p:cNvPr id="6" name="Espaço Reservado para Número de Slide 5">
             <a:extLst>
               <a:ext uri="{FF2B5EF4-FFF2-40B4-BE49-F238E27FC236}">
-                <a16:creationId xmlns:a16="http://schemas.microsoft.com/office/drawing/2014/main" id="{D0C1D071-DC3E-4FD7-9FC6-B475EC70188D}"/>
+                <a16:creationId xmlns:a16="http://schemas.microsoft.com/office/drawing/2014/main" id="{57FDDF2D-5DA4-4272-9BC5-AE99C89F456D}"/>
               </a:ext>
             </a:extLst>
           </p:cNvPr>
@@ -3435,10 +5515,40 @@
           </a:p>
         </p:txBody>
       </p:sp>
+      <p:pic>
+        <p:nvPicPr>
+          <p:cNvPr id="8" name="Imagem 7">
+            <a:extLst>
+              <a:ext uri="{FF2B5EF4-FFF2-40B4-BE49-F238E27FC236}">
+                <a16:creationId xmlns:a16="http://schemas.microsoft.com/office/drawing/2014/main" id="{289AEDD7-8A73-4865-82CB-7B891711202D}"/>
+              </a:ext>
+            </a:extLst>
+          </p:cNvPr>
+          <p:cNvPicPr>
+            <a:picLocks noChangeAspect="1"/>
+          </p:cNvPicPr>
+          <p:nvPr/>
+        </p:nvPicPr>
+        <p:blipFill>
+          <a:blip r:embed="rId2"/>
+          <a:stretch>
+            <a:fillRect/>
+          </a:stretch>
+        </p:blipFill>
+        <p:spPr>
+          <a:xfrm>
+            <a:off x="3666482" y="1495378"/>
+            <a:ext cx="4859035" cy="4738687"/>
+          </a:xfrm>
+          <a:prstGeom prst="rect">
+            <a:avLst/>
+          </a:prstGeom>
+        </p:spPr>
+      </p:pic>
     </p:spTree>
     <p:extLst>
       <p:ext uri="{BB962C8B-B14F-4D97-AF65-F5344CB8AC3E}">
-        <p14:creationId xmlns:p14="http://schemas.microsoft.com/office/powerpoint/2010/main" val="1732845947"/>
+        <p14:creationId xmlns:p14="http://schemas.microsoft.com/office/powerpoint/2010/main" val="2107978857"/>
       </p:ext>
     </p:extLst>
   </p:cSld>

</xml_diff>

<commit_message>
corrigido exemplo e bug show_iterations
</commit_message>
<xml_diff>
--- a/public/ppt/RA149175_FSO_Rel_slides_rev1.pptx
+++ b/public/ppt/RA149175_FSO_Rel_slides_rev1.pptx
@@ -5,10 +5,10 @@
     <p:sldMasterId id="2147483660" r:id="rId1"/>
   </p:sldMasterIdLst>
   <p:notesMasterIdLst>
-    <p:notesMasterId r:id="rId26"/>
+    <p:notesMasterId r:id="rId34"/>
   </p:notesMasterIdLst>
   <p:handoutMasterIdLst>
-    <p:handoutMasterId r:id="rId27"/>
+    <p:handoutMasterId r:id="rId35"/>
   </p:handoutMasterIdLst>
   <p:sldIdLst>
     <p:sldId id="345" r:id="rId2"/>
@@ -22,19 +22,27 @@
     <p:sldId id="354" r:id="rId10"/>
     <p:sldId id="355" r:id="rId11"/>
     <p:sldId id="356" r:id="rId12"/>
-    <p:sldId id="357" r:id="rId13"/>
-    <p:sldId id="351" r:id="rId14"/>
-    <p:sldId id="360" r:id="rId15"/>
-    <p:sldId id="358" r:id="rId16"/>
-    <p:sldId id="359" r:id="rId17"/>
-    <p:sldId id="361" r:id="rId18"/>
-    <p:sldId id="362" r:id="rId19"/>
-    <p:sldId id="363" r:id="rId20"/>
-    <p:sldId id="366" r:id="rId21"/>
-    <p:sldId id="368" r:id="rId22"/>
-    <p:sldId id="372" r:id="rId23"/>
-    <p:sldId id="370" r:id="rId24"/>
-    <p:sldId id="344" r:id="rId25"/>
+    <p:sldId id="373" r:id="rId13"/>
+    <p:sldId id="374" r:id="rId14"/>
+    <p:sldId id="376" r:id="rId15"/>
+    <p:sldId id="375" r:id="rId16"/>
+    <p:sldId id="357" r:id="rId17"/>
+    <p:sldId id="351" r:id="rId18"/>
+    <p:sldId id="360" r:id="rId19"/>
+    <p:sldId id="358" r:id="rId20"/>
+    <p:sldId id="359" r:id="rId21"/>
+    <p:sldId id="361" r:id="rId22"/>
+    <p:sldId id="362" r:id="rId23"/>
+    <p:sldId id="363" r:id="rId24"/>
+    <p:sldId id="366" r:id="rId25"/>
+    <p:sldId id="368" r:id="rId26"/>
+    <p:sldId id="372" r:id="rId27"/>
+    <p:sldId id="370" r:id="rId28"/>
+    <p:sldId id="377" r:id="rId29"/>
+    <p:sldId id="378" r:id="rId30"/>
+    <p:sldId id="379" r:id="rId31"/>
+    <p:sldId id="380" r:id="rId32"/>
+    <p:sldId id="344" r:id="rId33"/>
   </p:sldIdLst>
   <p:sldSz cx="12192000" cy="6858000"/>
   <p:notesSz cx="6858000" cy="9144000"/>
@@ -2263,6 +2271,951 @@
       </p:sp>
       <p:pic>
         <p:nvPicPr>
+          <p:cNvPr id="7" name="Imagem 6">
+            <a:extLst>
+              <a:ext uri="{FF2B5EF4-FFF2-40B4-BE49-F238E27FC236}">
+                <a16:creationId xmlns:a16="http://schemas.microsoft.com/office/drawing/2014/main" id="{AA2253AD-5EFC-49E1-8505-0E9408C32928}"/>
+              </a:ext>
+            </a:extLst>
+          </p:cNvPr>
+          <p:cNvPicPr>
+            <a:picLocks noChangeAspect="1"/>
+          </p:cNvPicPr>
+          <p:nvPr/>
+        </p:nvPicPr>
+        <p:blipFill>
+          <a:blip r:embed="rId2"/>
+          <a:stretch>
+            <a:fillRect/>
+          </a:stretch>
+        </p:blipFill>
+        <p:spPr>
+          <a:xfrm>
+            <a:off x="1057922" y="1564525"/>
+            <a:ext cx="10076155" cy="543210"/>
+          </a:xfrm>
+          <a:prstGeom prst="rect">
+            <a:avLst/>
+          </a:prstGeom>
+        </p:spPr>
+      </p:pic>
+      <p:pic>
+        <p:nvPicPr>
+          <p:cNvPr id="10" name="Imagem 9">
+            <a:extLst>
+              <a:ext uri="{FF2B5EF4-FFF2-40B4-BE49-F238E27FC236}">
+                <a16:creationId xmlns:a16="http://schemas.microsoft.com/office/drawing/2014/main" id="{5AE1BDD7-AC7C-486D-B1D3-C8138F6CE812}"/>
+              </a:ext>
+            </a:extLst>
+          </p:cNvPr>
+          <p:cNvPicPr>
+            <a:picLocks noChangeAspect="1"/>
+          </p:cNvPicPr>
+          <p:nvPr/>
+        </p:nvPicPr>
+        <p:blipFill>
+          <a:blip r:embed="rId3"/>
+          <a:stretch>
+            <a:fillRect/>
+          </a:stretch>
+        </p:blipFill>
+        <p:spPr>
+          <a:xfrm>
+            <a:off x="2295524" y="2349966"/>
+            <a:ext cx="7600950" cy="2400300"/>
+          </a:xfrm>
+          <a:prstGeom prst="rect">
+            <a:avLst/>
+          </a:prstGeom>
+        </p:spPr>
+      </p:pic>
+    </p:spTree>
+    <p:extLst>
+      <p:ext uri="{BB962C8B-B14F-4D97-AF65-F5344CB8AC3E}">
+        <p14:creationId xmlns:p14="http://schemas.microsoft.com/office/powerpoint/2010/main" val="657178164"/>
+      </p:ext>
+    </p:extLst>
+  </p:cSld>
+  <p:clrMapOvr>
+    <a:masterClrMapping/>
+  </p:clrMapOvr>
+</p:sld>
+</file>
+
+<file path=ppt/slides/slide13.xml><?xml version="1.0" encoding="utf-8"?>
+<p:sld xmlns:a="http://schemas.openxmlformats.org/drawingml/2006/main" xmlns:r="http://schemas.openxmlformats.org/officeDocument/2006/relationships" xmlns:p="http://schemas.openxmlformats.org/presentationml/2006/main">
+  <p:cSld>
+    <p:spTree>
+      <p:nvGrpSpPr>
+        <p:cNvPr id="1" name=""/>
+        <p:cNvGrpSpPr/>
+        <p:nvPr/>
+      </p:nvGrpSpPr>
+      <p:grpSpPr>
+        <a:xfrm>
+          <a:off x="0" y="0"/>
+          <a:ext cx="0" cy="0"/>
+          <a:chOff x="0" y="0"/>
+          <a:chExt cx="0" cy="0"/>
+        </a:xfrm>
+      </p:grpSpPr>
+      <p:sp>
+        <p:nvSpPr>
+          <p:cNvPr id="2" name="Título 1">
+            <a:extLst>
+              <a:ext uri="{FF2B5EF4-FFF2-40B4-BE49-F238E27FC236}">
+                <a16:creationId xmlns:a16="http://schemas.microsoft.com/office/drawing/2014/main" id="{F2CAC9F6-6456-4C88-B679-8859499DC83C}"/>
+              </a:ext>
+            </a:extLst>
+          </p:cNvPr>
+          <p:cNvSpPr>
+            <a:spLocks noGrp="1"/>
+          </p:cNvSpPr>
+          <p:nvPr>
+            <p:ph type="title"/>
+          </p:nvPr>
+        </p:nvSpPr>
+        <p:spPr/>
+        <p:txBody>
+          <a:bodyPr/>
+          <a:lstStyle/>
+          <a:p>
+            <a:r>
+              <a:rPr lang="pt-BR" dirty="0"/>
+              <a:t>Entrada de Dados - </a:t>
+            </a:r>
+            <a:r>
+              <a:rPr lang="pt-BR" sz="4000" dirty="0"/>
+              <a:t>https://pf-draw.netlify.app/</a:t>
+            </a:r>
+            <a:endParaRPr lang="pt-BR" dirty="0"/>
+          </a:p>
+        </p:txBody>
+      </p:sp>
+      <p:sp>
+        <p:nvSpPr>
+          <p:cNvPr id="4" name="Espaço Reservado para Data 3">
+            <a:extLst>
+              <a:ext uri="{FF2B5EF4-FFF2-40B4-BE49-F238E27FC236}">
+                <a16:creationId xmlns:a16="http://schemas.microsoft.com/office/drawing/2014/main" id="{FE283D46-9CA0-4CFE-A924-EA57DF7E54D1}"/>
+              </a:ext>
+            </a:extLst>
+          </p:cNvPr>
+          <p:cNvSpPr>
+            <a:spLocks noGrp="1"/>
+          </p:cNvSpPr>
+          <p:nvPr>
+            <p:ph type="dt" sz="half" idx="10"/>
+          </p:nvPr>
+        </p:nvSpPr>
+        <p:spPr/>
+        <p:txBody>
+          <a:bodyPr/>
+          <a:lstStyle/>
+          <a:p>
+            <a:r>
+              <a:rPr lang="pt-BR"/>
+              <a:t>Dezembro 2020</a:t>
+            </a:r>
+            <a:endParaRPr lang="pt-BR" dirty="0"/>
+          </a:p>
+        </p:txBody>
+      </p:sp>
+      <p:sp>
+        <p:nvSpPr>
+          <p:cNvPr id="5" name="Espaço Reservado para Rodapé 4">
+            <a:extLst>
+              <a:ext uri="{FF2B5EF4-FFF2-40B4-BE49-F238E27FC236}">
+                <a16:creationId xmlns:a16="http://schemas.microsoft.com/office/drawing/2014/main" id="{68E5F5AE-398A-4CB1-8C05-AD60C7F6DB9A}"/>
+              </a:ext>
+            </a:extLst>
+          </p:cNvPr>
+          <p:cNvSpPr>
+            <a:spLocks noGrp="1"/>
+          </p:cNvSpPr>
+          <p:nvPr>
+            <p:ph type="ftr" sz="quarter" idx="11"/>
+          </p:nvPr>
+        </p:nvSpPr>
+        <p:spPr/>
+        <p:txBody>
+          <a:bodyPr/>
+          <a:lstStyle/>
+          <a:p>
+            <a:r>
+              <a:rPr lang="pt-BR"/>
+              <a:t>IT743A – Cálculo de Fluxo de Carga</a:t>
+            </a:r>
+            <a:endParaRPr lang="pt-BR" dirty="0"/>
+          </a:p>
+        </p:txBody>
+      </p:sp>
+      <p:sp>
+        <p:nvSpPr>
+          <p:cNvPr id="6" name="Espaço Reservado para Número de Slide 5">
+            <a:extLst>
+              <a:ext uri="{FF2B5EF4-FFF2-40B4-BE49-F238E27FC236}">
+                <a16:creationId xmlns:a16="http://schemas.microsoft.com/office/drawing/2014/main" id="{57FDDF2D-5DA4-4272-9BC5-AE99C89F456D}"/>
+              </a:ext>
+            </a:extLst>
+          </p:cNvPr>
+          <p:cNvSpPr>
+            <a:spLocks noGrp="1"/>
+          </p:cNvSpPr>
+          <p:nvPr>
+            <p:ph type="sldNum" sz="quarter" idx="12"/>
+          </p:nvPr>
+        </p:nvSpPr>
+        <p:spPr/>
+        <p:txBody>
+          <a:bodyPr/>
+          <a:lstStyle/>
+          <a:p>
+            <a:fld id="{8579997A-84E9-4B38-967C-2D4A110C3049}" type="slidenum">
+              <a:rPr lang="pt-BR" smtClean="0"/>
+              <a:t>13</a:t>
+            </a:fld>
+            <a:endParaRPr lang="pt-BR"/>
+          </a:p>
+        </p:txBody>
+      </p:sp>
+      <p:sp>
+        <p:nvSpPr>
+          <p:cNvPr id="9" name="CaixaDeTexto 8">
+            <a:extLst>
+              <a:ext uri="{FF2B5EF4-FFF2-40B4-BE49-F238E27FC236}">
+                <a16:creationId xmlns:a16="http://schemas.microsoft.com/office/drawing/2014/main" id="{DE3FCAAC-54C3-41E9-897B-3138DC3902BF}"/>
+              </a:ext>
+            </a:extLst>
+          </p:cNvPr>
+          <p:cNvSpPr txBox="1"/>
+          <p:nvPr/>
+        </p:nvSpPr>
+        <p:spPr>
+          <a:xfrm>
+            <a:off x="4503198" y="5987018"/>
+            <a:ext cx="6094520" cy="369332"/>
+          </a:xfrm>
+          <a:prstGeom prst="rect">
+            <a:avLst/>
+          </a:prstGeom>
+          <a:noFill/>
+        </p:spPr>
+        <p:txBody>
+          <a:bodyPr wrap="square">
+            <a:spAutoFit/>
+          </a:bodyPr>
+          <a:lstStyle/>
+          <a:p>
+            <a:r>
+              <a:rPr lang="pt-BR" dirty="0"/>
+              <a:t>https://labs.ece.uw.edu/pstca/</a:t>
+            </a:r>
+          </a:p>
+        </p:txBody>
+      </p:sp>
+      <p:pic>
+        <p:nvPicPr>
+          <p:cNvPr id="11" name="Imagem 10">
+            <a:extLst>
+              <a:ext uri="{FF2B5EF4-FFF2-40B4-BE49-F238E27FC236}">
+                <a16:creationId xmlns:a16="http://schemas.microsoft.com/office/drawing/2014/main" id="{22D1FAC0-FCB7-4513-819E-05B27B745C88}"/>
+              </a:ext>
+            </a:extLst>
+          </p:cNvPr>
+          <p:cNvPicPr>
+            <a:picLocks noChangeAspect="1"/>
+          </p:cNvPicPr>
+          <p:nvPr/>
+        </p:nvPicPr>
+        <p:blipFill>
+          <a:blip r:embed="rId2"/>
+          <a:stretch>
+            <a:fillRect/>
+          </a:stretch>
+        </p:blipFill>
+        <p:spPr>
+          <a:xfrm>
+            <a:off x="767179" y="2117694"/>
+            <a:ext cx="3917527" cy="2622612"/>
+          </a:xfrm>
+          <a:prstGeom prst="rect">
+            <a:avLst/>
+          </a:prstGeom>
+        </p:spPr>
+      </p:pic>
+      <p:pic>
+        <p:nvPicPr>
+          <p:cNvPr id="15" name="Imagem 14">
+            <a:extLst>
+              <a:ext uri="{FF2B5EF4-FFF2-40B4-BE49-F238E27FC236}">
+                <a16:creationId xmlns:a16="http://schemas.microsoft.com/office/drawing/2014/main" id="{E60D2AE7-FEAE-43C5-AA22-E88550C9DAB8}"/>
+              </a:ext>
+            </a:extLst>
+          </p:cNvPr>
+          <p:cNvPicPr>
+            <a:picLocks noChangeAspect="1"/>
+          </p:cNvPicPr>
+          <p:nvPr/>
+        </p:nvPicPr>
+        <p:blipFill>
+          <a:blip r:embed="rId3"/>
+          <a:stretch>
+            <a:fillRect/>
+          </a:stretch>
+        </p:blipFill>
+        <p:spPr>
+          <a:xfrm>
+            <a:off x="4673638" y="1506022"/>
+            <a:ext cx="6959523" cy="4480996"/>
+          </a:xfrm>
+          <a:prstGeom prst="rect">
+            <a:avLst/>
+          </a:prstGeom>
+        </p:spPr>
+      </p:pic>
+    </p:spTree>
+    <p:extLst>
+      <p:ext uri="{BB962C8B-B14F-4D97-AF65-F5344CB8AC3E}">
+        <p14:creationId xmlns:p14="http://schemas.microsoft.com/office/powerpoint/2010/main" val="1490291075"/>
+      </p:ext>
+    </p:extLst>
+  </p:cSld>
+  <p:clrMapOvr>
+    <a:masterClrMapping/>
+  </p:clrMapOvr>
+</p:sld>
+</file>
+
+<file path=ppt/slides/slide14.xml><?xml version="1.0" encoding="utf-8"?>
+<p:sld xmlns:a="http://schemas.openxmlformats.org/drawingml/2006/main" xmlns:r="http://schemas.openxmlformats.org/officeDocument/2006/relationships" xmlns:p="http://schemas.openxmlformats.org/presentationml/2006/main">
+  <p:cSld>
+    <p:spTree>
+      <p:nvGrpSpPr>
+        <p:cNvPr id="1" name=""/>
+        <p:cNvGrpSpPr/>
+        <p:nvPr/>
+      </p:nvGrpSpPr>
+      <p:grpSpPr>
+        <a:xfrm>
+          <a:off x="0" y="0"/>
+          <a:ext cx="0" cy="0"/>
+          <a:chOff x="0" y="0"/>
+          <a:chExt cx="0" cy="0"/>
+        </a:xfrm>
+      </p:grpSpPr>
+      <p:sp>
+        <p:nvSpPr>
+          <p:cNvPr id="2" name="Título 1">
+            <a:extLst>
+              <a:ext uri="{FF2B5EF4-FFF2-40B4-BE49-F238E27FC236}">
+                <a16:creationId xmlns:a16="http://schemas.microsoft.com/office/drawing/2014/main" id="{F2CAC9F6-6456-4C88-B679-8859499DC83C}"/>
+              </a:ext>
+            </a:extLst>
+          </p:cNvPr>
+          <p:cNvSpPr>
+            <a:spLocks noGrp="1"/>
+          </p:cNvSpPr>
+          <p:nvPr>
+            <p:ph type="title"/>
+          </p:nvPr>
+        </p:nvSpPr>
+        <p:spPr/>
+        <p:txBody>
+          <a:bodyPr/>
+          <a:lstStyle/>
+          <a:p>
+            <a:r>
+              <a:rPr lang="pt-BR" dirty="0"/>
+              <a:t>Entrada de Dados - </a:t>
+            </a:r>
+            <a:r>
+              <a:rPr lang="pt-BR" sz="4000" dirty="0"/>
+              <a:t>https://pf-draw.netlify.app/</a:t>
+            </a:r>
+            <a:endParaRPr lang="pt-BR" dirty="0"/>
+          </a:p>
+        </p:txBody>
+      </p:sp>
+      <p:sp>
+        <p:nvSpPr>
+          <p:cNvPr id="4" name="Espaço Reservado para Data 3">
+            <a:extLst>
+              <a:ext uri="{FF2B5EF4-FFF2-40B4-BE49-F238E27FC236}">
+                <a16:creationId xmlns:a16="http://schemas.microsoft.com/office/drawing/2014/main" id="{FE283D46-9CA0-4CFE-A924-EA57DF7E54D1}"/>
+              </a:ext>
+            </a:extLst>
+          </p:cNvPr>
+          <p:cNvSpPr>
+            <a:spLocks noGrp="1"/>
+          </p:cNvSpPr>
+          <p:nvPr>
+            <p:ph type="dt" sz="half" idx="10"/>
+          </p:nvPr>
+        </p:nvSpPr>
+        <p:spPr/>
+        <p:txBody>
+          <a:bodyPr/>
+          <a:lstStyle/>
+          <a:p>
+            <a:r>
+              <a:rPr lang="pt-BR"/>
+              <a:t>Dezembro 2020</a:t>
+            </a:r>
+            <a:endParaRPr lang="pt-BR" dirty="0"/>
+          </a:p>
+        </p:txBody>
+      </p:sp>
+      <p:sp>
+        <p:nvSpPr>
+          <p:cNvPr id="5" name="Espaço Reservado para Rodapé 4">
+            <a:extLst>
+              <a:ext uri="{FF2B5EF4-FFF2-40B4-BE49-F238E27FC236}">
+                <a16:creationId xmlns:a16="http://schemas.microsoft.com/office/drawing/2014/main" id="{68E5F5AE-398A-4CB1-8C05-AD60C7F6DB9A}"/>
+              </a:ext>
+            </a:extLst>
+          </p:cNvPr>
+          <p:cNvSpPr>
+            <a:spLocks noGrp="1"/>
+          </p:cNvSpPr>
+          <p:nvPr>
+            <p:ph type="ftr" sz="quarter" idx="11"/>
+          </p:nvPr>
+        </p:nvSpPr>
+        <p:spPr/>
+        <p:txBody>
+          <a:bodyPr/>
+          <a:lstStyle/>
+          <a:p>
+            <a:r>
+              <a:rPr lang="pt-BR"/>
+              <a:t>IT743A – Cálculo de Fluxo de Carga</a:t>
+            </a:r>
+            <a:endParaRPr lang="pt-BR" dirty="0"/>
+          </a:p>
+        </p:txBody>
+      </p:sp>
+      <p:sp>
+        <p:nvSpPr>
+          <p:cNvPr id="6" name="Espaço Reservado para Número de Slide 5">
+            <a:extLst>
+              <a:ext uri="{FF2B5EF4-FFF2-40B4-BE49-F238E27FC236}">
+                <a16:creationId xmlns:a16="http://schemas.microsoft.com/office/drawing/2014/main" id="{57FDDF2D-5DA4-4272-9BC5-AE99C89F456D}"/>
+              </a:ext>
+            </a:extLst>
+          </p:cNvPr>
+          <p:cNvSpPr>
+            <a:spLocks noGrp="1"/>
+          </p:cNvSpPr>
+          <p:nvPr>
+            <p:ph type="sldNum" sz="quarter" idx="12"/>
+          </p:nvPr>
+        </p:nvSpPr>
+        <p:spPr/>
+        <p:txBody>
+          <a:bodyPr/>
+          <a:lstStyle/>
+          <a:p>
+            <a:fld id="{8579997A-84E9-4B38-967C-2D4A110C3049}" type="slidenum">
+              <a:rPr lang="pt-BR" smtClean="0"/>
+              <a:t>14</a:t>
+            </a:fld>
+            <a:endParaRPr lang="pt-BR"/>
+          </a:p>
+        </p:txBody>
+      </p:sp>
+      <p:sp>
+        <p:nvSpPr>
+          <p:cNvPr id="9" name="CaixaDeTexto 8">
+            <a:extLst>
+              <a:ext uri="{FF2B5EF4-FFF2-40B4-BE49-F238E27FC236}">
+                <a16:creationId xmlns:a16="http://schemas.microsoft.com/office/drawing/2014/main" id="{DE3FCAAC-54C3-41E9-897B-3138DC3902BF}"/>
+              </a:ext>
+            </a:extLst>
+          </p:cNvPr>
+          <p:cNvSpPr txBox="1"/>
+          <p:nvPr/>
+        </p:nvSpPr>
+        <p:spPr>
+          <a:xfrm>
+            <a:off x="4503198" y="5987018"/>
+            <a:ext cx="6094520" cy="369332"/>
+          </a:xfrm>
+          <a:prstGeom prst="rect">
+            <a:avLst/>
+          </a:prstGeom>
+          <a:noFill/>
+        </p:spPr>
+        <p:txBody>
+          <a:bodyPr wrap="square">
+            <a:spAutoFit/>
+          </a:bodyPr>
+          <a:lstStyle/>
+          <a:p>
+            <a:r>
+              <a:rPr lang="pt-BR" dirty="0"/>
+              <a:t>https://labs.ece.uw.edu/pstca/</a:t>
+            </a:r>
+          </a:p>
+        </p:txBody>
+      </p:sp>
+      <p:pic>
+        <p:nvPicPr>
+          <p:cNvPr id="7" name="Imagem 6">
+            <a:extLst>
+              <a:ext uri="{FF2B5EF4-FFF2-40B4-BE49-F238E27FC236}">
+                <a16:creationId xmlns:a16="http://schemas.microsoft.com/office/drawing/2014/main" id="{435EEFB5-E1BF-4199-AD20-637523C4762B}"/>
+              </a:ext>
+            </a:extLst>
+          </p:cNvPr>
+          <p:cNvPicPr>
+            <a:picLocks noChangeAspect="1"/>
+          </p:cNvPicPr>
+          <p:nvPr/>
+        </p:nvPicPr>
+        <p:blipFill>
+          <a:blip r:embed="rId2"/>
+          <a:stretch>
+            <a:fillRect/>
+          </a:stretch>
+        </p:blipFill>
+        <p:spPr>
+          <a:xfrm>
+            <a:off x="609600" y="1530304"/>
+            <a:ext cx="4163879" cy="4091589"/>
+          </a:xfrm>
+          <a:prstGeom prst="rect">
+            <a:avLst/>
+          </a:prstGeom>
+        </p:spPr>
+      </p:pic>
+      <p:pic>
+        <p:nvPicPr>
+          <p:cNvPr id="12" name="Imagem 11">
+            <a:extLst>
+              <a:ext uri="{FF2B5EF4-FFF2-40B4-BE49-F238E27FC236}">
+                <a16:creationId xmlns:a16="http://schemas.microsoft.com/office/drawing/2014/main" id="{B848FE9F-338E-439B-B0EC-22B3653C4D96}"/>
+              </a:ext>
+            </a:extLst>
+          </p:cNvPr>
+          <p:cNvPicPr>
+            <a:picLocks noChangeAspect="1"/>
+          </p:cNvPicPr>
+          <p:nvPr/>
+        </p:nvPicPr>
+        <p:blipFill>
+          <a:blip r:embed="rId3"/>
+          <a:stretch>
+            <a:fillRect/>
+          </a:stretch>
+        </p:blipFill>
+        <p:spPr>
+          <a:xfrm>
+            <a:off x="4895580" y="1413689"/>
+            <a:ext cx="6959523" cy="4480996"/>
+          </a:xfrm>
+          <a:prstGeom prst="rect">
+            <a:avLst/>
+          </a:prstGeom>
+        </p:spPr>
+      </p:pic>
+    </p:spTree>
+    <p:extLst>
+      <p:ext uri="{BB962C8B-B14F-4D97-AF65-F5344CB8AC3E}">
+        <p14:creationId xmlns:p14="http://schemas.microsoft.com/office/powerpoint/2010/main" val="183758378"/>
+      </p:ext>
+    </p:extLst>
+  </p:cSld>
+  <p:clrMapOvr>
+    <a:masterClrMapping/>
+  </p:clrMapOvr>
+</p:sld>
+</file>
+
+<file path=ppt/slides/slide15.xml><?xml version="1.0" encoding="utf-8"?>
+<p:sld xmlns:a="http://schemas.openxmlformats.org/drawingml/2006/main" xmlns:r="http://schemas.openxmlformats.org/officeDocument/2006/relationships" xmlns:p="http://schemas.openxmlformats.org/presentationml/2006/main">
+  <p:cSld>
+    <p:spTree>
+      <p:nvGrpSpPr>
+        <p:cNvPr id="1" name=""/>
+        <p:cNvGrpSpPr/>
+        <p:nvPr/>
+      </p:nvGrpSpPr>
+      <p:grpSpPr>
+        <a:xfrm>
+          <a:off x="0" y="0"/>
+          <a:ext cx="0" cy="0"/>
+          <a:chOff x="0" y="0"/>
+          <a:chExt cx="0" cy="0"/>
+        </a:xfrm>
+      </p:grpSpPr>
+      <p:sp>
+        <p:nvSpPr>
+          <p:cNvPr id="2" name="Título 1">
+            <a:extLst>
+              <a:ext uri="{FF2B5EF4-FFF2-40B4-BE49-F238E27FC236}">
+                <a16:creationId xmlns:a16="http://schemas.microsoft.com/office/drawing/2014/main" id="{F2CAC9F6-6456-4C88-B679-8859499DC83C}"/>
+              </a:ext>
+            </a:extLst>
+          </p:cNvPr>
+          <p:cNvSpPr>
+            <a:spLocks noGrp="1"/>
+          </p:cNvSpPr>
+          <p:nvPr>
+            <p:ph type="title"/>
+          </p:nvPr>
+        </p:nvSpPr>
+        <p:spPr/>
+        <p:txBody>
+          <a:bodyPr/>
+          <a:lstStyle/>
+          <a:p>
+            <a:r>
+              <a:rPr lang="pt-BR" dirty="0"/>
+              <a:t>Entrada de Dados - </a:t>
+            </a:r>
+            <a:r>
+              <a:rPr lang="pt-BR" sz="4000" dirty="0"/>
+              <a:t>https://pf-draw.netlify.app/</a:t>
+            </a:r>
+            <a:endParaRPr lang="pt-BR" dirty="0"/>
+          </a:p>
+        </p:txBody>
+      </p:sp>
+      <p:sp>
+        <p:nvSpPr>
+          <p:cNvPr id="4" name="Espaço Reservado para Data 3">
+            <a:extLst>
+              <a:ext uri="{FF2B5EF4-FFF2-40B4-BE49-F238E27FC236}">
+                <a16:creationId xmlns:a16="http://schemas.microsoft.com/office/drawing/2014/main" id="{FE283D46-9CA0-4CFE-A924-EA57DF7E54D1}"/>
+              </a:ext>
+            </a:extLst>
+          </p:cNvPr>
+          <p:cNvSpPr>
+            <a:spLocks noGrp="1"/>
+          </p:cNvSpPr>
+          <p:nvPr>
+            <p:ph type="dt" sz="half" idx="10"/>
+          </p:nvPr>
+        </p:nvSpPr>
+        <p:spPr/>
+        <p:txBody>
+          <a:bodyPr/>
+          <a:lstStyle/>
+          <a:p>
+            <a:r>
+              <a:rPr lang="pt-BR"/>
+              <a:t>Dezembro 2020</a:t>
+            </a:r>
+            <a:endParaRPr lang="pt-BR" dirty="0"/>
+          </a:p>
+        </p:txBody>
+      </p:sp>
+      <p:sp>
+        <p:nvSpPr>
+          <p:cNvPr id="5" name="Espaço Reservado para Rodapé 4">
+            <a:extLst>
+              <a:ext uri="{FF2B5EF4-FFF2-40B4-BE49-F238E27FC236}">
+                <a16:creationId xmlns:a16="http://schemas.microsoft.com/office/drawing/2014/main" id="{68E5F5AE-398A-4CB1-8C05-AD60C7F6DB9A}"/>
+              </a:ext>
+            </a:extLst>
+          </p:cNvPr>
+          <p:cNvSpPr>
+            <a:spLocks noGrp="1"/>
+          </p:cNvSpPr>
+          <p:nvPr>
+            <p:ph type="ftr" sz="quarter" idx="11"/>
+          </p:nvPr>
+        </p:nvSpPr>
+        <p:spPr/>
+        <p:txBody>
+          <a:bodyPr/>
+          <a:lstStyle/>
+          <a:p>
+            <a:r>
+              <a:rPr lang="pt-BR"/>
+              <a:t>IT743A – Cálculo de Fluxo de Carga</a:t>
+            </a:r>
+            <a:endParaRPr lang="pt-BR" dirty="0"/>
+          </a:p>
+        </p:txBody>
+      </p:sp>
+      <p:sp>
+        <p:nvSpPr>
+          <p:cNvPr id="6" name="Espaço Reservado para Número de Slide 5">
+            <a:extLst>
+              <a:ext uri="{FF2B5EF4-FFF2-40B4-BE49-F238E27FC236}">
+                <a16:creationId xmlns:a16="http://schemas.microsoft.com/office/drawing/2014/main" id="{57FDDF2D-5DA4-4272-9BC5-AE99C89F456D}"/>
+              </a:ext>
+            </a:extLst>
+          </p:cNvPr>
+          <p:cNvSpPr>
+            <a:spLocks noGrp="1"/>
+          </p:cNvSpPr>
+          <p:nvPr>
+            <p:ph type="sldNum" sz="quarter" idx="12"/>
+          </p:nvPr>
+        </p:nvSpPr>
+        <p:spPr/>
+        <p:txBody>
+          <a:bodyPr/>
+          <a:lstStyle/>
+          <a:p>
+            <a:fld id="{8579997A-84E9-4B38-967C-2D4A110C3049}" type="slidenum">
+              <a:rPr lang="pt-BR" smtClean="0"/>
+              <a:t>15</a:t>
+            </a:fld>
+            <a:endParaRPr lang="pt-BR"/>
+          </a:p>
+        </p:txBody>
+      </p:sp>
+      <p:sp>
+        <p:nvSpPr>
+          <p:cNvPr id="9" name="CaixaDeTexto 8">
+            <a:extLst>
+              <a:ext uri="{FF2B5EF4-FFF2-40B4-BE49-F238E27FC236}">
+                <a16:creationId xmlns:a16="http://schemas.microsoft.com/office/drawing/2014/main" id="{DE3FCAAC-54C3-41E9-897B-3138DC3902BF}"/>
+              </a:ext>
+            </a:extLst>
+          </p:cNvPr>
+          <p:cNvSpPr txBox="1"/>
+          <p:nvPr/>
+        </p:nvSpPr>
+        <p:spPr>
+          <a:xfrm>
+            <a:off x="4503198" y="5987018"/>
+            <a:ext cx="6094520" cy="369332"/>
+          </a:xfrm>
+          <a:prstGeom prst="rect">
+            <a:avLst/>
+          </a:prstGeom>
+          <a:noFill/>
+        </p:spPr>
+        <p:txBody>
+          <a:bodyPr wrap="square">
+            <a:spAutoFit/>
+          </a:bodyPr>
+          <a:lstStyle/>
+          <a:p>
+            <a:r>
+              <a:rPr lang="pt-BR" dirty="0"/>
+              <a:t>https://labs.ece.uw.edu/pstca/</a:t>
+            </a:r>
+          </a:p>
+        </p:txBody>
+      </p:sp>
+      <p:pic>
+        <p:nvPicPr>
+          <p:cNvPr id="7" name="Imagem 6">
+            <a:extLst>
+              <a:ext uri="{FF2B5EF4-FFF2-40B4-BE49-F238E27FC236}">
+                <a16:creationId xmlns:a16="http://schemas.microsoft.com/office/drawing/2014/main" id="{F499F996-CA1B-47BC-B860-62D7EE6694E6}"/>
+              </a:ext>
+            </a:extLst>
+          </p:cNvPr>
+          <p:cNvPicPr>
+            <a:picLocks noChangeAspect="1"/>
+          </p:cNvPicPr>
+          <p:nvPr/>
+        </p:nvPicPr>
+        <p:blipFill>
+          <a:blip r:embed="rId2"/>
+          <a:stretch>
+            <a:fillRect/>
+          </a:stretch>
+        </p:blipFill>
+        <p:spPr>
+          <a:xfrm>
+            <a:off x="6339581" y="1654084"/>
+            <a:ext cx="5200650" cy="3962400"/>
+          </a:xfrm>
+          <a:prstGeom prst="rect">
+            <a:avLst/>
+          </a:prstGeom>
+        </p:spPr>
+      </p:pic>
+      <p:pic>
+        <p:nvPicPr>
+          <p:cNvPr id="10" name="Imagem 9">
+            <a:extLst>
+              <a:ext uri="{FF2B5EF4-FFF2-40B4-BE49-F238E27FC236}">
+                <a16:creationId xmlns:a16="http://schemas.microsoft.com/office/drawing/2014/main" id="{8CCAFA5F-72FD-4F2A-8F53-FDF540DAAE06}"/>
+              </a:ext>
+            </a:extLst>
+          </p:cNvPr>
+          <p:cNvPicPr>
+            <a:picLocks noChangeAspect="1"/>
+          </p:cNvPicPr>
+          <p:nvPr/>
+        </p:nvPicPr>
+        <p:blipFill>
+          <a:blip r:embed="rId3"/>
+          <a:stretch>
+            <a:fillRect/>
+          </a:stretch>
+        </p:blipFill>
+        <p:spPr>
+          <a:xfrm>
+            <a:off x="838200" y="1473738"/>
+            <a:ext cx="4284216" cy="4323092"/>
+          </a:xfrm>
+          <a:prstGeom prst="rect">
+            <a:avLst/>
+          </a:prstGeom>
+        </p:spPr>
+      </p:pic>
+    </p:spTree>
+    <p:extLst>
+      <p:ext uri="{BB962C8B-B14F-4D97-AF65-F5344CB8AC3E}">
+        <p14:creationId xmlns:p14="http://schemas.microsoft.com/office/powerpoint/2010/main" val="3520755766"/>
+      </p:ext>
+    </p:extLst>
+  </p:cSld>
+  <p:clrMapOvr>
+    <a:masterClrMapping/>
+  </p:clrMapOvr>
+</p:sld>
+</file>
+
+<file path=ppt/slides/slide16.xml><?xml version="1.0" encoding="utf-8"?>
+<p:sld xmlns:a="http://schemas.openxmlformats.org/drawingml/2006/main" xmlns:r="http://schemas.openxmlformats.org/officeDocument/2006/relationships" xmlns:p="http://schemas.openxmlformats.org/presentationml/2006/main">
+  <p:cSld>
+    <p:spTree>
+      <p:nvGrpSpPr>
+        <p:cNvPr id="1" name=""/>
+        <p:cNvGrpSpPr/>
+        <p:nvPr/>
+      </p:nvGrpSpPr>
+      <p:grpSpPr>
+        <a:xfrm>
+          <a:off x="0" y="0"/>
+          <a:ext cx="0" cy="0"/>
+          <a:chOff x="0" y="0"/>
+          <a:chExt cx="0" cy="0"/>
+        </a:xfrm>
+      </p:grpSpPr>
+      <p:sp>
+        <p:nvSpPr>
+          <p:cNvPr id="2" name="Título 1">
+            <a:extLst>
+              <a:ext uri="{FF2B5EF4-FFF2-40B4-BE49-F238E27FC236}">
+                <a16:creationId xmlns:a16="http://schemas.microsoft.com/office/drawing/2014/main" id="{F2CAC9F6-6456-4C88-B679-8859499DC83C}"/>
+              </a:ext>
+            </a:extLst>
+          </p:cNvPr>
+          <p:cNvSpPr>
+            <a:spLocks noGrp="1"/>
+          </p:cNvSpPr>
+          <p:nvPr>
+            <p:ph type="title"/>
+          </p:nvPr>
+        </p:nvSpPr>
+        <p:spPr/>
+        <p:txBody>
+          <a:bodyPr/>
+          <a:lstStyle/>
+          <a:p>
+            <a:r>
+              <a:rPr lang="pt-BR" dirty="0"/>
+              <a:t>Configuração- </a:t>
+            </a:r>
+            <a:r>
+              <a:rPr lang="pt-BR" sz="4000" dirty="0"/>
+              <a:t>https://pf-draw.netlify.app/</a:t>
+            </a:r>
+            <a:endParaRPr lang="pt-BR" dirty="0"/>
+          </a:p>
+        </p:txBody>
+      </p:sp>
+      <p:sp>
+        <p:nvSpPr>
+          <p:cNvPr id="4" name="Espaço Reservado para Data 3">
+            <a:extLst>
+              <a:ext uri="{FF2B5EF4-FFF2-40B4-BE49-F238E27FC236}">
+                <a16:creationId xmlns:a16="http://schemas.microsoft.com/office/drawing/2014/main" id="{FE283D46-9CA0-4CFE-A924-EA57DF7E54D1}"/>
+              </a:ext>
+            </a:extLst>
+          </p:cNvPr>
+          <p:cNvSpPr>
+            <a:spLocks noGrp="1"/>
+          </p:cNvSpPr>
+          <p:nvPr>
+            <p:ph type="dt" sz="half" idx="10"/>
+          </p:nvPr>
+        </p:nvSpPr>
+        <p:spPr/>
+        <p:txBody>
+          <a:bodyPr/>
+          <a:lstStyle/>
+          <a:p>
+            <a:r>
+              <a:rPr lang="pt-BR"/>
+              <a:t>Dezembro 2020</a:t>
+            </a:r>
+            <a:endParaRPr lang="pt-BR" dirty="0"/>
+          </a:p>
+        </p:txBody>
+      </p:sp>
+      <p:sp>
+        <p:nvSpPr>
+          <p:cNvPr id="5" name="Espaço Reservado para Rodapé 4">
+            <a:extLst>
+              <a:ext uri="{FF2B5EF4-FFF2-40B4-BE49-F238E27FC236}">
+                <a16:creationId xmlns:a16="http://schemas.microsoft.com/office/drawing/2014/main" id="{68E5F5AE-398A-4CB1-8C05-AD60C7F6DB9A}"/>
+              </a:ext>
+            </a:extLst>
+          </p:cNvPr>
+          <p:cNvSpPr>
+            <a:spLocks noGrp="1"/>
+          </p:cNvSpPr>
+          <p:nvPr>
+            <p:ph type="ftr" sz="quarter" idx="11"/>
+          </p:nvPr>
+        </p:nvSpPr>
+        <p:spPr/>
+        <p:txBody>
+          <a:bodyPr/>
+          <a:lstStyle/>
+          <a:p>
+            <a:r>
+              <a:rPr lang="pt-BR"/>
+              <a:t>IT743A – Cálculo de Fluxo de Carga</a:t>
+            </a:r>
+            <a:endParaRPr lang="pt-BR" dirty="0"/>
+          </a:p>
+        </p:txBody>
+      </p:sp>
+      <p:sp>
+        <p:nvSpPr>
+          <p:cNvPr id="6" name="Espaço Reservado para Número de Slide 5">
+            <a:extLst>
+              <a:ext uri="{FF2B5EF4-FFF2-40B4-BE49-F238E27FC236}">
+                <a16:creationId xmlns:a16="http://schemas.microsoft.com/office/drawing/2014/main" id="{57FDDF2D-5DA4-4272-9BC5-AE99C89F456D}"/>
+              </a:ext>
+            </a:extLst>
+          </p:cNvPr>
+          <p:cNvSpPr>
+            <a:spLocks noGrp="1"/>
+          </p:cNvSpPr>
+          <p:nvPr>
+            <p:ph type="sldNum" sz="quarter" idx="12"/>
+          </p:nvPr>
+        </p:nvSpPr>
+        <p:spPr/>
+        <p:txBody>
+          <a:bodyPr/>
+          <a:lstStyle/>
+          <a:p>
+            <a:fld id="{8579997A-84E9-4B38-967C-2D4A110C3049}" type="slidenum">
+              <a:rPr lang="pt-BR" smtClean="0"/>
+              <a:t>16</a:t>
+            </a:fld>
+            <a:endParaRPr lang="pt-BR"/>
+          </a:p>
+        </p:txBody>
+      </p:sp>
+      <p:pic>
+        <p:nvPicPr>
           <p:cNvPr id="8" name="Imagem 7">
             <a:extLst>
               <a:ext uri="{FF2B5EF4-FFF2-40B4-BE49-F238E27FC236}">
@@ -2304,7 +3257,7 @@
 </p:sld>
 </file>
 
-<file path=ppt/slides/slide13.xml><?xml version="1.0" encoding="utf-8"?>
+<file path=ppt/slides/slide17.xml><?xml version="1.0" encoding="utf-8"?>
 <p:sld xmlns:a="http://schemas.openxmlformats.org/drawingml/2006/main" xmlns:r="http://schemas.openxmlformats.org/officeDocument/2006/relationships" xmlns:p="http://schemas.openxmlformats.org/presentationml/2006/main">
   <p:cSld>
     <p:spTree>
@@ -2435,7 +3388,7 @@
           <a:p>
             <a:fld id="{8579997A-84E9-4B38-967C-2D4A110C3049}" type="slidenum">
               <a:rPr lang="pt-BR" smtClean="0"/>
-              <a:t>13</a:t>
+              <a:t>17</a:t>
             </a:fld>
             <a:endParaRPr lang="pt-BR"/>
           </a:p>
@@ -2484,7 +3437,7 @@
 </p:sld>
 </file>
 
-<file path=ppt/slides/slide14.xml><?xml version="1.0" encoding="utf-8"?>
+<file path=ppt/slides/slide18.xml><?xml version="1.0" encoding="utf-8"?>
 <p:sld xmlns:a="http://schemas.openxmlformats.org/drawingml/2006/main" xmlns:r="http://schemas.openxmlformats.org/officeDocument/2006/relationships" xmlns:p="http://schemas.openxmlformats.org/presentationml/2006/main">
   <p:cSld>
     <p:spTree>
@@ -2615,7 +3568,7 @@
           <a:p>
             <a:fld id="{8579997A-84E9-4B38-967C-2D4A110C3049}" type="slidenum">
               <a:rPr lang="pt-BR" smtClean="0"/>
-              <a:t>14</a:t>
+              <a:t>18</a:t>
             </a:fld>
             <a:endParaRPr lang="pt-BR"/>
           </a:p>
@@ -2829,7 +3782,7 @@
 </p:sld>
 </file>
 
-<file path=ppt/slides/slide15.xml><?xml version="1.0" encoding="utf-8"?>
+<file path=ppt/slides/slide19.xml><?xml version="1.0" encoding="utf-8"?>
 <p:sld xmlns:a="http://schemas.openxmlformats.org/drawingml/2006/main" xmlns:r="http://schemas.openxmlformats.org/officeDocument/2006/relationships" xmlns:p="http://schemas.openxmlformats.org/presentationml/2006/main">
   <p:cSld>
     <p:spTree>
@@ -2960,7 +3913,7 @@
           <a:p>
             <a:fld id="{8579997A-84E9-4B38-967C-2D4A110C3049}" type="slidenum">
               <a:rPr lang="pt-BR" smtClean="0"/>
-              <a:t>15</a:t>
+              <a:t>19</a:t>
             </a:fld>
             <a:endParaRPr lang="pt-BR"/>
           </a:p>
@@ -3039,1013 +3992,6 @@
 </p:sld>
 </file>
 
-<file path=ppt/slides/slide16.xml><?xml version="1.0" encoding="utf-8"?>
-<p:sld xmlns:a="http://schemas.openxmlformats.org/drawingml/2006/main" xmlns:r="http://schemas.openxmlformats.org/officeDocument/2006/relationships" xmlns:p="http://schemas.openxmlformats.org/presentationml/2006/main">
-  <p:cSld>
-    <p:spTree>
-      <p:nvGrpSpPr>
-        <p:cNvPr id="1" name=""/>
-        <p:cNvGrpSpPr/>
-        <p:nvPr/>
-      </p:nvGrpSpPr>
-      <p:grpSpPr>
-        <a:xfrm>
-          <a:off x="0" y="0"/>
-          <a:ext cx="0" cy="0"/>
-          <a:chOff x="0" y="0"/>
-          <a:chExt cx="0" cy="0"/>
-        </a:xfrm>
-      </p:grpSpPr>
-      <p:sp>
-        <p:nvSpPr>
-          <p:cNvPr id="2" name="Título 1">
-            <a:extLst>
-              <a:ext uri="{FF2B5EF4-FFF2-40B4-BE49-F238E27FC236}">
-                <a16:creationId xmlns:a16="http://schemas.microsoft.com/office/drawing/2014/main" id="{F2CAC9F6-6456-4C88-B679-8859499DC83C}"/>
-              </a:ext>
-            </a:extLst>
-          </p:cNvPr>
-          <p:cNvSpPr>
-            <a:spLocks noGrp="1"/>
-          </p:cNvSpPr>
-          <p:nvPr>
-            <p:ph type="title"/>
-          </p:nvPr>
-        </p:nvSpPr>
-        <p:spPr/>
-        <p:txBody>
-          <a:bodyPr/>
-          <a:lstStyle/>
-          <a:p>
-            <a:r>
-              <a:rPr lang="pt-BR" dirty="0"/>
-              <a:t>Resultados - </a:t>
-            </a:r>
-            <a:r>
-              <a:rPr lang="pt-BR" sz="4400" dirty="0"/>
-              <a:t>https://pf-draw.netlify.app/</a:t>
-            </a:r>
-            <a:endParaRPr lang="pt-BR" dirty="0"/>
-          </a:p>
-        </p:txBody>
-      </p:sp>
-      <p:sp>
-        <p:nvSpPr>
-          <p:cNvPr id="4" name="Espaço Reservado para Data 3">
-            <a:extLst>
-              <a:ext uri="{FF2B5EF4-FFF2-40B4-BE49-F238E27FC236}">
-                <a16:creationId xmlns:a16="http://schemas.microsoft.com/office/drawing/2014/main" id="{FE283D46-9CA0-4CFE-A924-EA57DF7E54D1}"/>
-              </a:ext>
-            </a:extLst>
-          </p:cNvPr>
-          <p:cNvSpPr>
-            <a:spLocks noGrp="1"/>
-          </p:cNvSpPr>
-          <p:nvPr>
-            <p:ph type="dt" sz="half" idx="10"/>
-          </p:nvPr>
-        </p:nvSpPr>
-        <p:spPr/>
-        <p:txBody>
-          <a:bodyPr/>
-          <a:lstStyle/>
-          <a:p>
-            <a:r>
-              <a:rPr lang="pt-BR"/>
-              <a:t>Dezembro 2020</a:t>
-            </a:r>
-            <a:endParaRPr lang="pt-BR" dirty="0"/>
-          </a:p>
-        </p:txBody>
-      </p:sp>
-      <p:sp>
-        <p:nvSpPr>
-          <p:cNvPr id="5" name="Espaço Reservado para Rodapé 4">
-            <a:extLst>
-              <a:ext uri="{FF2B5EF4-FFF2-40B4-BE49-F238E27FC236}">
-                <a16:creationId xmlns:a16="http://schemas.microsoft.com/office/drawing/2014/main" id="{68E5F5AE-398A-4CB1-8C05-AD60C7F6DB9A}"/>
-              </a:ext>
-            </a:extLst>
-          </p:cNvPr>
-          <p:cNvSpPr>
-            <a:spLocks noGrp="1"/>
-          </p:cNvSpPr>
-          <p:nvPr>
-            <p:ph type="ftr" sz="quarter" idx="11"/>
-          </p:nvPr>
-        </p:nvSpPr>
-        <p:spPr/>
-        <p:txBody>
-          <a:bodyPr/>
-          <a:lstStyle/>
-          <a:p>
-            <a:r>
-              <a:rPr lang="pt-BR"/>
-              <a:t>IT743A – Cálculo de Fluxo de Carga</a:t>
-            </a:r>
-            <a:endParaRPr lang="pt-BR" dirty="0"/>
-          </a:p>
-        </p:txBody>
-      </p:sp>
-      <p:sp>
-        <p:nvSpPr>
-          <p:cNvPr id="6" name="Espaço Reservado para Número de Slide 5">
-            <a:extLst>
-              <a:ext uri="{FF2B5EF4-FFF2-40B4-BE49-F238E27FC236}">
-                <a16:creationId xmlns:a16="http://schemas.microsoft.com/office/drawing/2014/main" id="{57FDDF2D-5DA4-4272-9BC5-AE99C89F456D}"/>
-              </a:ext>
-            </a:extLst>
-          </p:cNvPr>
-          <p:cNvSpPr>
-            <a:spLocks noGrp="1"/>
-          </p:cNvSpPr>
-          <p:nvPr>
-            <p:ph type="sldNum" sz="quarter" idx="12"/>
-          </p:nvPr>
-        </p:nvSpPr>
-        <p:spPr/>
-        <p:txBody>
-          <a:bodyPr/>
-          <a:lstStyle/>
-          <a:p>
-            <a:fld id="{8579997A-84E9-4B38-967C-2D4A110C3049}" type="slidenum">
-              <a:rPr lang="pt-BR" smtClean="0"/>
-              <a:t>16</a:t>
-            </a:fld>
-            <a:endParaRPr lang="pt-BR"/>
-          </a:p>
-        </p:txBody>
-      </p:sp>
-      <p:pic>
-        <p:nvPicPr>
-          <p:cNvPr id="8" name="Imagem 7">
-            <a:extLst>
-              <a:ext uri="{FF2B5EF4-FFF2-40B4-BE49-F238E27FC236}">
-                <a16:creationId xmlns:a16="http://schemas.microsoft.com/office/drawing/2014/main" id="{CE234FE7-F448-425E-90EE-17D5B357A955}"/>
-              </a:ext>
-            </a:extLst>
-          </p:cNvPr>
-          <p:cNvPicPr>
-            <a:picLocks noChangeAspect="1"/>
-          </p:cNvPicPr>
-          <p:nvPr/>
-        </p:nvPicPr>
-        <p:blipFill>
-          <a:blip r:embed="rId2"/>
-          <a:stretch>
-            <a:fillRect/>
-          </a:stretch>
-        </p:blipFill>
-        <p:spPr>
-          <a:xfrm>
-            <a:off x="2923712" y="1456770"/>
-            <a:ext cx="6344575" cy="2356116"/>
-          </a:xfrm>
-          <a:prstGeom prst="rect">
-            <a:avLst/>
-          </a:prstGeom>
-        </p:spPr>
-      </p:pic>
-      <p:pic>
-        <p:nvPicPr>
-          <p:cNvPr id="11" name="Imagem 10">
-            <a:extLst>
-              <a:ext uri="{FF2B5EF4-FFF2-40B4-BE49-F238E27FC236}">
-                <a16:creationId xmlns:a16="http://schemas.microsoft.com/office/drawing/2014/main" id="{C0B3A731-D06F-490E-A462-EB76E563C99F}"/>
-              </a:ext>
-            </a:extLst>
-          </p:cNvPr>
-          <p:cNvPicPr>
-            <a:picLocks noChangeAspect="1"/>
-          </p:cNvPicPr>
-          <p:nvPr/>
-        </p:nvPicPr>
-        <p:blipFill>
-          <a:blip r:embed="rId3"/>
-          <a:stretch>
-            <a:fillRect/>
-          </a:stretch>
-        </p:blipFill>
-        <p:spPr>
-          <a:xfrm>
-            <a:off x="2757486" y="4003675"/>
-            <a:ext cx="6677025" cy="2352675"/>
-          </a:xfrm>
-          <a:prstGeom prst="rect">
-            <a:avLst/>
-          </a:prstGeom>
-        </p:spPr>
-      </p:pic>
-      <p:cxnSp>
-        <p:nvCxnSpPr>
-          <p:cNvPr id="19" name="Conector: Curvo 18">
-            <a:extLst>
-              <a:ext uri="{FF2B5EF4-FFF2-40B4-BE49-F238E27FC236}">
-                <a16:creationId xmlns:a16="http://schemas.microsoft.com/office/drawing/2014/main" id="{3F55A7C8-1F93-4170-BC55-BB943F046D9E}"/>
-              </a:ext>
-            </a:extLst>
-          </p:cNvPr>
-          <p:cNvCxnSpPr>
-            <a:cxnSpLocks/>
-            <a:stCxn id="8" idx="3"/>
-            <a:endCxn id="11" idx="3"/>
-          </p:cNvCxnSpPr>
-          <p:nvPr/>
-        </p:nvCxnSpPr>
-        <p:spPr>
-          <a:xfrm>
-            <a:off x="9268287" y="2634828"/>
-            <a:ext cx="166224" cy="2545185"/>
-          </a:xfrm>
-          <a:prstGeom prst="curvedConnector3">
-            <a:avLst>
-              <a:gd name="adj1" fmla="val 590016"/>
-            </a:avLst>
-          </a:prstGeom>
-          <a:ln>
-            <a:tailEnd type="triangle"/>
-          </a:ln>
-        </p:spPr>
-        <p:style>
-          <a:lnRef idx="3">
-            <a:schemeClr val="accent1"/>
-          </a:lnRef>
-          <a:fillRef idx="0">
-            <a:schemeClr val="accent1"/>
-          </a:fillRef>
-          <a:effectRef idx="2">
-            <a:schemeClr val="accent1"/>
-          </a:effectRef>
-          <a:fontRef idx="minor">
-            <a:schemeClr val="tx1"/>
-          </a:fontRef>
-        </p:style>
-      </p:cxnSp>
-    </p:spTree>
-    <p:extLst>
-      <p:ext uri="{BB962C8B-B14F-4D97-AF65-F5344CB8AC3E}">
-        <p14:creationId xmlns:p14="http://schemas.microsoft.com/office/powerpoint/2010/main" val="1623081595"/>
-      </p:ext>
-    </p:extLst>
-  </p:cSld>
-  <p:clrMapOvr>
-    <a:masterClrMapping/>
-  </p:clrMapOvr>
-</p:sld>
-</file>
-
-<file path=ppt/slides/slide17.xml><?xml version="1.0" encoding="utf-8"?>
-<p:sld xmlns:a="http://schemas.openxmlformats.org/drawingml/2006/main" xmlns:r="http://schemas.openxmlformats.org/officeDocument/2006/relationships" xmlns:p="http://schemas.openxmlformats.org/presentationml/2006/main">
-  <p:cSld>
-    <p:spTree>
-      <p:nvGrpSpPr>
-        <p:cNvPr id="1" name=""/>
-        <p:cNvGrpSpPr/>
-        <p:nvPr/>
-      </p:nvGrpSpPr>
-      <p:grpSpPr>
-        <a:xfrm>
-          <a:off x="0" y="0"/>
-          <a:ext cx="0" cy="0"/>
-          <a:chOff x="0" y="0"/>
-          <a:chExt cx="0" cy="0"/>
-        </a:xfrm>
-      </p:grpSpPr>
-      <p:sp>
-        <p:nvSpPr>
-          <p:cNvPr id="2" name="Título 1">
-            <a:extLst>
-              <a:ext uri="{FF2B5EF4-FFF2-40B4-BE49-F238E27FC236}">
-                <a16:creationId xmlns:a16="http://schemas.microsoft.com/office/drawing/2014/main" id="{F2CAC9F6-6456-4C88-B679-8859499DC83C}"/>
-              </a:ext>
-            </a:extLst>
-          </p:cNvPr>
-          <p:cNvSpPr>
-            <a:spLocks noGrp="1"/>
-          </p:cNvSpPr>
-          <p:nvPr>
-            <p:ph type="title"/>
-          </p:nvPr>
-        </p:nvSpPr>
-        <p:spPr/>
-        <p:txBody>
-          <a:bodyPr/>
-          <a:lstStyle/>
-          <a:p>
-            <a:r>
-              <a:rPr lang="pt-BR" dirty="0"/>
-              <a:t>Resultados - </a:t>
-            </a:r>
-            <a:r>
-              <a:rPr lang="pt-BR" sz="4400" dirty="0"/>
-              <a:t>https://pf-draw.netlify.app/</a:t>
-            </a:r>
-            <a:endParaRPr lang="pt-BR" dirty="0"/>
-          </a:p>
-        </p:txBody>
-      </p:sp>
-      <p:sp>
-        <p:nvSpPr>
-          <p:cNvPr id="4" name="Espaço Reservado para Data 3">
-            <a:extLst>
-              <a:ext uri="{FF2B5EF4-FFF2-40B4-BE49-F238E27FC236}">
-                <a16:creationId xmlns:a16="http://schemas.microsoft.com/office/drawing/2014/main" id="{FE283D46-9CA0-4CFE-A924-EA57DF7E54D1}"/>
-              </a:ext>
-            </a:extLst>
-          </p:cNvPr>
-          <p:cNvSpPr>
-            <a:spLocks noGrp="1"/>
-          </p:cNvSpPr>
-          <p:nvPr>
-            <p:ph type="dt" sz="half" idx="10"/>
-          </p:nvPr>
-        </p:nvSpPr>
-        <p:spPr/>
-        <p:txBody>
-          <a:bodyPr/>
-          <a:lstStyle/>
-          <a:p>
-            <a:r>
-              <a:rPr lang="pt-BR"/>
-              <a:t>Dezembro 2020</a:t>
-            </a:r>
-            <a:endParaRPr lang="pt-BR" dirty="0"/>
-          </a:p>
-        </p:txBody>
-      </p:sp>
-      <p:sp>
-        <p:nvSpPr>
-          <p:cNvPr id="5" name="Espaço Reservado para Rodapé 4">
-            <a:extLst>
-              <a:ext uri="{FF2B5EF4-FFF2-40B4-BE49-F238E27FC236}">
-                <a16:creationId xmlns:a16="http://schemas.microsoft.com/office/drawing/2014/main" id="{68E5F5AE-398A-4CB1-8C05-AD60C7F6DB9A}"/>
-              </a:ext>
-            </a:extLst>
-          </p:cNvPr>
-          <p:cNvSpPr>
-            <a:spLocks noGrp="1"/>
-          </p:cNvSpPr>
-          <p:nvPr>
-            <p:ph type="ftr" sz="quarter" idx="11"/>
-          </p:nvPr>
-        </p:nvSpPr>
-        <p:spPr/>
-        <p:txBody>
-          <a:bodyPr/>
-          <a:lstStyle/>
-          <a:p>
-            <a:r>
-              <a:rPr lang="pt-BR"/>
-              <a:t>IT743A – Cálculo de Fluxo de Carga</a:t>
-            </a:r>
-            <a:endParaRPr lang="pt-BR" dirty="0"/>
-          </a:p>
-        </p:txBody>
-      </p:sp>
-      <p:sp>
-        <p:nvSpPr>
-          <p:cNvPr id="6" name="Espaço Reservado para Número de Slide 5">
-            <a:extLst>
-              <a:ext uri="{FF2B5EF4-FFF2-40B4-BE49-F238E27FC236}">
-                <a16:creationId xmlns:a16="http://schemas.microsoft.com/office/drawing/2014/main" id="{57FDDF2D-5DA4-4272-9BC5-AE99C89F456D}"/>
-              </a:ext>
-            </a:extLst>
-          </p:cNvPr>
-          <p:cNvSpPr>
-            <a:spLocks noGrp="1"/>
-          </p:cNvSpPr>
-          <p:nvPr>
-            <p:ph type="sldNum" sz="quarter" idx="12"/>
-          </p:nvPr>
-        </p:nvSpPr>
-        <p:spPr/>
-        <p:txBody>
-          <a:bodyPr/>
-          <a:lstStyle/>
-          <a:p>
-            <a:fld id="{8579997A-84E9-4B38-967C-2D4A110C3049}" type="slidenum">
-              <a:rPr lang="pt-BR" smtClean="0"/>
-              <a:t>17</a:t>
-            </a:fld>
-            <a:endParaRPr lang="pt-BR"/>
-          </a:p>
-        </p:txBody>
-      </p:sp>
-      <p:pic>
-        <p:nvPicPr>
-          <p:cNvPr id="7" name="Imagem 6">
-            <a:extLst>
-              <a:ext uri="{FF2B5EF4-FFF2-40B4-BE49-F238E27FC236}">
-                <a16:creationId xmlns:a16="http://schemas.microsoft.com/office/drawing/2014/main" id="{B3924481-1448-48D4-B095-242895B8495E}"/>
-              </a:ext>
-            </a:extLst>
-          </p:cNvPr>
-          <p:cNvPicPr>
-            <a:picLocks noChangeAspect="1"/>
-          </p:cNvPicPr>
-          <p:nvPr/>
-        </p:nvPicPr>
-        <p:blipFill>
-          <a:blip r:embed="rId2"/>
-          <a:stretch>
-            <a:fillRect/>
-          </a:stretch>
-        </p:blipFill>
-        <p:spPr>
-          <a:xfrm>
-            <a:off x="951760" y="1315953"/>
-            <a:ext cx="10288480" cy="5040397"/>
-          </a:xfrm>
-          <a:prstGeom prst="rect">
-            <a:avLst/>
-          </a:prstGeom>
-        </p:spPr>
-      </p:pic>
-    </p:spTree>
-    <p:extLst>
-      <p:ext uri="{BB962C8B-B14F-4D97-AF65-F5344CB8AC3E}">
-        <p14:creationId xmlns:p14="http://schemas.microsoft.com/office/powerpoint/2010/main" val="3335406736"/>
-      </p:ext>
-    </p:extLst>
-  </p:cSld>
-  <p:clrMapOvr>
-    <a:masterClrMapping/>
-  </p:clrMapOvr>
-</p:sld>
-</file>
-
-<file path=ppt/slides/slide18.xml><?xml version="1.0" encoding="utf-8"?>
-<p:sld xmlns:a="http://schemas.openxmlformats.org/drawingml/2006/main" xmlns:r="http://schemas.openxmlformats.org/officeDocument/2006/relationships" xmlns:p="http://schemas.openxmlformats.org/presentationml/2006/main">
-  <p:cSld>
-    <p:spTree>
-      <p:nvGrpSpPr>
-        <p:cNvPr id="1" name=""/>
-        <p:cNvGrpSpPr/>
-        <p:nvPr/>
-      </p:nvGrpSpPr>
-      <p:grpSpPr>
-        <a:xfrm>
-          <a:off x="0" y="0"/>
-          <a:ext cx="0" cy="0"/>
-          <a:chOff x="0" y="0"/>
-          <a:chExt cx="0" cy="0"/>
-        </a:xfrm>
-      </p:grpSpPr>
-      <p:sp>
-        <p:nvSpPr>
-          <p:cNvPr id="2" name="Título 1">
-            <a:extLst>
-              <a:ext uri="{FF2B5EF4-FFF2-40B4-BE49-F238E27FC236}">
-                <a16:creationId xmlns:a16="http://schemas.microsoft.com/office/drawing/2014/main" id="{F2CAC9F6-6456-4C88-B679-8859499DC83C}"/>
-              </a:ext>
-            </a:extLst>
-          </p:cNvPr>
-          <p:cNvSpPr>
-            <a:spLocks noGrp="1"/>
-          </p:cNvSpPr>
-          <p:nvPr>
-            <p:ph type="title"/>
-          </p:nvPr>
-        </p:nvSpPr>
-        <p:spPr/>
-        <p:txBody>
-          <a:bodyPr/>
-          <a:lstStyle/>
-          <a:p>
-            <a:r>
-              <a:rPr lang="pt-BR" dirty="0"/>
-              <a:t>Resultados - </a:t>
-            </a:r>
-            <a:r>
-              <a:rPr lang="pt-BR" sz="4400" dirty="0"/>
-              <a:t>https://pf-draw.netlify.app/</a:t>
-            </a:r>
-            <a:endParaRPr lang="pt-BR" dirty="0"/>
-          </a:p>
-        </p:txBody>
-      </p:sp>
-      <p:sp>
-        <p:nvSpPr>
-          <p:cNvPr id="4" name="Espaço Reservado para Data 3">
-            <a:extLst>
-              <a:ext uri="{FF2B5EF4-FFF2-40B4-BE49-F238E27FC236}">
-                <a16:creationId xmlns:a16="http://schemas.microsoft.com/office/drawing/2014/main" id="{FE283D46-9CA0-4CFE-A924-EA57DF7E54D1}"/>
-              </a:ext>
-            </a:extLst>
-          </p:cNvPr>
-          <p:cNvSpPr>
-            <a:spLocks noGrp="1"/>
-          </p:cNvSpPr>
-          <p:nvPr>
-            <p:ph type="dt" sz="half" idx="10"/>
-          </p:nvPr>
-        </p:nvSpPr>
-        <p:spPr/>
-        <p:txBody>
-          <a:bodyPr/>
-          <a:lstStyle/>
-          <a:p>
-            <a:r>
-              <a:rPr lang="pt-BR"/>
-              <a:t>Dezembro 2020</a:t>
-            </a:r>
-            <a:endParaRPr lang="pt-BR" dirty="0"/>
-          </a:p>
-        </p:txBody>
-      </p:sp>
-      <p:sp>
-        <p:nvSpPr>
-          <p:cNvPr id="5" name="Espaço Reservado para Rodapé 4">
-            <a:extLst>
-              <a:ext uri="{FF2B5EF4-FFF2-40B4-BE49-F238E27FC236}">
-                <a16:creationId xmlns:a16="http://schemas.microsoft.com/office/drawing/2014/main" id="{68E5F5AE-398A-4CB1-8C05-AD60C7F6DB9A}"/>
-              </a:ext>
-            </a:extLst>
-          </p:cNvPr>
-          <p:cNvSpPr>
-            <a:spLocks noGrp="1"/>
-          </p:cNvSpPr>
-          <p:nvPr>
-            <p:ph type="ftr" sz="quarter" idx="11"/>
-          </p:nvPr>
-        </p:nvSpPr>
-        <p:spPr/>
-        <p:txBody>
-          <a:bodyPr/>
-          <a:lstStyle/>
-          <a:p>
-            <a:r>
-              <a:rPr lang="pt-BR"/>
-              <a:t>IT743A – Cálculo de Fluxo de Carga</a:t>
-            </a:r>
-            <a:endParaRPr lang="pt-BR" dirty="0"/>
-          </a:p>
-        </p:txBody>
-      </p:sp>
-      <p:sp>
-        <p:nvSpPr>
-          <p:cNvPr id="6" name="Espaço Reservado para Número de Slide 5">
-            <a:extLst>
-              <a:ext uri="{FF2B5EF4-FFF2-40B4-BE49-F238E27FC236}">
-                <a16:creationId xmlns:a16="http://schemas.microsoft.com/office/drawing/2014/main" id="{57FDDF2D-5DA4-4272-9BC5-AE99C89F456D}"/>
-              </a:ext>
-            </a:extLst>
-          </p:cNvPr>
-          <p:cNvSpPr>
-            <a:spLocks noGrp="1"/>
-          </p:cNvSpPr>
-          <p:nvPr>
-            <p:ph type="sldNum" sz="quarter" idx="12"/>
-          </p:nvPr>
-        </p:nvSpPr>
-        <p:spPr/>
-        <p:txBody>
-          <a:bodyPr/>
-          <a:lstStyle/>
-          <a:p>
-            <a:fld id="{8579997A-84E9-4B38-967C-2D4A110C3049}" type="slidenum">
-              <a:rPr lang="pt-BR" smtClean="0"/>
-              <a:t>18</a:t>
-            </a:fld>
-            <a:endParaRPr lang="pt-BR"/>
-          </a:p>
-        </p:txBody>
-      </p:sp>
-      <p:pic>
-        <p:nvPicPr>
-          <p:cNvPr id="7" name="Imagem 6">
-            <a:extLst>
-              <a:ext uri="{FF2B5EF4-FFF2-40B4-BE49-F238E27FC236}">
-                <a16:creationId xmlns:a16="http://schemas.microsoft.com/office/drawing/2014/main" id="{C5ED263F-6EB5-4E00-B604-3EF2BD619738}"/>
-              </a:ext>
-            </a:extLst>
-          </p:cNvPr>
-          <p:cNvPicPr>
-            <a:picLocks noChangeAspect="1"/>
-          </p:cNvPicPr>
-          <p:nvPr/>
-        </p:nvPicPr>
-        <p:blipFill rotWithShape="1">
-          <a:blip r:embed="rId2"/>
-          <a:srcRect t="1519" b="71720"/>
-          <a:stretch/>
-        </p:blipFill>
-        <p:spPr>
-          <a:xfrm>
-            <a:off x="934282" y="1487161"/>
-            <a:ext cx="3769311" cy="1753189"/>
-          </a:xfrm>
-          <a:prstGeom prst="rect">
-            <a:avLst/>
-          </a:prstGeom>
-        </p:spPr>
-      </p:pic>
-      <p:pic>
-        <p:nvPicPr>
-          <p:cNvPr id="11" name="Imagem 10">
-            <a:extLst>
-              <a:ext uri="{FF2B5EF4-FFF2-40B4-BE49-F238E27FC236}">
-                <a16:creationId xmlns:a16="http://schemas.microsoft.com/office/drawing/2014/main" id="{3C6C2E0A-F524-42F5-9146-6A7DBCD249B6}"/>
-              </a:ext>
-            </a:extLst>
-          </p:cNvPr>
-          <p:cNvPicPr>
-            <a:picLocks noChangeAspect="1"/>
-          </p:cNvPicPr>
-          <p:nvPr/>
-        </p:nvPicPr>
-        <p:blipFill>
-          <a:blip r:embed="rId3"/>
-          <a:stretch>
-            <a:fillRect/>
-          </a:stretch>
-        </p:blipFill>
-        <p:spPr>
-          <a:xfrm>
-            <a:off x="1031935" y="3888161"/>
-            <a:ext cx="3769311" cy="2468189"/>
-          </a:xfrm>
-          <a:prstGeom prst="rect">
-            <a:avLst/>
-          </a:prstGeom>
-        </p:spPr>
-      </p:pic>
-      <p:sp>
-        <p:nvSpPr>
-          <p:cNvPr id="12" name="CaixaDeTexto 11">
-            <a:extLst>
-              <a:ext uri="{FF2B5EF4-FFF2-40B4-BE49-F238E27FC236}">
-                <a16:creationId xmlns:a16="http://schemas.microsoft.com/office/drawing/2014/main" id="{3E247734-6AFC-4FE5-904B-ED47ED7E7B9F}"/>
-              </a:ext>
-            </a:extLst>
-          </p:cNvPr>
-          <p:cNvSpPr txBox="1"/>
-          <p:nvPr/>
-        </p:nvSpPr>
-        <p:spPr>
-          <a:xfrm>
-            <a:off x="2512380" y="3429000"/>
-            <a:ext cx="541537" cy="369332"/>
-          </a:xfrm>
-          <a:prstGeom prst="rect">
-            <a:avLst/>
-          </a:prstGeom>
-          <a:noFill/>
-        </p:spPr>
-        <p:txBody>
-          <a:bodyPr wrap="square" rtlCol="0">
-            <a:spAutoFit/>
-          </a:bodyPr>
-          <a:lstStyle/>
-          <a:p>
-            <a:r>
-              <a:rPr lang="pt-BR" dirty="0"/>
-              <a:t>. . . </a:t>
-            </a:r>
-          </a:p>
-        </p:txBody>
-      </p:sp>
-      <p:pic>
-        <p:nvPicPr>
-          <p:cNvPr id="14" name="Imagem 13">
-            <a:extLst>
-              <a:ext uri="{FF2B5EF4-FFF2-40B4-BE49-F238E27FC236}">
-                <a16:creationId xmlns:a16="http://schemas.microsoft.com/office/drawing/2014/main" id="{3127A50C-1E61-498E-89E9-5A8D8F4F209E}"/>
-              </a:ext>
-            </a:extLst>
-          </p:cNvPr>
-          <p:cNvPicPr>
-            <a:picLocks noChangeAspect="1"/>
-          </p:cNvPicPr>
-          <p:nvPr/>
-        </p:nvPicPr>
-        <p:blipFill rotWithShape="1">
-          <a:blip r:embed="rId4"/>
-          <a:srcRect b="48166"/>
-          <a:stretch/>
-        </p:blipFill>
-        <p:spPr>
-          <a:xfrm>
-            <a:off x="5698678" y="1487161"/>
-            <a:ext cx="5655122" cy="1753189"/>
-          </a:xfrm>
-          <a:prstGeom prst="rect">
-            <a:avLst/>
-          </a:prstGeom>
-        </p:spPr>
-      </p:pic>
-      <p:sp>
-        <p:nvSpPr>
-          <p:cNvPr id="15" name="CaixaDeTexto 14">
-            <a:extLst>
-              <a:ext uri="{FF2B5EF4-FFF2-40B4-BE49-F238E27FC236}">
-                <a16:creationId xmlns:a16="http://schemas.microsoft.com/office/drawing/2014/main" id="{44975175-7073-4313-93D9-DCD7E3415925}"/>
-              </a:ext>
-            </a:extLst>
-          </p:cNvPr>
-          <p:cNvSpPr txBox="1"/>
-          <p:nvPr/>
-        </p:nvSpPr>
-        <p:spPr>
-          <a:xfrm>
-            <a:off x="8255470" y="3316260"/>
-            <a:ext cx="541537" cy="369332"/>
-          </a:xfrm>
-          <a:prstGeom prst="rect">
-            <a:avLst/>
-          </a:prstGeom>
-          <a:noFill/>
-        </p:spPr>
-        <p:txBody>
-          <a:bodyPr wrap="square" rtlCol="0">
-            <a:spAutoFit/>
-          </a:bodyPr>
-          <a:lstStyle/>
-          <a:p>
-            <a:r>
-              <a:rPr lang="pt-BR" dirty="0"/>
-              <a:t>. . . </a:t>
-            </a:r>
-          </a:p>
-        </p:txBody>
-      </p:sp>
-      <p:pic>
-        <p:nvPicPr>
-          <p:cNvPr id="17" name="Imagem 16">
-            <a:extLst>
-              <a:ext uri="{FF2B5EF4-FFF2-40B4-BE49-F238E27FC236}">
-                <a16:creationId xmlns:a16="http://schemas.microsoft.com/office/drawing/2014/main" id="{0B85208B-74D9-4AE2-AA51-D86A4BD0BD8D}"/>
-              </a:ext>
-            </a:extLst>
-          </p:cNvPr>
-          <p:cNvPicPr>
-            <a:picLocks noChangeAspect="1"/>
-          </p:cNvPicPr>
-          <p:nvPr/>
-        </p:nvPicPr>
-        <p:blipFill rotWithShape="1">
-          <a:blip r:embed="rId5"/>
-          <a:srcRect t="49360"/>
-          <a:stretch/>
-        </p:blipFill>
-        <p:spPr>
-          <a:xfrm>
-            <a:off x="5599313" y="3761502"/>
-            <a:ext cx="5754487" cy="2618362"/>
-          </a:xfrm>
-          <a:prstGeom prst="rect">
-            <a:avLst/>
-          </a:prstGeom>
-        </p:spPr>
-      </p:pic>
-    </p:spTree>
-    <p:extLst>
-      <p:ext uri="{BB962C8B-B14F-4D97-AF65-F5344CB8AC3E}">
-        <p14:creationId xmlns:p14="http://schemas.microsoft.com/office/powerpoint/2010/main" val="2416041880"/>
-      </p:ext>
-    </p:extLst>
-  </p:cSld>
-  <p:clrMapOvr>
-    <a:masterClrMapping/>
-  </p:clrMapOvr>
-</p:sld>
-</file>
-
-<file path=ppt/slides/slide19.xml><?xml version="1.0" encoding="utf-8"?>
-<p:sld xmlns:a="http://schemas.openxmlformats.org/drawingml/2006/main" xmlns:r="http://schemas.openxmlformats.org/officeDocument/2006/relationships" xmlns:p="http://schemas.openxmlformats.org/presentationml/2006/main">
-  <p:cSld>
-    <p:spTree>
-      <p:nvGrpSpPr>
-        <p:cNvPr id="1" name=""/>
-        <p:cNvGrpSpPr/>
-        <p:nvPr/>
-      </p:nvGrpSpPr>
-      <p:grpSpPr>
-        <a:xfrm>
-          <a:off x="0" y="0"/>
-          <a:ext cx="0" cy="0"/>
-          <a:chOff x="0" y="0"/>
-          <a:chExt cx="0" cy="0"/>
-        </a:xfrm>
-      </p:grpSpPr>
-      <p:pic>
-        <p:nvPicPr>
-          <p:cNvPr id="18" name="Imagem 17">
-            <a:extLst>
-              <a:ext uri="{FF2B5EF4-FFF2-40B4-BE49-F238E27FC236}">
-                <a16:creationId xmlns:a16="http://schemas.microsoft.com/office/drawing/2014/main" id="{5A7B6FA1-6656-475D-A031-44698C0B206B}"/>
-              </a:ext>
-            </a:extLst>
-          </p:cNvPr>
-          <p:cNvPicPr>
-            <a:picLocks noChangeAspect="1"/>
-          </p:cNvPicPr>
-          <p:nvPr/>
-        </p:nvPicPr>
-        <p:blipFill>
-          <a:blip r:embed="rId2"/>
-          <a:stretch>
-            <a:fillRect/>
-          </a:stretch>
-        </p:blipFill>
-        <p:spPr>
-          <a:xfrm>
-            <a:off x="2644759" y="1330701"/>
-            <a:ext cx="8929133" cy="5025649"/>
-          </a:xfrm>
-          <a:prstGeom prst="rect">
-            <a:avLst/>
-          </a:prstGeom>
-        </p:spPr>
-      </p:pic>
-      <p:sp>
-        <p:nvSpPr>
-          <p:cNvPr id="2" name="Título 1">
-            <a:extLst>
-              <a:ext uri="{FF2B5EF4-FFF2-40B4-BE49-F238E27FC236}">
-                <a16:creationId xmlns:a16="http://schemas.microsoft.com/office/drawing/2014/main" id="{F2CAC9F6-6456-4C88-B679-8859499DC83C}"/>
-              </a:ext>
-            </a:extLst>
-          </p:cNvPr>
-          <p:cNvSpPr>
-            <a:spLocks noGrp="1"/>
-          </p:cNvSpPr>
-          <p:nvPr>
-            <p:ph type="title"/>
-          </p:nvPr>
-        </p:nvSpPr>
-        <p:spPr/>
-        <p:txBody>
-          <a:bodyPr/>
-          <a:lstStyle/>
-          <a:p>
-            <a:r>
-              <a:rPr lang="pt-BR" dirty="0"/>
-              <a:t>Performance - </a:t>
-            </a:r>
-            <a:r>
-              <a:rPr lang="pt-BR" sz="4400" dirty="0"/>
-              <a:t>https://pf-draw.netlify.app/</a:t>
-            </a:r>
-            <a:endParaRPr lang="pt-BR" dirty="0"/>
-          </a:p>
-        </p:txBody>
-      </p:sp>
-      <p:sp>
-        <p:nvSpPr>
-          <p:cNvPr id="4" name="Espaço Reservado para Data 3">
-            <a:extLst>
-              <a:ext uri="{FF2B5EF4-FFF2-40B4-BE49-F238E27FC236}">
-                <a16:creationId xmlns:a16="http://schemas.microsoft.com/office/drawing/2014/main" id="{FE283D46-9CA0-4CFE-A924-EA57DF7E54D1}"/>
-              </a:ext>
-            </a:extLst>
-          </p:cNvPr>
-          <p:cNvSpPr>
-            <a:spLocks noGrp="1"/>
-          </p:cNvSpPr>
-          <p:nvPr>
-            <p:ph type="dt" sz="half" idx="10"/>
-          </p:nvPr>
-        </p:nvSpPr>
-        <p:spPr/>
-        <p:txBody>
-          <a:bodyPr/>
-          <a:lstStyle/>
-          <a:p>
-            <a:r>
-              <a:rPr lang="pt-BR"/>
-              <a:t>Dezembro 2020</a:t>
-            </a:r>
-            <a:endParaRPr lang="pt-BR" dirty="0"/>
-          </a:p>
-        </p:txBody>
-      </p:sp>
-      <p:sp>
-        <p:nvSpPr>
-          <p:cNvPr id="5" name="Espaço Reservado para Rodapé 4">
-            <a:extLst>
-              <a:ext uri="{FF2B5EF4-FFF2-40B4-BE49-F238E27FC236}">
-                <a16:creationId xmlns:a16="http://schemas.microsoft.com/office/drawing/2014/main" id="{68E5F5AE-398A-4CB1-8C05-AD60C7F6DB9A}"/>
-              </a:ext>
-            </a:extLst>
-          </p:cNvPr>
-          <p:cNvSpPr>
-            <a:spLocks noGrp="1"/>
-          </p:cNvSpPr>
-          <p:nvPr>
-            <p:ph type="ftr" sz="quarter" idx="11"/>
-          </p:nvPr>
-        </p:nvSpPr>
-        <p:spPr/>
-        <p:txBody>
-          <a:bodyPr/>
-          <a:lstStyle/>
-          <a:p>
-            <a:r>
-              <a:rPr lang="pt-BR"/>
-              <a:t>IT743A – Cálculo de Fluxo de Carga</a:t>
-            </a:r>
-            <a:endParaRPr lang="pt-BR" dirty="0"/>
-          </a:p>
-        </p:txBody>
-      </p:sp>
-      <p:sp>
-        <p:nvSpPr>
-          <p:cNvPr id="6" name="Espaço Reservado para Número de Slide 5">
-            <a:extLst>
-              <a:ext uri="{FF2B5EF4-FFF2-40B4-BE49-F238E27FC236}">
-                <a16:creationId xmlns:a16="http://schemas.microsoft.com/office/drawing/2014/main" id="{57FDDF2D-5DA4-4272-9BC5-AE99C89F456D}"/>
-              </a:ext>
-            </a:extLst>
-          </p:cNvPr>
-          <p:cNvSpPr>
-            <a:spLocks noGrp="1"/>
-          </p:cNvSpPr>
-          <p:nvPr>
-            <p:ph type="sldNum" sz="quarter" idx="12"/>
-          </p:nvPr>
-        </p:nvSpPr>
-        <p:spPr/>
-        <p:txBody>
-          <a:bodyPr/>
-          <a:lstStyle/>
-          <a:p>
-            <a:fld id="{8579997A-84E9-4B38-967C-2D4A110C3049}" type="slidenum">
-              <a:rPr lang="pt-BR" smtClean="0"/>
-              <a:t>19</a:t>
-            </a:fld>
-            <a:endParaRPr lang="pt-BR"/>
-          </a:p>
-        </p:txBody>
-      </p:sp>
-      <p:sp>
-        <p:nvSpPr>
-          <p:cNvPr id="16" name="Espaço Reservado para Conteúdo 6">
-            <a:extLst>
-              <a:ext uri="{FF2B5EF4-FFF2-40B4-BE49-F238E27FC236}">
-                <a16:creationId xmlns:a16="http://schemas.microsoft.com/office/drawing/2014/main" id="{AC52CD35-10DE-4EB5-8666-A30B457793A1}"/>
-              </a:ext>
-            </a:extLst>
-          </p:cNvPr>
-          <p:cNvSpPr>
-            <a:spLocks noGrp="1"/>
-          </p:cNvSpPr>
-          <p:nvPr>
-            <p:ph idx="1"/>
-          </p:nvPr>
-        </p:nvSpPr>
-        <p:spPr>
-          <a:xfrm>
-            <a:off x="618108" y="1418995"/>
-            <a:ext cx="4628595" cy="4351338"/>
-          </a:xfrm>
-        </p:spPr>
-        <p:txBody>
-          <a:bodyPr>
-            <a:normAutofit/>
-          </a:bodyPr>
-          <a:lstStyle/>
-          <a:p>
-            <a:r>
-              <a:rPr lang="pt-BR" dirty="0" err="1"/>
-              <a:t>Err</a:t>
-            </a:r>
-            <a:r>
-              <a:rPr lang="pt-BR" dirty="0"/>
-              <a:t>. 0.01</a:t>
-            </a:r>
-          </a:p>
-          <a:p>
-            <a:r>
-              <a:rPr lang="pt-BR" dirty="0"/>
-              <a:t>3 barras</a:t>
-            </a:r>
-          </a:p>
-          <a:p>
-            <a:r>
-              <a:rPr lang="pt-BR" dirty="0"/>
-              <a:t>4 ramos</a:t>
-            </a:r>
-          </a:p>
-          <a:p>
-            <a:pPr lvl="1"/>
-            <a:endParaRPr lang="pt-BR" dirty="0"/>
-          </a:p>
-        </p:txBody>
-      </p:sp>
-    </p:spTree>
-    <p:extLst>
-      <p:ext uri="{BB962C8B-B14F-4D97-AF65-F5344CB8AC3E}">
-        <p14:creationId xmlns:p14="http://schemas.microsoft.com/office/powerpoint/2010/main" val="3158130076"/>
-      </p:ext>
-    </p:extLst>
-  </p:cSld>
-  <p:clrMapOvr>
-    <a:masterClrMapping/>
-  </p:clrMapOvr>
-</p:sld>
-</file>
-
 <file path=ppt/slides/slide2.xml><?xml version="1.0" encoding="utf-8"?>
 <p:sld xmlns:a="http://schemas.openxmlformats.org/drawingml/2006/main" xmlns:r="http://schemas.openxmlformats.org/officeDocument/2006/relationships" xmlns:p="http://schemas.openxmlformats.org/presentationml/2006/main">
   <p:cSld>
@@ -4206,7 +4152,9 @@
           </a:xfrm>
         </p:spPr>
         <p:txBody>
-          <a:bodyPr/>
+          <a:bodyPr>
+            <a:normAutofit/>
+          </a:bodyPr>
           <a:lstStyle/>
           <a:p>
             <a:pPr algn="just">
@@ -4227,13 +4175,8 @@
             </a:pPr>
             <a:r>
               <a:rPr lang="pt-BR" dirty="0"/>
-              <a:t>Desenvolvido em </a:t>
-            </a:r>
-            <a:r>
-              <a:rPr lang="pt-BR" dirty="0" err="1"/>
-              <a:t>JavaScript</a:t>
-            </a:r>
-            <a:endParaRPr lang="pt-BR" dirty="0"/>
+              <a:t>Suporte a interpretação de resultados</a:t>
+            </a:r>
           </a:p>
           <a:p>
             <a:pPr algn="just">
@@ -4345,12 +4288,132 @@
           <a:chExt cx="0" cy="0"/>
         </a:xfrm>
       </p:grpSpPr>
+      <p:sp>
+        <p:nvSpPr>
+          <p:cNvPr id="2" name="Título 1">
+            <a:extLst>
+              <a:ext uri="{FF2B5EF4-FFF2-40B4-BE49-F238E27FC236}">
+                <a16:creationId xmlns:a16="http://schemas.microsoft.com/office/drawing/2014/main" id="{F2CAC9F6-6456-4C88-B679-8859499DC83C}"/>
+              </a:ext>
+            </a:extLst>
+          </p:cNvPr>
+          <p:cNvSpPr>
+            <a:spLocks noGrp="1"/>
+          </p:cNvSpPr>
+          <p:nvPr>
+            <p:ph type="title"/>
+          </p:nvPr>
+        </p:nvSpPr>
+        <p:spPr/>
+        <p:txBody>
+          <a:bodyPr/>
+          <a:lstStyle/>
+          <a:p>
+            <a:r>
+              <a:rPr lang="pt-BR" dirty="0"/>
+              <a:t>Resultados - </a:t>
+            </a:r>
+            <a:r>
+              <a:rPr lang="pt-BR" sz="4400" dirty="0"/>
+              <a:t>https://pf-draw.netlify.app/</a:t>
+            </a:r>
+            <a:endParaRPr lang="pt-BR" dirty="0"/>
+          </a:p>
+        </p:txBody>
+      </p:sp>
+      <p:sp>
+        <p:nvSpPr>
+          <p:cNvPr id="4" name="Espaço Reservado para Data 3">
+            <a:extLst>
+              <a:ext uri="{FF2B5EF4-FFF2-40B4-BE49-F238E27FC236}">
+                <a16:creationId xmlns:a16="http://schemas.microsoft.com/office/drawing/2014/main" id="{FE283D46-9CA0-4CFE-A924-EA57DF7E54D1}"/>
+              </a:ext>
+            </a:extLst>
+          </p:cNvPr>
+          <p:cNvSpPr>
+            <a:spLocks noGrp="1"/>
+          </p:cNvSpPr>
+          <p:nvPr>
+            <p:ph type="dt" sz="half" idx="10"/>
+          </p:nvPr>
+        </p:nvSpPr>
+        <p:spPr/>
+        <p:txBody>
+          <a:bodyPr/>
+          <a:lstStyle/>
+          <a:p>
+            <a:r>
+              <a:rPr lang="pt-BR"/>
+              <a:t>Dezembro 2020</a:t>
+            </a:r>
+            <a:endParaRPr lang="pt-BR" dirty="0"/>
+          </a:p>
+        </p:txBody>
+      </p:sp>
+      <p:sp>
+        <p:nvSpPr>
+          <p:cNvPr id="5" name="Espaço Reservado para Rodapé 4">
+            <a:extLst>
+              <a:ext uri="{FF2B5EF4-FFF2-40B4-BE49-F238E27FC236}">
+                <a16:creationId xmlns:a16="http://schemas.microsoft.com/office/drawing/2014/main" id="{68E5F5AE-398A-4CB1-8C05-AD60C7F6DB9A}"/>
+              </a:ext>
+            </a:extLst>
+          </p:cNvPr>
+          <p:cNvSpPr>
+            <a:spLocks noGrp="1"/>
+          </p:cNvSpPr>
+          <p:nvPr>
+            <p:ph type="ftr" sz="quarter" idx="11"/>
+          </p:nvPr>
+        </p:nvSpPr>
+        <p:spPr/>
+        <p:txBody>
+          <a:bodyPr/>
+          <a:lstStyle/>
+          <a:p>
+            <a:r>
+              <a:rPr lang="pt-BR"/>
+              <a:t>IT743A – Cálculo de Fluxo de Carga</a:t>
+            </a:r>
+            <a:endParaRPr lang="pt-BR" dirty="0"/>
+          </a:p>
+        </p:txBody>
+      </p:sp>
+      <p:sp>
+        <p:nvSpPr>
+          <p:cNvPr id="6" name="Espaço Reservado para Número de Slide 5">
+            <a:extLst>
+              <a:ext uri="{FF2B5EF4-FFF2-40B4-BE49-F238E27FC236}">
+                <a16:creationId xmlns:a16="http://schemas.microsoft.com/office/drawing/2014/main" id="{57FDDF2D-5DA4-4272-9BC5-AE99C89F456D}"/>
+              </a:ext>
+            </a:extLst>
+          </p:cNvPr>
+          <p:cNvSpPr>
+            <a:spLocks noGrp="1"/>
+          </p:cNvSpPr>
+          <p:nvPr>
+            <p:ph type="sldNum" sz="quarter" idx="12"/>
+          </p:nvPr>
+        </p:nvSpPr>
+        <p:spPr/>
+        <p:txBody>
+          <a:bodyPr/>
+          <a:lstStyle/>
+          <a:p>
+            <a:fld id="{8579997A-84E9-4B38-967C-2D4A110C3049}" type="slidenum">
+              <a:rPr lang="pt-BR" smtClean="0"/>
+              <a:t>20</a:t>
+            </a:fld>
+            <a:endParaRPr lang="pt-BR"/>
+          </a:p>
+        </p:txBody>
+      </p:sp>
       <p:pic>
         <p:nvPicPr>
-          <p:cNvPr id="9" name="Imagem 8">
-            <a:extLst>
-              <a:ext uri="{FF2B5EF4-FFF2-40B4-BE49-F238E27FC236}">
-                <a16:creationId xmlns:a16="http://schemas.microsoft.com/office/drawing/2014/main" id="{BDC6EC00-F4C8-4B62-8BD4-015B15189C6F}"/>
+          <p:cNvPr id="8" name="Imagem 7">
+            <a:extLst>
+              <a:ext uri="{FF2B5EF4-FFF2-40B4-BE49-F238E27FC236}">
+                <a16:creationId xmlns:a16="http://schemas.microsoft.com/office/drawing/2014/main" id="{CE234FE7-F448-425E-90EE-17D5B357A955}"/>
               </a:ext>
             </a:extLst>
           </p:cNvPr>
@@ -4367,201 +4430,93 @@
         </p:blipFill>
         <p:spPr>
           <a:xfrm>
-            <a:off x="1340529" y="1356424"/>
-            <a:ext cx="10233364" cy="4999926"/>
+            <a:off x="2923712" y="1456770"/>
+            <a:ext cx="6344575" cy="2356116"/>
           </a:xfrm>
           <a:prstGeom prst="rect">
             <a:avLst/>
           </a:prstGeom>
         </p:spPr>
       </p:pic>
-      <p:sp>
-        <p:nvSpPr>
-          <p:cNvPr id="2" name="Título 1">
-            <a:extLst>
-              <a:ext uri="{FF2B5EF4-FFF2-40B4-BE49-F238E27FC236}">
-                <a16:creationId xmlns:a16="http://schemas.microsoft.com/office/drawing/2014/main" id="{F2CAC9F6-6456-4C88-B679-8859499DC83C}"/>
-              </a:ext>
-            </a:extLst>
-          </p:cNvPr>
-          <p:cNvSpPr>
-            <a:spLocks noGrp="1"/>
-          </p:cNvSpPr>
-          <p:nvPr>
-            <p:ph type="title"/>
-          </p:nvPr>
-        </p:nvSpPr>
-        <p:spPr/>
-        <p:txBody>
-          <a:bodyPr/>
-          <a:lstStyle/>
-          <a:p>
-            <a:r>
-              <a:rPr lang="pt-BR" dirty="0"/>
-              <a:t>Performance - </a:t>
-            </a:r>
-            <a:r>
-              <a:rPr lang="pt-BR" sz="4400" dirty="0"/>
-              <a:t>https://pf-draw.netlify.app/</a:t>
-            </a:r>
-            <a:endParaRPr lang="pt-BR" dirty="0"/>
-          </a:p>
-        </p:txBody>
-      </p:sp>
-      <p:sp>
-        <p:nvSpPr>
-          <p:cNvPr id="4" name="Espaço Reservado para Data 3">
-            <a:extLst>
-              <a:ext uri="{FF2B5EF4-FFF2-40B4-BE49-F238E27FC236}">
-                <a16:creationId xmlns:a16="http://schemas.microsoft.com/office/drawing/2014/main" id="{FE283D46-9CA0-4CFE-A924-EA57DF7E54D1}"/>
-              </a:ext>
-            </a:extLst>
-          </p:cNvPr>
-          <p:cNvSpPr>
-            <a:spLocks noGrp="1"/>
-          </p:cNvSpPr>
-          <p:nvPr>
-            <p:ph type="dt" sz="half" idx="10"/>
-          </p:nvPr>
-        </p:nvSpPr>
-        <p:spPr/>
-        <p:txBody>
-          <a:bodyPr/>
-          <a:lstStyle/>
-          <a:p>
-            <a:r>
-              <a:rPr lang="pt-BR"/>
-              <a:t>Dezembro 2020</a:t>
-            </a:r>
-            <a:endParaRPr lang="pt-BR" dirty="0"/>
-          </a:p>
-        </p:txBody>
-      </p:sp>
-      <p:sp>
-        <p:nvSpPr>
-          <p:cNvPr id="5" name="Espaço Reservado para Rodapé 4">
-            <a:extLst>
-              <a:ext uri="{FF2B5EF4-FFF2-40B4-BE49-F238E27FC236}">
-                <a16:creationId xmlns:a16="http://schemas.microsoft.com/office/drawing/2014/main" id="{68E5F5AE-398A-4CB1-8C05-AD60C7F6DB9A}"/>
-              </a:ext>
-            </a:extLst>
-          </p:cNvPr>
-          <p:cNvSpPr>
-            <a:spLocks noGrp="1"/>
-          </p:cNvSpPr>
-          <p:nvPr>
-            <p:ph type="ftr" sz="quarter" idx="11"/>
-          </p:nvPr>
-        </p:nvSpPr>
-        <p:spPr/>
-        <p:txBody>
-          <a:bodyPr/>
-          <a:lstStyle/>
-          <a:p>
-            <a:r>
-              <a:rPr lang="pt-BR"/>
-              <a:t>IT743A – Cálculo de Fluxo de Carga</a:t>
-            </a:r>
-            <a:endParaRPr lang="pt-BR" dirty="0"/>
-          </a:p>
-        </p:txBody>
-      </p:sp>
-      <p:sp>
-        <p:nvSpPr>
-          <p:cNvPr id="6" name="Espaço Reservado para Número de Slide 5">
-            <a:extLst>
-              <a:ext uri="{FF2B5EF4-FFF2-40B4-BE49-F238E27FC236}">
-                <a16:creationId xmlns:a16="http://schemas.microsoft.com/office/drawing/2014/main" id="{57FDDF2D-5DA4-4272-9BC5-AE99C89F456D}"/>
-              </a:ext>
-            </a:extLst>
-          </p:cNvPr>
-          <p:cNvSpPr>
-            <a:spLocks noGrp="1"/>
-          </p:cNvSpPr>
-          <p:nvPr>
-            <p:ph type="sldNum" sz="quarter" idx="12"/>
-          </p:nvPr>
-        </p:nvSpPr>
-        <p:spPr/>
-        <p:txBody>
-          <a:bodyPr/>
-          <a:lstStyle/>
-          <a:p>
-            <a:fld id="{8579997A-84E9-4B38-967C-2D4A110C3049}" type="slidenum">
-              <a:rPr lang="pt-BR" smtClean="0"/>
-              <a:t>20</a:t>
-            </a:fld>
-            <a:endParaRPr lang="pt-BR"/>
-          </a:p>
-        </p:txBody>
-      </p:sp>
-      <p:sp>
-        <p:nvSpPr>
-          <p:cNvPr id="16" name="Espaço Reservado para Conteúdo 6">
-            <a:extLst>
-              <a:ext uri="{FF2B5EF4-FFF2-40B4-BE49-F238E27FC236}">
-                <a16:creationId xmlns:a16="http://schemas.microsoft.com/office/drawing/2014/main" id="{AC52CD35-10DE-4EB5-8666-A30B457793A1}"/>
-              </a:ext>
-            </a:extLst>
-          </p:cNvPr>
-          <p:cNvSpPr>
-            <a:spLocks noGrp="1"/>
-          </p:cNvSpPr>
-          <p:nvPr>
-            <p:ph idx="1"/>
-          </p:nvPr>
-        </p:nvSpPr>
+      <p:pic>
+        <p:nvPicPr>
+          <p:cNvPr id="11" name="Imagem 10">
+            <a:extLst>
+              <a:ext uri="{FF2B5EF4-FFF2-40B4-BE49-F238E27FC236}">
+                <a16:creationId xmlns:a16="http://schemas.microsoft.com/office/drawing/2014/main" id="{C0B3A731-D06F-490E-A462-EB76E563C99F}"/>
+              </a:ext>
+            </a:extLst>
+          </p:cNvPr>
+          <p:cNvPicPr>
+            <a:picLocks noChangeAspect="1"/>
+          </p:cNvPicPr>
+          <p:nvPr/>
+        </p:nvPicPr>
+        <p:blipFill>
+          <a:blip r:embed="rId3"/>
+          <a:stretch>
+            <a:fillRect/>
+          </a:stretch>
+        </p:blipFill>
         <p:spPr>
           <a:xfrm>
-            <a:off x="4105537" y="2150045"/>
-            <a:ext cx="3396095" cy="1325563"/>
+            <a:off x="2757486" y="4003675"/>
+            <a:ext cx="6677025" cy="2352675"/>
           </a:xfrm>
-          <a:solidFill>
-            <a:schemeClr val="bg1"/>
-          </a:solidFill>
+          <a:prstGeom prst="rect">
+            <a:avLst/>
+          </a:prstGeom>
         </p:spPr>
-        <p:txBody>
-          <a:bodyPr>
-            <a:normAutofit fontScale="70000" lnSpcReduction="20000"/>
-          </a:bodyPr>
-          <a:lstStyle/>
-          <a:p>
-            <a:r>
-              <a:rPr lang="pt-BR" dirty="0"/>
-              <a:t>Sistema IEE 30 Barras (original)</a:t>
-            </a:r>
-          </a:p>
-          <a:p>
-            <a:pPr lvl="1"/>
-            <a:r>
-              <a:rPr lang="pt-BR" dirty="0"/>
-              <a:t>Convergência 0.01</a:t>
-            </a:r>
-          </a:p>
-          <a:p>
-            <a:pPr lvl="1"/>
-            <a:r>
-              <a:rPr lang="pt-BR" dirty="0"/>
-              <a:t>30 barras</a:t>
-            </a:r>
-          </a:p>
-          <a:p>
-            <a:pPr lvl="1"/>
-            <a:r>
-              <a:rPr lang="pt-BR" dirty="0"/>
-              <a:t>41 ramos</a:t>
-            </a:r>
-          </a:p>
-          <a:p>
-            <a:pPr lvl="1"/>
-            <a:endParaRPr lang="pt-BR" dirty="0"/>
-          </a:p>
-        </p:txBody>
-      </p:sp>
+      </p:pic>
+      <p:cxnSp>
+        <p:nvCxnSpPr>
+          <p:cNvPr id="19" name="Conector: Curvo 18">
+            <a:extLst>
+              <a:ext uri="{FF2B5EF4-FFF2-40B4-BE49-F238E27FC236}">
+                <a16:creationId xmlns:a16="http://schemas.microsoft.com/office/drawing/2014/main" id="{3F55A7C8-1F93-4170-BC55-BB943F046D9E}"/>
+              </a:ext>
+            </a:extLst>
+          </p:cNvPr>
+          <p:cNvCxnSpPr>
+            <a:cxnSpLocks/>
+            <a:stCxn id="8" idx="3"/>
+            <a:endCxn id="11" idx="3"/>
+          </p:cNvCxnSpPr>
+          <p:nvPr/>
+        </p:nvCxnSpPr>
+        <p:spPr>
+          <a:xfrm>
+            <a:off x="9268287" y="2634828"/>
+            <a:ext cx="166224" cy="2545185"/>
+          </a:xfrm>
+          <a:prstGeom prst="curvedConnector3">
+            <a:avLst>
+              <a:gd name="adj1" fmla="val 590016"/>
+            </a:avLst>
+          </a:prstGeom>
+          <a:ln>
+            <a:tailEnd type="triangle"/>
+          </a:ln>
+        </p:spPr>
+        <p:style>
+          <a:lnRef idx="3">
+            <a:schemeClr val="accent1"/>
+          </a:lnRef>
+          <a:fillRef idx="0">
+            <a:schemeClr val="accent1"/>
+          </a:fillRef>
+          <a:effectRef idx="2">
+            <a:schemeClr val="accent1"/>
+          </a:effectRef>
+          <a:fontRef idx="minor">
+            <a:schemeClr val="tx1"/>
+          </a:fontRef>
+        </p:style>
+      </p:cxnSp>
     </p:spTree>
     <p:extLst>
       <p:ext uri="{BB962C8B-B14F-4D97-AF65-F5344CB8AC3E}">
-        <p14:creationId xmlns:p14="http://schemas.microsoft.com/office/powerpoint/2010/main" val="978096935"/>
+        <p14:creationId xmlns:p14="http://schemas.microsoft.com/office/powerpoint/2010/main" val="1623081595"/>
       </p:ext>
     </p:extLst>
   </p:cSld>
@@ -4588,6 +4543,1001 @@
           <a:chExt cx="0" cy="0"/>
         </a:xfrm>
       </p:grpSpPr>
+      <p:sp>
+        <p:nvSpPr>
+          <p:cNvPr id="2" name="Título 1">
+            <a:extLst>
+              <a:ext uri="{FF2B5EF4-FFF2-40B4-BE49-F238E27FC236}">
+                <a16:creationId xmlns:a16="http://schemas.microsoft.com/office/drawing/2014/main" id="{F2CAC9F6-6456-4C88-B679-8859499DC83C}"/>
+              </a:ext>
+            </a:extLst>
+          </p:cNvPr>
+          <p:cNvSpPr>
+            <a:spLocks noGrp="1"/>
+          </p:cNvSpPr>
+          <p:nvPr>
+            <p:ph type="title"/>
+          </p:nvPr>
+        </p:nvSpPr>
+        <p:spPr/>
+        <p:txBody>
+          <a:bodyPr/>
+          <a:lstStyle/>
+          <a:p>
+            <a:r>
+              <a:rPr lang="pt-BR" dirty="0"/>
+              <a:t>Resultados - </a:t>
+            </a:r>
+            <a:r>
+              <a:rPr lang="pt-BR" sz="4400" dirty="0"/>
+              <a:t>https://pf-draw.netlify.app/</a:t>
+            </a:r>
+            <a:endParaRPr lang="pt-BR" dirty="0"/>
+          </a:p>
+        </p:txBody>
+      </p:sp>
+      <p:sp>
+        <p:nvSpPr>
+          <p:cNvPr id="4" name="Espaço Reservado para Data 3">
+            <a:extLst>
+              <a:ext uri="{FF2B5EF4-FFF2-40B4-BE49-F238E27FC236}">
+                <a16:creationId xmlns:a16="http://schemas.microsoft.com/office/drawing/2014/main" id="{FE283D46-9CA0-4CFE-A924-EA57DF7E54D1}"/>
+              </a:ext>
+            </a:extLst>
+          </p:cNvPr>
+          <p:cNvSpPr>
+            <a:spLocks noGrp="1"/>
+          </p:cNvSpPr>
+          <p:nvPr>
+            <p:ph type="dt" sz="half" idx="10"/>
+          </p:nvPr>
+        </p:nvSpPr>
+        <p:spPr/>
+        <p:txBody>
+          <a:bodyPr/>
+          <a:lstStyle/>
+          <a:p>
+            <a:r>
+              <a:rPr lang="pt-BR"/>
+              <a:t>Dezembro 2020</a:t>
+            </a:r>
+            <a:endParaRPr lang="pt-BR" dirty="0"/>
+          </a:p>
+        </p:txBody>
+      </p:sp>
+      <p:sp>
+        <p:nvSpPr>
+          <p:cNvPr id="5" name="Espaço Reservado para Rodapé 4">
+            <a:extLst>
+              <a:ext uri="{FF2B5EF4-FFF2-40B4-BE49-F238E27FC236}">
+                <a16:creationId xmlns:a16="http://schemas.microsoft.com/office/drawing/2014/main" id="{68E5F5AE-398A-4CB1-8C05-AD60C7F6DB9A}"/>
+              </a:ext>
+            </a:extLst>
+          </p:cNvPr>
+          <p:cNvSpPr>
+            <a:spLocks noGrp="1"/>
+          </p:cNvSpPr>
+          <p:nvPr>
+            <p:ph type="ftr" sz="quarter" idx="11"/>
+          </p:nvPr>
+        </p:nvSpPr>
+        <p:spPr/>
+        <p:txBody>
+          <a:bodyPr/>
+          <a:lstStyle/>
+          <a:p>
+            <a:r>
+              <a:rPr lang="pt-BR"/>
+              <a:t>IT743A – Cálculo de Fluxo de Carga</a:t>
+            </a:r>
+            <a:endParaRPr lang="pt-BR" dirty="0"/>
+          </a:p>
+        </p:txBody>
+      </p:sp>
+      <p:sp>
+        <p:nvSpPr>
+          <p:cNvPr id="6" name="Espaço Reservado para Número de Slide 5">
+            <a:extLst>
+              <a:ext uri="{FF2B5EF4-FFF2-40B4-BE49-F238E27FC236}">
+                <a16:creationId xmlns:a16="http://schemas.microsoft.com/office/drawing/2014/main" id="{57FDDF2D-5DA4-4272-9BC5-AE99C89F456D}"/>
+              </a:ext>
+            </a:extLst>
+          </p:cNvPr>
+          <p:cNvSpPr>
+            <a:spLocks noGrp="1"/>
+          </p:cNvSpPr>
+          <p:nvPr>
+            <p:ph type="sldNum" sz="quarter" idx="12"/>
+          </p:nvPr>
+        </p:nvSpPr>
+        <p:spPr/>
+        <p:txBody>
+          <a:bodyPr/>
+          <a:lstStyle/>
+          <a:p>
+            <a:fld id="{8579997A-84E9-4B38-967C-2D4A110C3049}" type="slidenum">
+              <a:rPr lang="pt-BR" smtClean="0"/>
+              <a:t>21</a:t>
+            </a:fld>
+            <a:endParaRPr lang="pt-BR"/>
+          </a:p>
+        </p:txBody>
+      </p:sp>
+      <p:pic>
+        <p:nvPicPr>
+          <p:cNvPr id="7" name="Imagem 6">
+            <a:extLst>
+              <a:ext uri="{FF2B5EF4-FFF2-40B4-BE49-F238E27FC236}">
+                <a16:creationId xmlns:a16="http://schemas.microsoft.com/office/drawing/2014/main" id="{B3924481-1448-48D4-B095-242895B8495E}"/>
+              </a:ext>
+            </a:extLst>
+          </p:cNvPr>
+          <p:cNvPicPr>
+            <a:picLocks noChangeAspect="1"/>
+          </p:cNvPicPr>
+          <p:nvPr/>
+        </p:nvPicPr>
+        <p:blipFill>
+          <a:blip r:embed="rId2"/>
+          <a:stretch>
+            <a:fillRect/>
+          </a:stretch>
+        </p:blipFill>
+        <p:spPr>
+          <a:xfrm>
+            <a:off x="951760" y="1315953"/>
+            <a:ext cx="10288480" cy="5040397"/>
+          </a:xfrm>
+          <a:prstGeom prst="rect">
+            <a:avLst/>
+          </a:prstGeom>
+        </p:spPr>
+      </p:pic>
+    </p:spTree>
+    <p:extLst>
+      <p:ext uri="{BB962C8B-B14F-4D97-AF65-F5344CB8AC3E}">
+        <p14:creationId xmlns:p14="http://schemas.microsoft.com/office/powerpoint/2010/main" val="3335406736"/>
+      </p:ext>
+    </p:extLst>
+  </p:cSld>
+  <p:clrMapOvr>
+    <a:masterClrMapping/>
+  </p:clrMapOvr>
+</p:sld>
+</file>
+
+<file path=ppt/slides/slide22.xml><?xml version="1.0" encoding="utf-8"?>
+<p:sld xmlns:a="http://schemas.openxmlformats.org/drawingml/2006/main" xmlns:r="http://schemas.openxmlformats.org/officeDocument/2006/relationships" xmlns:p="http://schemas.openxmlformats.org/presentationml/2006/main">
+  <p:cSld>
+    <p:spTree>
+      <p:nvGrpSpPr>
+        <p:cNvPr id="1" name=""/>
+        <p:cNvGrpSpPr/>
+        <p:nvPr/>
+      </p:nvGrpSpPr>
+      <p:grpSpPr>
+        <a:xfrm>
+          <a:off x="0" y="0"/>
+          <a:ext cx="0" cy="0"/>
+          <a:chOff x="0" y="0"/>
+          <a:chExt cx="0" cy="0"/>
+        </a:xfrm>
+      </p:grpSpPr>
+      <p:sp>
+        <p:nvSpPr>
+          <p:cNvPr id="2" name="Título 1">
+            <a:extLst>
+              <a:ext uri="{FF2B5EF4-FFF2-40B4-BE49-F238E27FC236}">
+                <a16:creationId xmlns:a16="http://schemas.microsoft.com/office/drawing/2014/main" id="{F2CAC9F6-6456-4C88-B679-8859499DC83C}"/>
+              </a:ext>
+            </a:extLst>
+          </p:cNvPr>
+          <p:cNvSpPr>
+            <a:spLocks noGrp="1"/>
+          </p:cNvSpPr>
+          <p:nvPr>
+            <p:ph type="title"/>
+          </p:nvPr>
+        </p:nvSpPr>
+        <p:spPr/>
+        <p:txBody>
+          <a:bodyPr/>
+          <a:lstStyle/>
+          <a:p>
+            <a:r>
+              <a:rPr lang="pt-BR" dirty="0"/>
+              <a:t>Resultados - </a:t>
+            </a:r>
+            <a:r>
+              <a:rPr lang="pt-BR" sz="4400" dirty="0"/>
+              <a:t>https://pf-draw.netlify.app/</a:t>
+            </a:r>
+            <a:endParaRPr lang="pt-BR" dirty="0"/>
+          </a:p>
+        </p:txBody>
+      </p:sp>
+      <p:sp>
+        <p:nvSpPr>
+          <p:cNvPr id="4" name="Espaço Reservado para Data 3">
+            <a:extLst>
+              <a:ext uri="{FF2B5EF4-FFF2-40B4-BE49-F238E27FC236}">
+                <a16:creationId xmlns:a16="http://schemas.microsoft.com/office/drawing/2014/main" id="{FE283D46-9CA0-4CFE-A924-EA57DF7E54D1}"/>
+              </a:ext>
+            </a:extLst>
+          </p:cNvPr>
+          <p:cNvSpPr>
+            <a:spLocks noGrp="1"/>
+          </p:cNvSpPr>
+          <p:nvPr>
+            <p:ph type="dt" sz="half" idx="10"/>
+          </p:nvPr>
+        </p:nvSpPr>
+        <p:spPr/>
+        <p:txBody>
+          <a:bodyPr/>
+          <a:lstStyle/>
+          <a:p>
+            <a:r>
+              <a:rPr lang="pt-BR"/>
+              <a:t>Dezembro 2020</a:t>
+            </a:r>
+            <a:endParaRPr lang="pt-BR" dirty="0"/>
+          </a:p>
+        </p:txBody>
+      </p:sp>
+      <p:sp>
+        <p:nvSpPr>
+          <p:cNvPr id="5" name="Espaço Reservado para Rodapé 4">
+            <a:extLst>
+              <a:ext uri="{FF2B5EF4-FFF2-40B4-BE49-F238E27FC236}">
+                <a16:creationId xmlns:a16="http://schemas.microsoft.com/office/drawing/2014/main" id="{68E5F5AE-398A-4CB1-8C05-AD60C7F6DB9A}"/>
+              </a:ext>
+            </a:extLst>
+          </p:cNvPr>
+          <p:cNvSpPr>
+            <a:spLocks noGrp="1"/>
+          </p:cNvSpPr>
+          <p:nvPr>
+            <p:ph type="ftr" sz="quarter" idx="11"/>
+          </p:nvPr>
+        </p:nvSpPr>
+        <p:spPr/>
+        <p:txBody>
+          <a:bodyPr/>
+          <a:lstStyle/>
+          <a:p>
+            <a:r>
+              <a:rPr lang="pt-BR"/>
+              <a:t>IT743A – Cálculo de Fluxo de Carga</a:t>
+            </a:r>
+            <a:endParaRPr lang="pt-BR" dirty="0"/>
+          </a:p>
+        </p:txBody>
+      </p:sp>
+      <p:sp>
+        <p:nvSpPr>
+          <p:cNvPr id="6" name="Espaço Reservado para Número de Slide 5">
+            <a:extLst>
+              <a:ext uri="{FF2B5EF4-FFF2-40B4-BE49-F238E27FC236}">
+                <a16:creationId xmlns:a16="http://schemas.microsoft.com/office/drawing/2014/main" id="{57FDDF2D-5DA4-4272-9BC5-AE99C89F456D}"/>
+              </a:ext>
+            </a:extLst>
+          </p:cNvPr>
+          <p:cNvSpPr>
+            <a:spLocks noGrp="1"/>
+          </p:cNvSpPr>
+          <p:nvPr>
+            <p:ph type="sldNum" sz="quarter" idx="12"/>
+          </p:nvPr>
+        </p:nvSpPr>
+        <p:spPr/>
+        <p:txBody>
+          <a:bodyPr/>
+          <a:lstStyle/>
+          <a:p>
+            <a:fld id="{8579997A-84E9-4B38-967C-2D4A110C3049}" type="slidenum">
+              <a:rPr lang="pt-BR" smtClean="0"/>
+              <a:t>22</a:t>
+            </a:fld>
+            <a:endParaRPr lang="pt-BR"/>
+          </a:p>
+        </p:txBody>
+      </p:sp>
+      <p:pic>
+        <p:nvPicPr>
+          <p:cNvPr id="7" name="Imagem 6">
+            <a:extLst>
+              <a:ext uri="{FF2B5EF4-FFF2-40B4-BE49-F238E27FC236}">
+                <a16:creationId xmlns:a16="http://schemas.microsoft.com/office/drawing/2014/main" id="{C5ED263F-6EB5-4E00-B604-3EF2BD619738}"/>
+              </a:ext>
+            </a:extLst>
+          </p:cNvPr>
+          <p:cNvPicPr>
+            <a:picLocks noChangeAspect="1"/>
+          </p:cNvPicPr>
+          <p:nvPr/>
+        </p:nvPicPr>
+        <p:blipFill rotWithShape="1">
+          <a:blip r:embed="rId2"/>
+          <a:srcRect t="1519" b="71720"/>
+          <a:stretch/>
+        </p:blipFill>
+        <p:spPr>
+          <a:xfrm>
+            <a:off x="934282" y="1487161"/>
+            <a:ext cx="3769311" cy="1753189"/>
+          </a:xfrm>
+          <a:prstGeom prst="rect">
+            <a:avLst/>
+          </a:prstGeom>
+        </p:spPr>
+      </p:pic>
+      <p:pic>
+        <p:nvPicPr>
+          <p:cNvPr id="11" name="Imagem 10">
+            <a:extLst>
+              <a:ext uri="{FF2B5EF4-FFF2-40B4-BE49-F238E27FC236}">
+                <a16:creationId xmlns:a16="http://schemas.microsoft.com/office/drawing/2014/main" id="{3C6C2E0A-F524-42F5-9146-6A7DBCD249B6}"/>
+              </a:ext>
+            </a:extLst>
+          </p:cNvPr>
+          <p:cNvPicPr>
+            <a:picLocks noChangeAspect="1"/>
+          </p:cNvPicPr>
+          <p:nvPr/>
+        </p:nvPicPr>
+        <p:blipFill>
+          <a:blip r:embed="rId3"/>
+          <a:stretch>
+            <a:fillRect/>
+          </a:stretch>
+        </p:blipFill>
+        <p:spPr>
+          <a:xfrm>
+            <a:off x="1031935" y="3888161"/>
+            <a:ext cx="3769311" cy="2468189"/>
+          </a:xfrm>
+          <a:prstGeom prst="rect">
+            <a:avLst/>
+          </a:prstGeom>
+        </p:spPr>
+      </p:pic>
+      <p:sp>
+        <p:nvSpPr>
+          <p:cNvPr id="12" name="CaixaDeTexto 11">
+            <a:extLst>
+              <a:ext uri="{FF2B5EF4-FFF2-40B4-BE49-F238E27FC236}">
+                <a16:creationId xmlns:a16="http://schemas.microsoft.com/office/drawing/2014/main" id="{3E247734-6AFC-4FE5-904B-ED47ED7E7B9F}"/>
+              </a:ext>
+            </a:extLst>
+          </p:cNvPr>
+          <p:cNvSpPr txBox="1"/>
+          <p:nvPr/>
+        </p:nvSpPr>
+        <p:spPr>
+          <a:xfrm>
+            <a:off x="2512380" y="3429000"/>
+            <a:ext cx="541537" cy="369332"/>
+          </a:xfrm>
+          <a:prstGeom prst="rect">
+            <a:avLst/>
+          </a:prstGeom>
+          <a:noFill/>
+        </p:spPr>
+        <p:txBody>
+          <a:bodyPr wrap="square" rtlCol="0">
+            <a:spAutoFit/>
+          </a:bodyPr>
+          <a:lstStyle/>
+          <a:p>
+            <a:r>
+              <a:rPr lang="pt-BR" dirty="0"/>
+              <a:t>. . . </a:t>
+            </a:r>
+          </a:p>
+        </p:txBody>
+      </p:sp>
+      <p:pic>
+        <p:nvPicPr>
+          <p:cNvPr id="14" name="Imagem 13">
+            <a:extLst>
+              <a:ext uri="{FF2B5EF4-FFF2-40B4-BE49-F238E27FC236}">
+                <a16:creationId xmlns:a16="http://schemas.microsoft.com/office/drawing/2014/main" id="{3127A50C-1E61-498E-89E9-5A8D8F4F209E}"/>
+              </a:ext>
+            </a:extLst>
+          </p:cNvPr>
+          <p:cNvPicPr>
+            <a:picLocks noChangeAspect="1"/>
+          </p:cNvPicPr>
+          <p:nvPr/>
+        </p:nvPicPr>
+        <p:blipFill rotWithShape="1">
+          <a:blip r:embed="rId4"/>
+          <a:srcRect b="48166"/>
+          <a:stretch/>
+        </p:blipFill>
+        <p:spPr>
+          <a:xfrm>
+            <a:off x="5698678" y="1487161"/>
+            <a:ext cx="5655122" cy="1753189"/>
+          </a:xfrm>
+          <a:prstGeom prst="rect">
+            <a:avLst/>
+          </a:prstGeom>
+        </p:spPr>
+      </p:pic>
+      <p:sp>
+        <p:nvSpPr>
+          <p:cNvPr id="15" name="CaixaDeTexto 14">
+            <a:extLst>
+              <a:ext uri="{FF2B5EF4-FFF2-40B4-BE49-F238E27FC236}">
+                <a16:creationId xmlns:a16="http://schemas.microsoft.com/office/drawing/2014/main" id="{44975175-7073-4313-93D9-DCD7E3415925}"/>
+              </a:ext>
+            </a:extLst>
+          </p:cNvPr>
+          <p:cNvSpPr txBox="1"/>
+          <p:nvPr/>
+        </p:nvSpPr>
+        <p:spPr>
+          <a:xfrm>
+            <a:off x="8255470" y="3316260"/>
+            <a:ext cx="541537" cy="369332"/>
+          </a:xfrm>
+          <a:prstGeom prst="rect">
+            <a:avLst/>
+          </a:prstGeom>
+          <a:noFill/>
+        </p:spPr>
+        <p:txBody>
+          <a:bodyPr wrap="square" rtlCol="0">
+            <a:spAutoFit/>
+          </a:bodyPr>
+          <a:lstStyle/>
+          <a:p>
+            <a:r>
+              <a:rPr lang="pt-BR" dirty="0"/>
+              <a:t>. . . </a:t>
+            </a:r>
+          </a:p>
+        </p:txBody>
+      </p:sp>
+      <p:pic>
+        <p:nvPicPr>
+          <p:cNvPr id="17" name="Imagem 16">
+            <a:extLst>
+              <a:ext uri="{FF2B5EF4-FFF2-40B4-BE49-F238E27FC236}">
+                <a16:creationId xmlns:a16="http://schemas.microsoft.com/office/drawing/2014/main" id="{0B85208B-74D9-4AE2-AA51-D86A4BD0BD8D}"/>
+              </a:ext>
+            </a:extLst>
+          </p:cNvPr>
+          <p:cNvPicPr>
+            <a:picLocks noChangeAspect="1"/>
+          </p:cNvPicPr>
+          <p:nvPr/>
+        </p:nvPicPr>
+        <p:blipFill rotWithShape="1">
+          <a:blip r:embed="rId5"/>
+          <a:srcRect t="49360"/>
+          <a:stretch/>
+        </p:blipFill>
+        <p:spPr>
+          <a:xfrm>
+            <a:off x="5599313" y="3761502"/>
+            <a:ext cx="5754487" cy="2618362"/>
+          </a:xfrm>
+          <a:prstGeom prst="rect">
+            <a:avLst/>
+          </a:prstGeom>
+        </p:spPr>
+      </p:pic>
+    </p:spTree>
+    <p:extLst>
+      <p:ext uri="{BB962C8B-B14F-4D97-AF65-F5344CB8AC3E}">
+        <p14:creationId xmlns:p14="http://schemas.microsoft.com/office/powerpoint/2010/main" val="2416041880"/>
+      </p:ext>
+    </p:extLst>
+  </p:cSld>
+  <p:clrMapOvr>
+    <a:masterClrMapping/>
+  </p:clrMapOvr>
+</p:sld>
+</file>
+
+<file path=ppt/slides/slide23.xml><?xml version="1.0" encoding="utf-8"?>
+<p:sld xmlns:a="http://schemas.openxmlformats.org/drawingml/2006/main" xmlns:r="http://schemas.openxmlformats.org/officeDocument/2006/relationships" xmlns:p="http://schemas.openxmlformats.org/presentationml/2006/main">
+  <p:cSld>
+    <p:spTree>
+      <p:nvGrpSpPr>
+        <p:cNvPr id="1" name=""/>
+        <p:cNvGrpSpPr/>
+        <p:nvPr/>
+      </p:nvGrpSpPr>
+      <p:grpSpPr>
+        <a:xfrm>
+          <a:off x="0" y="0"/>
+          <a:ext cx="0" cy="0"/>
+          <a:chOff x="0" y="0"/>
+          <a:chExt cx="0" cy="0"/>
+        </a:xfrm>
+      </p:grpSpPr>
+      <p:pic>
+        <p:nvPicPr>
+          <p:cNvPr id="18" name="Imagem 17">
+            <a:extLst>
+              <a:ext uri="{FF2B5EF4-FFF2-40B4-BE49-F238E27FC236}">
+                <a16:creationId xmlns:a16="http://schemas.microsoft.com/office/drawing/2014/main" id="{5A7B6FA1-6656-475D-A031-44698C0B206B}"/>
+              </a:ext>
+            </a:extLst>
+          </p:cNvPr>
+          <p:cNvPicPr>
+            <a:picLocks noChangeAspect="1"/>
+          </p:cNvPicPr>
+          <p:nvPr/>
+        </p:nvPicPr>
+        <p:blipFill>
+          <a:blip r:embed="rId2"/>
+          <a:stretch>
+            <a:fillRect/>
+          </a:stretch>
+        </p:blipFill>
+        <p:spPr>
+          <a:xfrm>
+            <a:off x="2644759" y="1330701"/>
+            <a:ext cx="8929133" cy="5025649"/>
+          </a:xfrm>
+          <a:prstGeom prst="rect">
+            <a:avLst/>
+          </a:prstGeom>
+        </p:spPr>
+      </p:pic>
+      <p:sp>
+        <p:nvSpPr>
+          <p:cNvPr id="2" name="Título 1">
+            <a:extLst>
+              <a:ext uri="{FF2B5EF4-FFF2-40B4-BE49-F238E27FC236}">
+                <a16:creationId xmlns:a16="http://schemas.microsoft.com/office/drawing/2014/main" id="{F2CAC9F6-6456-4C88-B679-8859499DC83C}"/>
+              </a:ext>
+            </a:extLst>
+          </p:cNvPr>
+          <p:cNvSpPr>
+            <a:spLocks noGrp="1"/>
+          </p:cNvSpPr>
+          <p:nvPr>
+            <p:ph type="title"/>
+          </p:nvPr>
+        </p:nvSpPr>
+        <p:spPr/>
+        <p:txBody>
+          <a:bodyPr/>
+          <a:lstStyle/>
+          <a:p>
+            <a:r>
+              <a:rPr lang="pt-BR" dirty="0"/>
+              <a:t>Performance - </a:t>
+            </a:r>
+            <a:r>
+              <a:rPr lang="pt-BR" sz="4400" dirty="0"/>
+              <a:t>https://pf-draw.netlify.app/</a:t>
+            </a:r>
+            <a:endParaRPr lang="pt-BR" dirty="0"/>
+          </a:p>
+        </p:txBody>
+      </p:sp>
+      <p:sp>
+        <p:nvSpPr>
+          <p:cNvPr id="4" name="Espaço Reservado para Data 3">
+            <a:extLst>
+              <a:ext uri="{FF2B5EF4-FFF2-40B4-BE49-F238E27FC236}">
+                <a16:creationId xmlns:a16="http://schemas.microsoft.com/office/drawing/2014/main" id="{FE283D46-9CA0-4CFE-A924-EA57DF7E54D1}"/>
+              </a:ext>
+            </a:extLst>
+          </p:cNvPr>
+          <p:cNvSpPr>
+            <a:spLocks noGrp="1"/>
+          </p:cNvSpPr>
+          <p:nvPr>
+            <p:ph type="dt" sz="half" idx="10"/>
+          </p:nvPr>
+        </p:nvSpPr>
+        <p:spPr/>
+        <p:txBody>
+          <a:bodyPr/>
+          <a:lstStyle/>
+          <a:p>
+            <a:r>
+              <a:rPr lang="pt-BR"/>
+              <a:t>Dezembro 2020</a:t>
+            </a:r>
+            <a:endParaRPr lang="pt-BR" dirty="0"/>
+          </a:p>
+        </p:txBody>
+      </p:sp>
+      <p:sp>
+        <p:nvSpPr>
+          <p:cNvPr id="5" name="Espaço Reservado para Rodapé 4">
+            <a:extLst>
+              <a:ext uri="{FF2B5EF4-FFF2-40B4-BE49-F238E27FC236}">
+                <a16:creationId xmlns:a16="http://schemas.microsoft.com/office/drawing/2014/main" id="{68E5F5AE-398A-4CB1-8C05-AD60C7F6DB9A}"/>
+              </a:ext>
+            </a:extLst>
+          </p:cNvPr>
+          <p:cNvSpPr>
+            <a:spLocks noGrp="1"/>
+          </p:cNvSpPr>
+          <p:nvPr>
+            <p:ph type="ftr" sz="quarter" idx="11"/>
+          </p:nvPr>
+        </p:nvSpPr>
+        <p:spPr/>
+        <p:txBody>
+          <a:bodyPr/>
+          <a:lstStyle/>
+          <a:p>
+            <a:r>
+              <a:rPr lang="pt-BR"/>
+              <a:t>IT743A – Cálculo de Fluxo de Carga</a:t>
+            </a:r>
+            <a:endParaRPr lang="pt-BR" dirty="0"/>
+          </a:p>
+        </p:txBody>
+      </p:sp>
+      <p:sp>
+        <p:nvSpPr>
+          <p:cNvPr id="6" name="Espaço Reservado para Número de Slide 5">
+            <a:extLst>
+              <a:ext uri="{FF2B5EF4-FFF2-40B4-BE49-F238E27FC236}">
+                <a16:creationId xmlns:a16="http://schemas.microsoft.com/office/drawing/2014/main" id="{57FDDF2D-5DA4-4272-9BC5-AE99C89F456D}"/>
+              </a:ext>
+            </a:extLst>
+          </p:cNvPr>
+          <p:cNvSpPr>
+            <a:spLocks noGrp="1"/>
+          </p:cNvSpPr>
+          <p:nvPr>
+            <p:ph type="sldNum" sz="quarter" idx="12"/>
+          </p:nvPr>
+        </p:nvSpPr>
+        <p:spPr/>
+        <p:txBody>
+          <a:bodyPr/>
+          <a:lstStyle/>
+          <a:p>
+            <a:fld id="{8579997A-84E9-4B38-967C-2D4A110C3049}" type="slidenum">
+              <a:rPr lang="pt-BR" smtClean="0"/>
+              <a:t>23</a:t>
+            </a:fld>
+            <a:endParaRPr lang="pt-BR"/>
+          </a:p>
+        </p:txBody>
+      </p:sp>
+      <p:sp>
+        <p:nvSpPr>
+          <p:cNvPr id="16" name="Espaço Reservado para Conteúdo 6">
+            <a:extLst>
+              <a:ext uri="{FF2B5EF4-FFF2-40B4-BE49-F238E27FC236}">
+                <a16:creationId xmlns:a16="http://schemas.microsoft.com/office/drawing/2014/main" id="{AC52CD35-10DE-4EB5-8666-A30B457793A1}"/>
+              </a:ext>
+            </a:extLst>
+          </p:cNvPr>
+          <p:cNvSpPr>
+            <a:spLocks noGrp="1"/>
+          </p:cNvSpPr>
+          <p:nvPr>
+            <p:ph idx="1"/>
+          </p:nvPr>
+        </p:nvSpPr>
+        <p:spPr>
+          <a:xfrm>
+            <a:off x="618108" y="1418995"/>
+            <a:ext cx="4628595" cy="4351338"/>
+          </a:xfrm>
+        </p:spPr>
+        <p:txBody>
+          <a:bodyPr>
+            <a:normAutofit/>
+          </a:bodyPr>
+          <a:lstStyle/>
+          <a:p>
+            <a:r>
+              <a:rPr lang="pt-BR" dirty="0" err="1"/>
+              <a:t>Err</a:t>
+            </a:r>
+            <a:r>
+              <a:rPr lang="pt-BR" dirty="0"/>
+              <a:t>. 0.01</a:t>
+            </a:r>
+          </a:p>
+          <a:p>
+            <a:r>
+              <a:rPr lang="pt-BR" dirty="0"/>
+              <a:t>3 barras</a:t>
+            </a:r>
+          </a:p>
+          <a:p>
+            <a:r>
+              <a:rPr lang="pt-BR" dirty="0"/>
+              <a:t>4 ramos</a:t>
+            </a:r>
+          </a:p>
+          <a:p>
+            <a:pPr lvl="1"/>
+            <a:endParaRPr lang="pt-BR" dirty="0"/>
+          </a:p>
+        </p:txBody>
+      </p:sp>
+    </p:spTree>
+    <p:extLst>
+      <p:ext uri="{BB962C8B-B14F-4D97-AF65-F5344CB8AC3E}">
+        <p14:creationId xmlns:p14="http://schemas.microsoft.com/office/powerpoint/2010/main" val="3158130076"/>
+      </p:ext>
+    </p:extLst>
+  </p:cSld>
+  <p:clrMapOvr>
+    <a:masterClrMapping/>
+  </p:clrMapOvr>
+</p:sld>
+</file>
+
+<file path=ppt/slides/slide24.xml><?xml version="1.0" encoding="utf-8"?>
+<p:sld xmlns:a="http://schemas.openxmlformats.org/drawingml/2006/main" xmlns:r="http://schemas.openxmlformats.org/officeDocument/2006/relationships" xmlns:p="http://schemas.openxmlformats.org/presentationml/2006/main">
+  <p:cSld>
+    <p:spTree>
+      <p:nvGrpSpPr>
+        <p:cNvPr id="1" name=""/>
+        <p:cNvGrpSpPr/>
+        <p:nvPr/>
+      </p:nvGrpSpPr>
+      <p:grpSpPr>
+        <a:xfrm>
+          <a:off x="0" y="0"/>
+          <a:ext cx="0" cy="0"/>
+          <a:chOff x="0" y="0"/>
+          <a:chExt cx="0" cy="0"/>
+        </a:xfrm>
+      </p:grpSpPr>
+      <p:pic>
+        <p:nvPicPr>
+          <p:cNvPr id="9" name="Imagem 8">
+            <a:extLst>
+              <a:ext uri="{FF2B5EF4-FFF2-40B4-BE49-F238E27FC236}">
+                <a16:creationId xmlns:a16="http://schemas.microsoft.com/office/drawing/2014/main" id="{BDC6EC00-F4C8-4B62-8BD4-015B15189C6F}"/>
+              </a:ext>
+            </a:extLst>
+          </p:cNvPr>
+          <p:cNvPicPr>
+            <a:picLocks noChangeAspect="1"/>
+          </p:cNvPicPr>
+          <p:nvPr/>
+        </p:nvPicPr>
+        <p:blipFill>
+          <a:blip r:embed="rId2"/>
+          <a:stretch>
+            <a:fillRect/>
+          </a:stretch>
+        </p:blipFill>
+        <p:spPr>
+          <a:xfrm>
+            <a:off x="1340529" y="1356424"/>
+            <a:ext cx="10233364" cy="4999926"/>
+          </a:xfrm>
+          <a:prstGeom prst="rect">
+            <a:avLst/>
+          </a:prstGeom>
+        </p:spPr>
+      </p:pic>
+      <p:sp>
+        <p:nvSpPr>
+          <p:cNvPr id="2" name="Título 1">
+            <a:extLst>
+              <a:ext uri="{FF2B5EF4-FFF2-40B4-BE49-F238E27FC236}">
+                <a16:creationId xmlns:a16="http://schemas.microsoft.com/office/drawing/2014/main" id="{F2CAC9F6-6456-4C88-B679-8859499DC83C}"/>
+              </a:ext>
+            </a:extLst>
+          </p:cNvPr>
+          <p:cNvSpPr>
+            <a:spLocks noGrp="1"/>
+          </p:cNvSpPr>
+          <p:nvPr>
+            <p:ph type="title"/>
+          </p:nvPr>
+        </p:nvSpPr>
+        <p:spPr/>
+        <p:txBody>
+          <a:bodyPr/>
+          <a:lstStyle/>
+          <a:p>
+            <a:r>
+              <a:rPr lang="pt-BR" dirty="0"/>
+              <a:t>Performance - </a:t>
+            </a:r>
+            <a:r>
+              <a:rPr lang="pt-BR" sz="4400" dirty="0"/>
+              <a:t>https://pf-draw.netlify.app/</a:t>
+            </a:r>
+            <a:endParaRPr lang="pt-BR" dirty="0"/>
+          </a:p>
+        </p:txBody>
+      </p:sp>
+      <p:sp>
+        <p:nvSpPr>
+          <p:cNvPr id="4" name="Espaço Reservado para Data 3">
+            <a:extLst>
+              <a:ext uri="{FF2B5EF4-FFF2-40B4-BE49-F238E27FC236}">
+                <a16:creationId xmlns:a16="http://schemas.microsoft.com/office/drawing/2014/main" id="{FE283D46-9CA0-4CFE-A924-EA57DF7E54D1}"/>
+              </a:ext>
+            </a:extLst>
+          </p:cNvPr>
+          <p:cNvSpPr>
+            <a:spLocks noGrp="1"/>
+          </p:cNvSpPr>
+          <p:nvPr>
+            <p:ph type="dt" sz="half" idx="10"/>
+          </p:nvPr>
+        </p:nvSpPr>
+        <p:spPr/>
+        <p:txBody>
+          <a:bodyPr/>
+          <a:lstStyle/>
+          <a:p>
+            <a:r>
+              <a:rPr lang="pt-BR"/>
+              <a:t>Dezembro 2020</a:t>
+            </a:r>
+            <a:endParaRPr lang="pt-BR" dirty="0"/>
+          </a:p>
+        </p:txBody>
+      </p:sp>
+      <p:sp>
+        <p:nvSpPr>
+          <p:cNvPr id="5" name="Espaço Reservado para Rodapé 4">
+            <a:extLst>
+              <a:ext uri="{FF2B5EF4-FFF2-40B4-BE49-F238E27FC236}">
+                <a16:creationId xmlns:a16="http://schemas.microsoft.com/office/drawing/2014/main" id="{68E5F5AE-398A-4CB1-8C05-AD60C7F6DB9A}"/>
+              </a:ext>
+            </a:extLst>
+          </p:cNvPr>
+          <p:cNvSpPr>
+            <a:spLocks noGrp="1"/>
+          </p:cNvSpPr>
+          <p:nvPr>
+            <p:ph type="ftr" sz="quarter" idx="11"/>
+          </p:nvPr>
+        </p:nvSpPr>
+        <p:spPr/>
+        <p:txBody>
+          <a:bodyPr/>
+          <a:lstStyle/>
+          <a:p>
+            <a:r>
+              <a:rPr lang="pt-BR"/>
+              <a:t>IT743A – Cálculo de Fluxo de Carga</a:t>
+            </a:r>
+            <a:endParaRPr lang="pt-BR" dirty="0"/>
+          </a:p>
+        </p:txBody>
+      </p:sp>
+      <p:sp>
+        <p:nvSpPr>
+          <p:cNvPr id="6" name="Espaço Reservado para Número de Slide 5">
+            <a:extLst>
+              <a:ext uri="{FF2B5EF4-FFF2-40B4-BE49-F238E27FC236}">
+                <a16:creationId xmlns:a16="http://schemas.microsoft.com/office/drawing/2014/main" id="{57FDDF2D-5DA4-4272-9BC5-AE99C89F456D}"/>
+              </a:ext>
+            </a:extLst>
+          </p:cNvPr>
+          <p:cNvSpPr>
+            <a:spLocks noGrp="1"/>
+          </p:cNvSpPr>
+          <p:nvPr>
+            <p:ph type="sldNum" sz="quarter" idx="12"/>
+          </p:nvPr>
+        </p:nvSpPr>
+        <p:spPr/>
+        <p:txBody>
+          <a:bodyPr/>
+          <a:lstStyle/>
+          <a:p>
+            <a:fld id="{8579997A-84E9-4B38-967C-2D4A110C3049}" type="slidenum">
+              <a:rPr lang="pt-BR" smtClean="0"/>
+              <a:t>24</a:t>
+            </a:fld>
+            <a:endParaRPr lang="pt-BR"/>
+          </a:p>
+        </p:txBody>
+      </p:sp>
+      <p:sp>
+        <p:nvSpPr>
+          <p:cNvPr id="16" name="Espaço Reservado para Conteúdo 6">
+            <a:extLst>
+              <a:ext uri="{FF2B5EF4-FFF2-40B4-BE49-F238E27FC236}">
+                <a16:creationId xmlns:a16="http://schemas.microsoft.com/office/drawing/2014/main" id="{AC52CD35-10DE-4EB5-8666-A30B457793A1}"/>
+              </a:ext>
+            </a:extLst>
+          </p:cNvPr>
+          <p:cNvSpPr>
+            <a:spLocks noGrp="1"/>
+          </p:cNvSpPr>
+          <p:nvPr>
+            <p:ph idx="1"/>
+          </p:nvPr>
+        </p:nvSpPr>
+        <p:spPr>
+          <a:xfrm>
+            <a:off x="4105537" y="2150045"/>
+            <a:ext cx="3396095" cy="1325563"/>
+          </a:xfrm>
+          <a:solidFill>
+            <a:schemeClr val="bg1"/>
+          </a:solidFill>
+        </p:spPr>
+        <p:txBody>
+          <a:bodyPr>
+            <a:normAutofit fontScale="70000" lnSpcReduction="20000"/>
+          </a:bodyPr>
+          <a:lstStyle/>
+          <a:p>
+            <a:r>
+              <a:rPr lang="pt-BR" dirty="0"/>
+              <a:t>Sistema IEE 30 Barras (original)</a:t>
+            </a:r>
+          </a:p>
+          <a:p>
+            <a:pPr lvl="1"/>
+            <a:r>
+              <a:rPr lang="pt-BR" dirty="0"/>
+              <a:t>Convergência 0.01</a:t>
+            </a:r>
+          </a:p>
+          <a:p>
+            <a:pPr lvl="1"/>
+            <a:r>
+              <a:rPr lang="pt-BR" dirty="0"/>
+              <a:t>30 barras</a:t>
+            </a:r>
+          </a:p>
+          <a:p>
+            <a:pPr lvl="1"/>
+            <a:r>
+              <a:rPr lang="pt-BR" dirty="0"/>
+              <a:t>41 ramos</a:t>
+            </a:r>
+          </a:p>
+          <a:p>
+            <a:pPr lvl="1"/>
+            <a:endParaRPr lang="pt-BR" dirty="0"/>
+          </a:p>
+        </p:txBody>
+      </p:sp>
+    </p:spTree>
+    <p:extLst>
+      <p:ext uri="{BB962C8B-B14F-4D97-AF65-F5344CB8AC3E}">
+        <p14:creationId xmlns:p14="http://schemas.microsoft.com/office/powerpoint/2010/main" val="978096935"/>
+      </p:ext>
+    </p:extLst>
+  </p:cSld>
+  <p:clrMapOvr>
+    <a:masterClrMapping/>
+  </p:clrMapOvr>
+</p:sld>
+</file>
+
+<file path=ppt/slides/slide25.xml><?xml version="1.0" encoding="utf-8"?>
+<p:sld xmlns:a="http://schemas.openxmlformats.org/drawingml/2006/main" xmlns:r="http://schemas.openxmlformats.org/officeDocument/2006/relationships" xmlns:p="http://schemas.openxmlformats.org/presentationml/2006/main">
+  <p:cSld>
+    <p:spTree>
+      <p:nvGrpSpPr>
+        <p:cNvPr id="1" name=""/>
+        <p:cNvGrpSpPr/>
+        <p:nvPr/>
+      </p:nvGrpSpPr>
+      <p:grpSpPr>
+        <a:xfrm>
+          <a:off x="0" y="0"/>
+          <a:ext cx="0" cy="0"/>
+          <a:chOff x="0" y="0"/>
+          <a:chExt cx="0" cy="0"/>
+        </a:xfrm>
+      </p:grpSpPr>
       <p:pic>
         <p:nvPicPr>
           <p:cNvPr id="7" name="Imagem 6">
@@ -4732,7 +5682,7 @@
           <a:p>
             <a:fld id="{8579997A-84E9-4B38-967C-2D4A110C3049}" type="slidenum">
               <a:rPr lang="pt-BR" smtClean="0"/>
-              <a:t>21</a:t>
+              <a:t>25</a:t>
             </a:fld>
             <a:endParaRPr lang="pt-BR"/>
           </a:p>
@@ -4881,7 +5831,7 @@
 </p:sld>
 </file>
 
-<file path=ppt/slides/slide22.xml><?xml version="1.0" encoding="utf-8"?>
+<file path=ppt/slides/slide26.xml><?xml version="1.0" encoding="utf-8"?>
 <p:sld xmlns:a="http://schemas.openxmlformats.org/drawingml/2006/main" xmlns:r="http://schemas.openxmlformats.org/officeDocument/2006/relationships" xmlns:p="http://schemas.openxmlformats.org/presentationml/2006/main">
   <p:cSld>
     <p:spTree>
@@ -5042,7 +5992,7 @@
           <a:p>
             <a:fld id="{8579997A-84E9-4B38-967C-2D4A110C3049}" type="slidenum">
               <a:rPr lang="pt-BR" smtClean="0"/>
-              <a:t>22</a:t>
+              <a:t>26</a:t>
             </a:fld>
             <a:endParaRPr lang="pt-BR"/>
           </a:p>
@@ -5367,7 +6317,7 @@
 </p:sld>
 </file>
 
-<file path=ppt/slides/slide23.xml><?xml version="1.0" encoding="utf-8"?>
+<file path=ppt/slides/slide27.xml><?xml version="1.0" encoding="utf-8"?>
 <p:sld xmlns:a="http://schemas.openxmlformats.org/drawingml/2006/main" xmlns:r="http://schemas.openxmlformats.org/officeDocument/2006/relationships" xmlns:p="http://schemas.openxmlformats.org/presentationml/2006/main">
   <p:cSld>
     <p:spTree>
@@ -5498,7 +6448,7 @@
           <a:p>
             <a:fld id="{8579997A-84E9-4B38-967C-2D4A110C3049}" type="slidenum">
               <a:rPr lang="pt-BR" smtClean="0"/>
-              <a:t>23</a:t>
+              <a:t>27</a:t>
             </a:fld>
             <a:endParaRPr lang="pt-BR"/>
           </a:p>
@@ -5626,7 +6576,7 @@
 </p:sld>
 </file>
 
-<file path=ppt/slides/slide24.xml><?xml version="1.0" encoding="utf-8"?>
+<file path=ppt/slides/slide28.xml><?xml version="1.0" encoding="utf-8"?>
 <p:sld xmlns:a="http://schemas.openxmlformats.org/drawingml/2006/main" xmlns:r="http://schemas.openxmlformats.org/officeDocument/2006/relationships" xmlns:p="http://schemas.openxmlformats.org/presentationml/2006/main">
   <p:cSld>
     <p:spTree>
@@ -5648,15 +6598,15 @@
           <p:cNvPr id="2" name="Título 1">
             <a:extLst>
               <a:ext uri="{FF2B5EF4-FFF2-40B4-BE49-F238E27FC236}">
-                <a16:creationId xmlns:a16="http://schemas.microsoft.com/office/drawing/2014/main" id="{CFA6E98A-AF6F-42BC-B7DB-FD47DF996443}"/>
-              </a:ext>
-            </a:extLst>
-          </p:cNvPr>
-          <p:cNvSpPr>
-            <a:spLocks noGrp="1"/>
-          </p:cNvSpPr>
-          <p:nvPr>
-            <p:ph type="ctrTitle"/>
+                <a16:creationId xmlns:a16="http://schemas.microsoft.com/office/drawing/2014/main" id="{F2CAC9F6-6456-4C88-B679-8859499DC83C}"/>
+              </a:ext>
+            </a:extLst>
+          </p:cNvPr>
+          <p:cNvSpPr>
+            <a:spLocks noGrp="1"/>
+          </p:cNvSpPr>
+          <p:nvPr>
+            <p:ph type="title"/>
           </p:nvPr>
         </p:nvSpPr>
         <p:spPr/>
@@ -5666,36 +6616,13 @@
           <a:p>
             <a:r>
               <a:rPr lang="pt-BR" dirty="0"/>
-              <a:t>Obrigado</a:t>
-            </a:r>
-          </a:p>
-        </p:txBody>
-      </p:sp>
-      <p:sp>
-        <p:nvSpPr>
-          <p:cNvPr id="3" name="Subtítulo 2">
-            <a:extLst>
-              <a:ext uri="{FF2B5EF4-FFF2-40B4-BE49-F238E27FC236}">
-                <a16:creationId xmlns:a16="http://schemas.microsoft.com/office/drawing/2014/main" id="{3F713850-308C-4930-9724-203064F7C0F3}"/>
-              </a:ext>
-            </a:extLst>
-          </p:cNvPr>
-          <p:cNvSpPr>
-            <a:spLocks noGrp="1"/>
-          </p:cNvSpPr>
-          <p:nvPr>
-            <p:ph type="subTitle" idx="1"/>
-          </p:nvPr>
-        </p:nvSpPr>
-        <p:spPr/>
-        <p:txBody>
-          <a:bodyPr/>
-          <a:lstStyle/>
-          <a:p>
-            <a:r>
-              <a:rPr lang="pt-BR" dirty="0"/>
-              <a:t>Filipe Salles de Oliveira, RA149175</a:t>
-            </a:r>
+              <a:t>Exemplo Teste 2 - </a:t>
+            </a:r>
+            <a:r>
+              <a:rPr lang="pt-BR" sz="4400" dirty="0"/>
+              <a:t>https://pf-draw.netlify.app/</a:t>
+            </a:r>
+            <a:endParaRPr lang="pt-BR" dirty="0"/>
           </a:p>
         </p:txBody>
       </p:sp>
@@ -5704,7 +6631,7 @@
           <p:cNvPr id="4" name="Espaço Reservado para Data 3">
             <a:extLst>
               <a:ext uri="{FF2B5EF4-FFF2-40B4-BE49-F238E27FC236}">
-                <a16:creationId xmlns:a16="http://schemas.microsoft.com/office/drawing/2014/main" id="{50E58847-6EFB-4351-AC1E-B07E1C420F6C}"/>
+                <a16:creationId xmlns:a16="http://schemas.microsoft.com/office/drawing/2014/main" id="{FE283D46-9CA0-4CFE-A924-EA57DF7E54D1}"/>
               </a:ext>
             </a:extLst>
           </p:cNvPr>
@@ -5722,7 +6649,7 @@
           <a:p>
             <a:r>
               <a:rPr lang="pt-BR"/>
-              <a:t>Agosto 2020</a:t>
+              <a:t>Dezembro 2020</a:t>
             </a:r>
             <a:endParaRPr lang="pt-BR" dirty="0"/>
           </a:p>
@@ -5733,7 +6660,7 @@
           <p:cNvPr id="5" name="Espaço Reservado para Rodapé 4">
             <a:extLst>
               <a:ext uri="{FF2B5EF4-FFF2-40B4-BE49-F238E27FC236}">
-                <a16:creationId xmlns:a16="http://schemas.microsoft.com/office/drawing/2014/main" id="{B7C099FE-113D-41D8-B79E-7034BA4D1DC3}"/>
+                <a16:creationId xmlns:a16="http://schemas.microsoft.com/office/drawing/2014/main" id="{68E5F5AE-398A-4CB1-8C05-AD60C7F6DB9A}"/>
               </a:ext>
             </a:extLst>
           </p:cNvPr>
@@ -5751,7 +6678,7 @@
           <a:p>
             <a:r>
               <a:rPr lang="pt-BR"/>
-              <a:t>IT306V - Tópicos de Curto-circuito e Princípios de Proteção</a:t>
+              <a:t>IT743A – Cálculo de Fluxo de Carga</a:t>
             </a:r>
             <a:endParaRPr lang="pt-BR" dirty="0"/>
           </a:p>
@@ -5762,7 +6689,7 @@
           <p:cNvPr id="6" name="Espaço Reservado para Número de Slide 5">
             <a:extLst>
               <a:ext uri="{FF2B5EF4-FFF2-40B4-BE49-F238E27FC236}">
-                <a16:creationId xmlns:a16="http://schemas.microsoft.com/office/drawing/2014/main" id="{D0C1D071-DC3E-4FD7-9FC6-B475EC70188D}"/>
+                <a16:creationId xmlns:a16="http://schemas.microsoft.com/office/drawing/2014/main" id="{57FDDF2D-5DA4-4272-9BC5-AE99C89F456D}"/>
               </a:ext>
             </a:extLst>
           </p:cNvPr>
@@ -5780,16 +6707,256 @@
           <a:p>
             <a:fld id="{8579997A-84E9-4B38-967C-2D4A110C3049}" type="slidenum">
               <a:rPr lang="pt-BR" smtClean="0"/>
-              <a:t>24</a:t>
+              <a:t>28</a:t>
             </a:fld>
             <a:endParaRPr lang="pt-BR"/>
           </a:p>
         </p:txBody>
       </p:sp>
+      <p:pic>
+        <p:nvPicPr>
+          <p:cNvPr id="7" name="Imagem 6">
+            <a:extLst>
+              <a:ext uri="{FF2B5EF4-FFF2-40B4-BE49-F238E27FC236}">
+                <a16:creationId xmlns:a16="http://schemas.microsoft.com/office/drawing/2014/main" id="{E6EEA9B4-9820-4BE9-A0E4-165A7E5798C0}"/>
+              </a:ext>
+            </a:extLst>
+          </p:cNvPr>
+          <p:cNvPicPr>
+            <a:picLocks noChangeAspect="1"/>
+          </p:cNvPicPr>
+          <p:nvPr/>
+        </p:nvPicPr>
+        <p:blipFill>
+          <a:blip r:embed="rId2"/>
+          <a:stretch>
+            <a:fillRect/>
+          </a:stretch>
+        </p:blipFill>
+        <p:spPr>
+          <a:xfrm>
+            <a:off x="127985" y="1690688"/>
+            <a:ext cx="5401177" cy="2975499"/>
+          </a:xfrm>
+          <a:prstGeom prst="rect">
+            <a:avLst/>
+          </a:prstGeom>
+        </p:spPr>
+      </p:pic>
+      <p:pic>
+        <p:nvPicPr>
+          <p:cNvPr id="11" name="Imagem 10">
+            <a:extLst>
+              <a:ext uri="{FF2B5EF4-FFF2-40B4-BE49-F238E27FC236}">
+                <a16:creationId xmlns:a16="http://schemas.microsoft.com/office/drawing/2014/main" id="{42966856-8C31-4CF2-9C1C-C2792302D51F}"/>
+              </a:ext>
+            </a:extLst>
+          </p:cNvPr>
+          <p:cNvPicPr>
+            <a:picLocks noChangeAspect="1"/>
+          </p:cNvPicPr>
+          <p:nvPr/>
+        </p:nvPicPr>
+        <p:blipFill>
+          <a:blip r:embed="rId3"/>
+          <a:stretch>
+            <a:fillRect/>
+          </a:stretch>
+        </p:blipFill>
+        <p:spPr>
+          <a:xfrm>
+            <a:off x="4319587" y="3768402"/>
+            <a:ext cx="7667625" cy="2419350"/>
+          </a:xfrm>
+          <a:prstGeom prst="rect">
+            <a:avLst/>
+          </a:prstGeom>
+        </p:spPr>
+      </p:pic>
     </p:spTree>
     <p:extLst>
       <p:ext uri="{BB962C8B-B14F-4D97-AF65-F5344CB8AC3E}">
-        <p14:creationId xmlns:p14="http://schemas.microsoft.com/office/powerpoint/2010/main" val="1732845947"/>
+        <p14:creationId xmlns:p14="http://schemas.microsoft.com/office/powerpoint/2010/main" val="4006706071"/>
+      </p:ext>
+    </p:extLst>
+  </p:cSld>
+  <p:clrMapOvr>
+    <a:masterClrMapping/>
+  </p:clrMapOvr>
+</p:sld>
+</file>
+
+<file path=ppt/slides/slide29.xml><?xml version="1.0" encoding="utf-8"?>
+<p:sld xmlns:a="http://schemas.openxmlformats.org/drawingml/2006/main" xmlns:r="http://schemas.openxmlformats.org/officeDocument/2006/relationships" xmlns:p="http://schemas.openxmlformats.org/presentationml/2006/main">
+  <p:cSld>
+    <p:spTree>
+      <p:nvGrpSpPr>
+        <p:cNvPr id="1" name=""/>
+        <p:cNvGrpSpPr/>
+        <p:nvPr/>
+      </p:nvGrpSpPr>
+      <p:grpSpPr>
+        <a:xfrm>
+          <a:off x="0" y="0"/>
+          <a:ext cx="0" cy="0"/>
+          <a:chOff x="0" y="0"/>
+          <a:chExt cx="0" cy="0"/>
+        </a:xfrm>
+      </p:grpSpPr>
+      <p:sp>
+        <p:nvSpPr>
+          <p:cNvPr id="2" name="Título 1">
+            <a:extLst>
+              <a:ext uri="{FF2B5EF4-FFF2-40B4-BE49-F238E27FC236}">
+                <a16:creationId xmlns:a16="http://schemas.microsoft.com/office/drawing/2014/main" id="{F2CAC9F6-6456-4C88-B679-8859499DC83C}"/>
+              </a:ext>
+            </a:extLst>
+          </p:cNvPr>
+          <p:cNvSpPr>
+            <a:spLocks noGrp="1"/>
+          </p:cNvSpPr>
+          <p:nvPr>
+            <p:ph type="title"/>
+          </p:nvPr>
+        </p:nvSpPr>
+        <p:spPr/>
+        <p:txBody>
+          <a:bodyPr/>
+          <a:lstStyle/>
+          <a:p>
+            <a:r>
+              <a:rPr lang="pt-BR" dirty="0"/>
+              <a:t>Exemplo Teste 2 - </a:t>
+            </a:r>
+            <a:r>
+              <a:rPr lang="pt-BR" sz="4400" dirty="0"/>
+              <a:t>https://pf-draw.netlify.app/</a:t>
+            </a:r>
+            <a:endParaRPr lang="pt-BR" dirty="0"/>
+          </a:p>
+        </p:txBody>
+      </p:sp>
+      <p:sp>
+        <p:nvSpPr>
+          <p:cNvPr id="4" name="Espaço Reservado para Data 3">
+            <a:extLst>
+              <a:ext uri="{FF2B5EF4-FFF2-40B4-BE49-F238E27FC236}">
+                <a16:creationId xmlns:a16="http://schemas.microsoft.com/office/drawing/2014/main" id="{FE283D46-9CA0-4CFE-A924-EA57DF7E54D1}"/>
+              </a:ext>
+            </a:extLst>
+          </p:cNvPr>
+          <p:cNvSpPr>
+            <a:spLocks noGrp="1"/>
+          </p:cNvSpPr>
+          <p:nvPr>
+            <p:ph type="dt" sz="half" idx="10"/>
+          </p:nvPr>
+        </p:nvSpPr>
+        <p:spPr/>
+        <p:txBody>
+          <a:bodyPr/>
+          <a:lstStyle/>
+          <a:p>
+            <a:r>
+              <a:rPr lang="pt-BR"/>
+              <a:t>Dezembro 2020</a:t>
+            </a:r>
+            <a:endParaRPr lang="pt-BR" dirty="0"/>
+          </a:p>
+        </p:txBody>
+      </p:sp>
+      <p:sp>
+        <p:nvSpPr>
+          <p:cNvPr id="5" name="Espaço Reservado para Rodapé 4">
+            <a:extLst>
+              <a:ext uri="{FF2B5EF4-FFF2-40B4-BE49-F238E27FC236}">
+                <a16:creationId xmlns:a16="http://schemas.microsoft.com/office/drawing/2014/main" id="{68E5F5AE-398A-4CB1-8C05-AD60C7F6DB9A}"/>
+              </a:ext>
+            </a:extLst>
+          </p:cNvPr>
+          <p:cNvSpPr>
+            <a:spLocks noGrp="1"/>
+          </p:cNvSpPr>
+          <p:nvPr>
+            <p:ph type="ftr" sz="quarter" idx="11"/>
+          </p:nvPr>
+        </p:nvSpPr>
+        <p:spPr/>
+        <p:txBody>
+          <a:bodyPr/>
+          <a:lstStyle/>
+          <a:p>
+            <a:r>
+              <a:rPr lang="pt-BR"/>
+              <a:t>IT743A – Cálculo de Fluxo de Carga</a:t>
+            </a:r>
+            <a:endParaRPr lang="pt-BR" dirty="0"/>
+          </a:p>
+        </p:txBody>
+      </p:sp>
+      <p:sp>
+        <p:nvSpPr>
+          <p:cNvPr id="6" name="Espaço Reservado para Número de Slide 5">
+            <a:extLst>
+              <a:ext uri="{FF2B5EF4-FFF2-40B4-BE49-F238E27FC236}">
+                <a16:creationId xmlns:a16="http://schemas.microsoft.com/office/drawing/2014/main" id="{57FDDF2D-5DA4-4272-9BC5-AE99C89F456D}"/>
+              </a:ext>
+            </a:extLst>
+          </p:cNvPr>
+          <p:cNvSpPr>
+            <a:spLocks noGrp="1"/>
+          </p:cNvSpPr>
+          <p:nvPr>
+            <p:ph type="sldNum" sz="quarter" idx="12"/>
+          </p:nvPr>
+        </p:nvSpPr>
+        <p:spPr/>
+        <p:txBody>
+          <a:bodyPr/>
+          <a:lstStyle/>
+          <a:p>
+            <a:fld id="{8579997A-84E9-4B38-967C-2D4A110C3049}" type="slidenum">
+              <a:rPr lang="pt-BR" smtClean="0"/>
+              <a:t>29</a:t>
+            </a:fld>
+            <a:endParaRPr lang="pt-BR"/>
+          </a:p>
+        </p:txBody>
+      </p:sp>
+      <p:pic>
+        <p:nvPicPr>
+          <p:cNvPr id="8" name="Imagem 7">
+            <a:extLst>
+              <a:ext uri="{FF2B5EF4-FFF2-40B4-BE49-F238E27FC236}">
+                <a16:creationId xmlns:a16="http://schemas.microsoft.com/office/drawing/2014/main" id="{FB769754-66E7-4BE2-8DD7-1691AD9BB5B9}"/>
+              </a:ext>
+            </a:extLst>
+          </p:cNvPr>
+          <p:cNvPicPr>
+            <a:picLocks noChangeAspect="1"/>
+          </p:cNvPicPr>
+          <p:nvPr/>
+        </p:nvPicPr>
+        <p:blipFill>
+          <a:blip r:embed="rId2"/>
+          <a:stretch>
+            <a:fillRect/>
+          </a:stretch>
+        </p:blipFill>
+        <p:spPr>
+          <a:xfrm>
+            <a:off x="1626888" y="1420898"/>
+            <a:ext cx="8938224" cy="4376220"/>
+          </a:xfrm>
+          <a:prstGeom prst="rect">
+            <a:avLst/>
+          </a:prstGeom>
+        </p:spPr>
+      </p:pic>
+    </p:spTree>
+    <p:extLst>
+      <p:ext uri="{BB962C8B-B14F-4D97-AF65-F5344CB8AC3E}">
+        <p14:creationId xmlns:p14="http://schemas.microsoft.com/office/powerpoint/2010/main" val="1998100197"/>
       </p:ext>
     </p:extLst>
   </p:cSld>
@@ -6029,6 +7196,656 @@
     <p:extLst>
       <p:ext uri="{BB962C8B-B14F-4D97-AF65-F5344CB8AC3E}">
         <p14:creationId xmlns:p14="http://schemas.microsoft.com/office/powerpoint/2010/main" val="4255273131"/>
+      </p:ext>
+    </p:extLst>
+  </p:cSld>
+  <p:clrMapOvr>
+    <a:masterClrMapping/>
+  </p:clrMapOvr>
+</p:sld>
+</file>
+
+<file path=ppt/slides/slide30.xml><?xml version="1.0" encoding="utf-8"?>
+<p:sld xmlns:a="http://schemas.openxmlformats.org/drawingml/2006/main" xmlns:r="http://schemas.openxmlformats.org/officeDocument/2006/relationships" xmlns:p="http://schemas.openxmlformats.org/presentationml/2006/main">
+  <p:cSld>
+    <p:spTree>
+      <p:nvGrpSpPr>
+        <p:cNvPr id="1" name=""/>
+        <p:cNvGrpSpPr/>
+        <p:nvPr/>
+      </p:nvGrpSpPr>
+      <p:grpSpPr>
+        <a:xfrm>
+          <a:off x="0" y="0"/>
+          <a:ext cx="0" cy="0"/>
+          <a:chOff x="0" y="0"/>
+          <a:chExt cx="0" cy="0"/>
+        </a:xfrm>
+      </p:grpSpPr>
+      <p:sp>
+        <p:nvSpPr>
+          <p:cNvPr id="2" name="Título 1">
+            <a:extLst>
+              <a:ext uri="{FF2B5EF4-FFF2-40B4-BE49-F238E27FC236}">
+                <a16:creationId xmlns:a16="http://schemas.microsoft.com/office/drawing/2014/main" id="{F2CAC9F6-6456-4C88-B679-8859499DC83C}"/>
+              </a:ext>
+            </a:extLst>
+          </p:cNvPr>
+          <p:cNvSpPr>
+            <a:spLocks noGrp="1"/>
+          </p:cNvSpPr>
+          <p:nvPr>
+            <p:ph type="title"/>
+          </p:nvPr>
+        </p:nvSpPr>
+        <p:spPr/>
+        <p:txBody>
+          <a:bodyPr/>
+          <a:lstStyle/>
+          <a:p>
+            <a:r>
+              <a:rPr lang="pt-BR" dirty="0"/>
+              <a:t>Exemplo Teste 2 - </a:t>
+            </a:r>
+            <a:r>
+              <a:rPr lang="pt-BR" sz="4400" dirty="0"/>
+              <a:t>https://pf-draw.netlify.app/</a:t>
+            </a:r>
+            <a:endParaRPr lang="pt-BR" dirty="0"/>
+          </a:p>
+        </p:txBody>
+      </p:sp>
+      <p:sp>
+        <p:nvSpPr>
+          <p:cNvPr id="4" name="Espaço Reservado para Data 3">
+            <a:extLst>
+              <a:ext uri="{FF2B5EF4-FFF2-40B4-BE49-F238E27FC236}">
+                <a16:creationId xmlns:a16="http://schemas.microsoft.com/office/drawing/2014/main" id="{FE283D46-9CA0-4CFE-A924-EA57DF7E54D1}"/>
+              </a:ext>
+            </a:extLst>
+          </p:cNvPr>
+          <p:cNvSpPr>
+            <a:spLocks noGrp="1"/>
+          </p:cNvSpPr>
+          <p:nvPr>
+            <p:ph type="dt" sz="half" idx="10"/>
+          </p:nvPr>
+        </p:nvSpPr>
+        <p:spPr/>
+        <p:txBody>
+          <a:bodyPr/>
+          <a:lstStyle/>
+          <a:p>
+            <a:r>
+              <a:rPr lang="pt-BR"/>
+              <a:t>Dezembro 2020</a:t>
+            </a:r>
+            <a:endParaRPr lang="pt-BR" dirty="0"/>
+          </a:p>
+        </p:txBody>
+      </p:sp>
+      <p:sp>
+        <p:nvSpPr>
+          <p:cNvPr id="5" name="Espaço Reservado para Rodapé 4">
+            <a:extLst>
+              <a:ext uri="{FF2B5EF4-FFF2-40B4-BE49-F238E27FC236}">
+                <a16:creationId xmlns:a16="http://schemas.microsoft.com/office/drawing/2014/main" id="{68E5F5AE-398A-4CB1-8C05-AD60C7F6DB9A}"/>
+              </a:ext>
+            </a:extLst>
+          </p:cNvPr>
+          <p:cNvSpPr>
+            <a:spLocks noGrp="1"/>
+          </p:cNvSpPr>
+          <p:nvPr>
+            <p:ph type="ftr" sz="quarter" idx="11"/>
+          </p:nvPr>
+        </p:nvSpPr>
+        <p:spPr/>
+        <p:txBody>
+          <a:bodyPr/>
+          <a:lstStyle/>
+          <a:p>
+            <a:r>
+              <a:rPr lang="pt-BR"/>
+              <a:t>IT743A – Cálculo de Fluxo de Carga</a:t>
+            </a:r>
+            <a:endParaRPr lang="pt-BR" dirty="0"/>
+          </a:p>
+        </p:txBody>
+      </p:sp>
+      <p:sp>
+        <p:nvSpPr>
+          <p:cNvPr id="6" name="Espaço Reservado para Número de Slide 5">
+            <a:extLst>
+              <a:ext uri="{FF2B5EF4-FFF2-40B4-BE49-F238E27FC236}">
+                <a16:creationId xmlns:a16="http://schemas.microsoft.com/office/drawing/2014/main" id="{57FDDF2D-5DA4-4272-9BC5-AE99C89F456D}"/>
+              </a:ext>
+            </a:extLst>
+          </p:cNvPr>
+          <p:cNvSpPr>
+            <a:spLocks noGrp="1"/>
+          </p:cNvSpPr>
+          <p:nvPr>
+            <p:ph type="sldNum" sz="quarter" idx="12"/>
+          </p:nvPr>
+        </p:nvSpPr>
+        <p:spPr/>
+        <p:txBody>
+          <a:bodyPr/>
+          <a:lstStyle/>
+          <a:p>
+            <a:fld id="{8579997A-84E9-4B38-967C-2D4A110C3049}" type="slidenum">
+              <a:rPr lang="pt-BR" smtClean="0"/>
+              <a:t>30</a:t>
+            </a:fld>
+            <a:endParaRPr lang="pt-BR"/>
+          </a:p>
+        </p:txBody>
+      </p:sp>
+      <p:pic>
+        <p:nvPicPr>
+          <p:cNvPr id="7" name="Imagem 6">
+            <a:extLst>
+              <a:ext uri="{FF2B5EF4-FFF2-40B4-BE49-F238E27FC236}">
+                <a16:creationId xmlns:a16="http://schemas.microsoft.com/office/drawing/2014/main" id="{2835C303-4E7E-4436-B7A4-A21A42754F05}"/>
+              </a:ext>
+            </a:extLst>
+          </p:cNvPr>
+          <p:cNvPicPr>
+            <a:picLocks noChangeAspect="1"/>
+          </p:cNvPicPr>
+          <p:nvPr/>
+        </p:nvPicPr>
+        <p:blipFill>
+          <a:blip r:embed="rId2"/>
+          <a:stretch>
+            <a:fillRect/>
+          </a:stretch>
+        </p:blipFill>
+        <p:spPr>
+          <a:xfrm>
+            <a:off x="838200" y="1402671"/>
+            <a:ext cx="4361026" cy="4755133"/>
+          </a:xfrm>
+          <a:prstGeom prst="rect">
+            <a:avLst/>
+          </a:prstGeom>
+        </p:spPr>
+      </p:pic>
+      <p:pic>
+        <p:nvPicPr>
+          <p:cNvPr id="10" name="Imagem 9">
+            <a:extLst>
+              <a:ext uri="{FF2B5EF4-FFF2-40B4-BE49-F238E27FC236}">
+                <a16:creationId xmlns:a16="http://schemas.microsoft.com/office/drawing/2014/main" id="{5DB79C3D-2316-4075-8366-89D6AA967ECE}"/>
+              </a:ext>
+            </a:extLst>
+          </p:cNvPr>
+          <p:cNvPicPr>
+            <a:picLocks noChangeAspect="1"/>
+          </p:cNvPicPr>
+          <p:nvPr/>
+        </p:nvPicPr>
+        <p:blipFill rotWithShape="1">
+          <a:blip r:embed="rId3"/>
+          <a:srcRect t="1768"/>
+          <a:stretch/>
+        </p:blipFill>
+        <p:spPr>
+          <a:xfrm>
+            <a:off x="6280620" y="1296140"/>
+            <a:ext cx="4922999" cy="4861664"/>
+          </a:xfrm>
+          <a:prstGeom prst="rect">
+            <a:avLst/>
+          </a:prstGeom>
+        </p:spPr>
+      </p:pic>
+    </p:spTree>
+    <p:extLst>
+      <p:ext uri="{BB962C8B-B14F-4D97-AF65-F5344CB8AC3E}">
+        <p14:creationId xmlns:p14="http://schemas.microsoft.com/office/powerpoint/2010/main" val="3502311371"/>
+      </p:ext>
+    </p:extLst>
+  </p:cSld>
+  <p:clrMapOvr>
+    <a:masterClrMapping/>
+  </p:clrMapOvr>
+</p:sld>
+</file>
+
+<file path=ppt/slides/slide31.xml><?xml version="1.0" encoding="utf-8"?>
+<p:sld xmlns:a="http://schemas.openxmlformats.org/drawingml/2006/main" xmlns:r="http://schemas.openxmlformats.org/officeDocument/2006/relationships" xmlns:p="http://schemas.openxmlformats.org/presentationml/2006/main">
+  <p:cSld>
+    <p:spTree>
+      <p:nvGrpSpPr>
+        <p:cNvPr id="1" name=""/>
+        <p:cNvGrpSpPr/>
+        <p:nvPr/>
+      </p:nvGrpSpPr>
+      <p:grpSpPr>
+        <a:xfrm>
+          <a:off x="0" y="0"/>
+          <a:ext cx="0" cy="0"/>
+          <a:chOff x="0" y="0"/>
+          <a:chExt cx="0" cy="0"/>
+        </a:xfrm>
+      </p:grpSpPr>
+      <p:sp>
+        <p:nvSpPr>
+          <p:cNvPr id="2" name="Título 1">
+            <a:extLst>
+              <a:ext uri="{FF2B5EF4-FFF2-40B4-BE49-F238E27FC236}">
+                <a16:creationId xmlns:a16="http://schemas.microsoft.com/office/drawing/2014/main" id="{F2CAC9F6-6456-4C88-B679-8859499DC83C}"/>
+              </a:ext>
+            </a:extLst>
+          </p:cNvPr>
+          <p:cNvSpPr>
+            <a:spLocks noGrp="1"/>
+          </p:cNvSpPr>
+          <p:nvPr>
+            <p:ph type="title"/>
+          </p:nvPr>
+        </p:nvSpPr>
+        <p:spPr/>
+        <p:txBody>
+          <a:bodyPr/>
+          <a:lstStyle/>
+          <a:p>
+            <a:r>
+              <a:rPr lang="pt-BR" dirty="0"/>
+              <a:t>Exemplo Teste 2 - </a:t>
+            </a:r>
+            <a:r>
+              <a:rPr lang="pt-BR" sz="4400" dirty="0"/>
+              <a:t>https://pf-draw.netlify.app/</a:t>
+            </a:r>
+            <a:endParaRPr lang="pt-BR" dirty="0"/>
+          </a:p>
+        </p:txBody>
+      </p:sp>
+      <p:sp>
+        <p:nvSpPr>
+          <p:cNvPr id="4" name="Espaço Reservado para Data 3">
+            <a:extLst>
+              <a:ext uri="{FF2B5EF4-FFF2-40B4-BE49-F238E27FC236}">
+                <a16:creationId xmlns:a16="http://schemas.microsoft.com/office/drawing/2014/main" id="{FE283D46-9CA0-4CFE-A924-EA57DF7E54D1}"/>
+              </a:ext>
+            </a:extLst>
+          </p:cNvPr>
+          <p:cNvSpPr>
+            <a:spLocks noGrp="1"/>
+          </p:cNvSpPr>
+          <p:nvPr>
+            <p:ph type="dt" sz="half" idx="10"/>
+          </p:nvPr>
+        </p:nvSpPr>
+        <p:spPr/>
+        <p:txBody>
+          <a:bodyPr/>
+          <a:lstStyle/>
+          <a:p>
+            <a:r>
+              <a:rPr lang="pt-BR"/>
+              <a:t>Dezembro 2020</a:t>
+            </a:r>
+            <a:endParaRPr lang="pt-BR" dirty="0"/>
+          </a:p>
+        </p:txBody>
+      </p:sp>
+      <p:sp>
+        <p:nvSpPr>
+          <p:cNvPr id="5" name="Espaço Reservado para Rodapé 4">
+            <a:extLst>
+              <a:ext uri="{FF2B5EF4-FFF2-40B4-BE49-F238E27FC236}">
+                <a16:creationId xmlns:a16="http://schemas.microsoft.com/office/drawing/2014/main" id="{68E5F5AE-398A-4CB1-8C05-AD60C7F6DB9A}"/>
+              </a:ext>
+            </a:extLst>
+          </p:cNvPr>
+          <p:cNvSpPr>
+            <a:spLocks noGrp="1"/>
+          </p:cNvSpPr>
+          <p:nvPr>
+            <p:ph type="ftr" sz="quarter" idx="11"/>
+          </p:nvPr>
+        </p:nvSpPr>
+        <p:spPr/>
+        <p:txBody>
+          <a:bodyPr/>
+          <a:lstStyle/>
+          <a:p>
+            <a:r>
+              <a:rPr lang="pt-BR"/>
+              <a:t>IT743A – Cálculo de Fluxo de Carga</a:t>
+            </a:r>
+            <a:endParaRPr lang="pt-BR" dirty="0"/>
+          </a:p>
+        </p:txBody>
+      </p:sp>
+      <p:sp>
+        <p:nvSpPr>
+          <p:cNvPr id="6" name="Espaço Reservado para Número de Slide 5">
+            <a:extLst>
+              <a:ext uri="{FF2B5EF4-FFF2-40B4-BE49-F238E27FC236}">
+                <a16:creationId xmlns:a16="http://schemas.microsoft.com/office/drawing/2014/main" id="{57FDDF2D-5DA4-4272-9BC5-AE99C89F456D}"/>
+              </a:ext>
+            </a:extLst>
+          </p:cNvPr>
+          <p:cNvSpPr>
+            <a:spLocks noGrp="1"/>
+          </p:cNvSpPr>
+          <p:nvPr>
+            <p:ph type="sldNum" sz="quarter" idx="12"/>
+          </p:nvPr>
+        </p:nvSpPr>
+        <p:spPr/>
+        <p:txBody>
+          <a:bodyPr/>
+          <a:lstStyle/>
+          <a:p>
+            <a:fld id="{8579997A-84E9-4B38-967C-2D4A110C3049}" type="slidenum">
+              <a:rPr lang="pt-BR" smtClean="0"/>
+              <a:t>31</a:t>
+            </a:fld>
+            <a:endParaRPr lang="pt-BR"/>
+          </a:p>
+        </p:txBody>
+      </p:sp>
+      <p:pic>
+        <p:nvPicPr>
+          <p:cNvPr id="8" name="Imagem 7">
+            <a:extLst>
+              <a:ext uri="{FF2B5EF4-FFF2-40B4-BE49-F238E27FC236}">
+                <a16:creationId xmlns:a16="http://schemas.microsoft.com/office/drawing/2014/main" id="{79527A1B-2186-4AAE-87BB-B1B61D9B3EAA}"/>
+              </a:ext>
+            </a:extLst>
+          </p:cNvPr>
+          <p:cNvPicPr>
+            <a:picLocks noChangeAspect="1"/>
+          </p:cNvPicPr>
+          <p:nvPr/>
+        </p:nvPicPr>
+        <p:blipFill rotWithShape="1">
+          <a:blip r:embed="rId2"/>
+          <a:srcRect l="23388" r="21665" b="57534"/>
+          <a:stretch/>
+        </p:blipFill>
+        <p:spPr>
+          <a:xfrm>
+            <a:off x="838200" y="1704793"/>
+            <a:ext cx="4705165" cy="1213467"/>
+          </a:xfrm>
+          <a:prstGeom prst="rect">
+            <a:avLst/>
+          </a:prstGeom>
+        </p:spPr>
+      </p:pic>
+      <p:pic>
+        <p:nvPicPr>
+          <p:cNvPr id="11" name="Imagem 10">
+            <a:extLst>
+              <a:ext uri="{FF2B5EF4-FFF2-40B4-BE49-F238E27FC236}">
+                <a16:creationId xmlns:a16="http://schemas.microsoft.com/office/drawing/2014/main" id="{C076BC8D-937B-4283-847E-065BD3A8032E}"/>
+              </a:ext>
+            </a:extLst>
+          </p:cNvPr>
+          <p:cNvPicPr>
+            <a:picLocks noChangeAspect="1"/>
+          </p:cNvPicPr>
+          <p:nvPr/>
+        </p:nvPicPr>
+        <p:blipFill>
+          <a:blip r:embed="rId3"/>
+          <a:stretch>
+            <a:fillRect/>
+          </a:stretch>
+        </p:blipFill>
+        <p:spPr>
+          <a:xfrm>
+            <a:off x="5697984" y="1373951"/>
+            <a:ext cx="5655816" cy="1875150"/>
+          </a:xfrm>
+          <a:prstGeom prst="rect">
+            <a:avLst/>
+          </a:prstGeom>
+        </p:spPr>
+      </p:pic>
+      <p:pic>
+        <p:nvPicPr>
+          <p:cNvPr id="13" name="Imagem 12">
+            <a:extLst>
+              <a:ext uri="{FF2B5EF4-FFF2-40B4-BE49-F238E27FC236}">
+                <a16:creationId xmlns:a16="http://schemas.microsoft.com/office/drawing/2014/main" id="{4A5FEC93-7217-4335-BF16-FAA4D9109383}"/>
+              </a:ext>
+            </a:extLst>
+          </p:cNvPr>
+          <p:cNvPicPr>
+            <a:picLocks noChangeAspect="1"/>
+          </p:cNvPicPr>
+          <p:nvPr/>
+        </p:nvPicPr>
+        <p:blipFill>
+          <a:blip r:embed="rId4"/>
+          <a:stretch>
+            <a:fillRect/>
+          </a:stretch>
+        </p:blipFill>
+        <p:spPr>
+          <a:xfrm>
+            <a:off x="2781300" y="5395384"/>
+            <a:ext cx="7200900" cy="542925"/>
+          </a:xfrm>
+          <a:prstGeom prst="rect">
+            <a:avLst/>
+          </a:prstGeom>
+        </p:spPr>
+      </p:pic>
+      <p:pic>
+        <p:nvPicPr>
+          <p:cNvPr id="14" name="Imagem 13">
+            <a:extLst>
+              <a:ext uri="{FF2B5EF4-FFF2-40B4-BE49-F238E27FC236}">
+                <a16:creationId xmlns:a16="http://schemas.microsoft.com/office/drawing/2014/main" id="{B0A115B8-31D5-4A66-8DF9-800A417936BD}"/>
+              </a:ext>
+            </a:extLst>
+          </p:cNvPr>
+          <p:cNvPicPr>
+            <a:picLocks noChangeAspect="1"/>
+          </p:cNvPicPr>
+          <p:nvPr/>
+        </p:nvPicPr>
+        <p:blipFill rotWithShape="1">
+          <a:blip r:embed="rId2"/>
+          <a:srcRect l="2429" t="41661" r="15" b="989"/>
+          <a:stretch/>
+        </p:blipFill>
+        <p:spPr>
+          <a:xfrm>
+            <a:off x="1919056" y="3608900"/>
+            <a:ext cx="8353887" cy="1638769"/>
+          </a:xfrm>
+          <a:prstGeom prst="rect">
+            <a:avLst/>
+          </a:prstGeom>
+        </p:spPr>
+      </p:pic>
+    </p:spTree>
+    <p:extLst>
+      <p:ext uri="{BB962C8B-B14F-4D97-AF65-F5344CB8AC3E}">
+        <p14:creationId xmlns:p14="http://schemas.microsoft.com/office/powerpoint/2010/main" val="3058747190"/>
+      </p:ext>
+    </p:extLst>
+  </p:cSld>
+  <p:clrMapOvr>
+    <a:masterClrMapping/>
+  </p:clrMapOvr>
+</p:sld>
+</file>
+
+<file path=ppt/slides/slide32.xml><?xml version="1.0" encoding="utf-8"?>
+<p:sld xmlns:a="http://schemas.openxmlformats.org/drawingml/2006/main" xmlns:r="http://schemas.openxmlformats.org/officeDocument/2006/relationships" xmlns:p="http://schemas.openxmlformats.org/presentationml/2006/main">
+  <p:cSld>
+    <p:spTree>
+      <p:nvGrpSpPr>
+        <p:cNvPr id="1" name=""/>
+        <p:cNvGrpSpPr/>
+        <p:nvPr/>
+      </p:nvGrpSpPr>
+      <p:grpSpPr>
+        <a:xfrm>
+          <a:off x="0" y="0"/>
+          <a:ext cx="0" cy="0"/>
+          <a:chOff x="0" y="0"/>
+          <a:chExt cx="0" cy="0"/>
+        </a:xfrm>
+      </p:grpSpPr>
+      <p:sp>
+        <p:nvSpPr>
+          <p:cNvPr id="2" name="Título 1">
+            <a:extLst>
+              <a:ext uri="{FF2B5EF4-FFF2-40B4-BE49-F238E27FC236}">
+                <a16:creationId xmlns:a16="http://schemas.microsoft.com/office/drawing/2014/main" id="{CFA6E98A-AF6F-42BC-B7DB-FD47DF996443}"/>
+              </a:ext>
+            </a:extLst>
+          </p:cNvPr>
+          <p:cNvSpPr>
+            <a:spLocks noGrp="1"/>
+          </p:cNvSpPr>
+          <p:nvPr>
+            <p:ph type="ctrTitle"/>
+          </p:nvPr>
+        </p:nvSpPr>
+        <p:spPr/>
+        <p:txBody>
+          <a:bodyPr/>
+          <a:lstStyle/>
+          <a:p>
+            <a:r>
+              <a:rPr lang="pt-BR" dirty="0"/>
+              <a:t>Obrigado</a:t>
+            </a:r>
+          </a:p>
+        </p:txBody>
+      </p:sp>
+      <p:sp>
+        <p:nvSpPr>
+          <p:cNvPr id="3" name="Subtítulo 2">
+            <a:extLst>
+              <a:ext uri="{FF2B5EF4-FFF2-40B4-BE49-F238E27FC236}">
+                <a16:creationId xmlns:a16="http://schemas.microsoft.com/office/drawing/2014/main" id="{3F713850-308C-4930-9724-203064F7C0F3}"/>
+              </a:ext>
+            </a:extLst>
+          </p:cNvPr>
+          <p:cNvSpPr>
+            <a:spLocks noGrp="1"/>
+          </p:cNvSpPr>
+          <p:nvPr>
+            <p:ph type="subTitle" idx="1"/>
+          </p:nvPr>
+        </p:nvSpPr>
+        <p:spPr/>
+        <p:txBody>
+          <a:bodyPr/>
+          <a:lstStyle/>
+          <a:p>
+            <a:r>
+              <a:rPr lang="pt-BR" dirty="0"/>
+              <a:t>Filipe Salles de Oliveira, RA149175</a:t>
+            </a:r>
+          </a:p>
+        </p:txBody>
+      </p:sp>
+      <p:sp>
+        <p:nvSpPr>
+          <p:cNvPr id="4" name="Espaço Reservado para Data 3">
+            <a:extLst>
+              <a:ext uri="{FF2B5EF4-FFF2-40B4-BE49-F238E27FC236}">
+                <a16:creationId xmlns:a16="http://schemas.microsoft.com/office/drawing/2014/main" id="{50E58847-6EFB-4351-AC1E-B07E1C420F6C}"/>
+              </a:ext>
+            </a:extLst>
+          </p:cNvPr>
+          <p:cNvSpPr>
+            <a:spLocks noGrp="1"/>
+          </p:cNvSpPr>
+          <p:nvPr>
+            <p:ph type="dt" sz="half" idx="10"/>
+          </p:nvPr>
+        </p:nvSpPr>
+        <p:spPr/>
+        <p:txBody>
+          <a:bodyPr/>
+          <a:lstStyle/>
+          <a:p>
+            <a:r>
+              <a:rPr lang="pt-BR"/>
+              <a:t>Agosto 2020</a:t>
+            </a:r>
+            <a:endParaRPr lang="pt-BR" dirty="0"/>
+          </a:p>
+        </p:txBody>
+      </p:sp>
+      <p:sp>
+        <p:nvSpPr>
+          <p:cNvPr id="5" name="Espaço Reservado para Rodapé 4">
+            <a:extLst>
+              <a:ext uri="{FF2B5EF4-FFF2-40B4-BE49-F238E27FC236}">
+                <a16:creationId xmlns:a16="http://schemas.microsoft.com/office/drawing/2014/main" id="{B7C099FE-113D-41D8-B79E-7034BA4D1DC3}"/>
+              </a:ext>
+            </a:extLst>
+          </p:cNvPr>
+          <p:cNvSpPr>
+            <a:spLocks noGrp="1"/>
+          </p:cNvSpPr>
+          <p:nvPr>
+            <p:ph type="ftr" sz="quarter" idx="11"/>
+          </p:nvPr>
+        </p:nvSpPr>
+        <p:spPr/>
+        <p:txBody>
+          <a:bodyPr/>
+          <a:lstStyle/>
+          <a:p>
+            <a:r>
+              <a:rPr lang="pt-BR"/>
+              <a:t>IT306V - Tópicos de Curto-circuito e Princípios de Proteção</a:t>
+            </a:r>
+            <a:endParaRPr lang="pt-BR" dirty="0"/>
+          </a:p>
+        </p:txBody>
+      </p:sp>
+      <p:sp>
+        <p:nvSpPr>
+          <p:cNvPr id="6" name="Espaço Reservado para Número de Slide 5">
+            <a:extLst>
+              <a:ext uri="{FF2B5EF4-FFF2-40B4-BE49-F238E27FC236}">
+                <a16:creationId xmlns:a16="http://schemas.microsoft.com/office/drawing/2014/main" id="{D0C1D071-DC3E-4FD7-9FC6-B475EC70188D}"/>
+              </a:ext>
+            </a:extLst>
+          </p:cNvPr>
+          <p:cNvSpPr>
+            <a:spLocks noGrp="1"/>
+          </p:cNvSpPr>
+          <p:nvPr>
+            <p:ph type="sldNum" sz="quarter" idx="12"/>
+          </p:nvPr>
+        </p:nvSpPr>
+        <p:spPr/>
+        <p:txBody>
+          <a:bodyPr/>
+          <a:lstStyle/>
+          <a:p>
+            <a:fld id="{8579997A-84E9-4B38-967C-2D4A110C3049}" type="slidenum">
+              <a:rPr lang="pt-BR" smtClean="0"/>
+              <a:t>32</a:t>
+            </a:fld>
+            <a:endParaRPr lang="pt-BR"/>
+          </a:p>
+        </p:txBody>
+      </p:sp>
+    </p:spTree>
+    <p:extLst>
+      <p:ext uri="{BB962C8B-B14F-4D97-AF65-F5344CB8AC3E}">
+        <p14:creationId xmlns:p14="http://schemas.microsoft.com/office/powerpoint/2010/main" val="1732845947"/>
       </p:ext>
     </p:extLst>
   </p:cSld>

</xml_diff>